<commit_message>
fix bugs in direction generator
</commit_message>
<xml_diff>
--- a/docs/motion.pptx
+++ b/docs/motion.pptx
@@ -200,7 +200,7 @@
           <a:p>
             <a:fld id="{511C0F88-A27C-484D-B74E-50BC381D460F}" type="datetimeFigureOut">
               <a:rPr lang="en-US" smtClean="0"/>
-              <a:t>3/18/15</a:t>
+              <a:t>3/19/15</a:t>
             </a:fld>
             <a:endParaRPr lang="en-US"/>
           </a:p>
@@ -636,6 +636,90 @@
 </p:notes>
 </file>
 
+<file path=ppt/notesSlides/notesSlide3.xml><?xml version="1.0" encoding="utf-8"?>
+<p:notes xmlns:a="http://schemas.openxmlformats.org/drawingml/2006/main" xmlns:r="http://schemas.openxmlformats.org/officeDocument/2006/relationships" xmlns:p="http://schemas.openxmlformats.org/presentationml/2006/main">
+  <p:cSld>
+    <p:spTree>
+      <p:nvGrpSpPr>
+        <p:cNvPr id="1" name=""/>
+        <p:cNvGrpSpPr/>
+        <p:nvPr/>
+      </p:nvGrpSpPr>
+      <p:grpSpPr>
+        <a:xfrm>
+          <a:off x="0" y="0"/>
+          <a:ext cx="0" cy="0"/>
+          <a:chOff x="0" y="0"/>
+          <a:chExt cx="0" cy="0"/>
+        </a:xfrm>
+      </p:grpSpPr>
+      <p:sp>
+        <p:nvSpPr>
+          <p:cNvPr id="2" name="Slide Image Placeholder 1"/>
+          <p:cNvSpPr>
+            <a:spLocks noGrp="1" noRot="1" noChangeAspect="1"/>
+          </p:cNvSpPr>
+          <p:nvPr>
+            <p:ph type="sldImg"/>
+          </p:nvPr>
+        </p:nvSpPr>
+        <p:spPr/>
+      </p:sp>
+      <p:sp>
+        <p:nvSpPr>
+          <p:cNvPr id="3" name="Notes Placeholder 2"/>
+          <p:cNvSpPr>
+            <a:spLocks noGrp="1"/>
+          </p:cNvSpPr>
+          <p:nvPr>
+            <p:ph type="body" idx="1"/>
+          </p:nvPr>
+        </p:nvSpPr>
+        <p:spPr/>
+        <p:txBody>
+          <a:bodyPr/>
+          <a:lstStyle/>
+          <a:p>
+            <a:endParaRPr lang="en-US" dirty="0"/>
+          </a:p>
+        </p:txBody>
+      </p:sp>
+      <p:sp>
+        <p:nvSpPr>
+          <p:cNvPr id="4" name="Slide Number Placeholder 3"/>
+          <p:cNvSpPr>
+            <a:spLocks noGrp="1"/>
+          </p:cNvSpPr>
+          <p:nvPr>
+            <p:ph type="sldNum" sz="quarter" idx="10"/>
+          </p:nvPr>
+        </p:nvSpPr>
+        <p:spPr/>
+        <p:txBody>
+          <a:bodyPr/>
+          <a:lstStyle/>
+          <a:p>
+            <a:fld id="{581E570C-5B74-DA42-9606-4B699AA513A4}" type="slidenum">
+              <a:rPr lang="en-US" smtClean="0"/>
+              <a:t>7</a:t>
+            </a:fld>
+            <a:endParaRPr lang="en-US"/>
+          </a:p>
+        </p:txBody>
+      </p:sp>
+    </p:spTree>
+    <p:extLst>
+      <p:ext uri="{BB962C8B-B14F-4D97-AF65-F5344CB8AC3E}">
+        <p14:creationId xmlns:p14="http://schemas.microsoft.com/office/powerpoint/2010/main" val="2550432830"/>
+      </p:ext>
+    </p:extLst>
+  </p:cSld>
+  <p:clrMapOvr>
+    <a:masterClrMapping/>
+  </p:clrMapOvr>
+</p:notes>
+</file>
+
 <file path=ppt/slideLayouts/slideLayout1.xml><?xml version="1.0" encoding="utf-8"?>
 <p:sldLayout xmlns:a="http://schemas.openxmlformats.org/drawingml/2006/main" xmlns:r="http://schemas.openxmlformats.org/officeDocument/2006/relationships" xmlns:p="http://schemas.openxmlformats.org/presentationml/2006/main" type="title" preserve="1">
   <p:cSld name="Title Slide">
@@ -817,7 +901,7 @@
           <a:p>
             <a:fld id="{A036456A-5EE3-1941-B783-D8D4032F7960}" type="datetimeFigureOut">
               <a:rPr lang="en-US" smtClean="0"/>
-              <a:t>3/18/15</a:t>
+              <a:t>3/19/15</a:t>
             </a:fld>
             <a:endParaRPr lang="en-US"/>
           </a:p>
@@ -987,7 +1071,7 @@
           <a:p>
             <a:fld id="{A036456A-5EE3-1941-B783-D8D4032F7960}" type="datetimeFigureOut">
               <a:rPr lang="en-US" smtClean="0"/>
-              <a:t>3/18/15</a:t>
+              <a:t>3/19/15</a:t>
             </a:fld>
             <a:endParaRPr lang="en-US"/>
           </a:p>
@@ -1167,7 +1251,7 @@
           <a:p>
             <a:fld id="{A036456A-5EE3-1941-B783-D8D4032F7960}" type="datetimeFigureOut">
               <a:rPr lang="en-US" smtClean="0"/>
-              <a:t>3/18/15</a:t>
+              <a:t>3/19/15</a:t>
             </a:fld>
             <a:endParaRPr lang="en-US"/>
           </a:p>
@@ -1337,7 +1421,7 @@
           <a:p>
             <a:fld id="{A036456A-5EE3-1941-B783-D8D4032F7960}" type="datetimeFigureOut">
               <a:rPr lang="en-US" smtClean="0"/>
-              <a:t>3/18/15</a:t>
+              <a:t>3/19/15</a:t>
             </a:fld>
             <a:endParaRPr lang="en-US"/>
           </a:p>
@@ -1583,7 +1667,7 @@
           <a:p>
             <a:fld id="{A036456A-5EE3-1941-B783-D8D4032F7960}" type="datetimeFigureOut">
               <a:rPr lang="en-US" smtClean="0"/>
-              <a:t>3/18/15</a:t>
+              <a:t>3/19/15</a:t>
             </a:fld>
             <a:endParaRPr lang="en-US"/>
           </a:p>
@@ -1871,7 +1955,7 @@
           <a:p>
             <a:fld id="{A036456A-5EE3-1941-B783-D8D4032F7960}" type="datetimeFigureOut">
               <a:rPr lang="en-US" smtClean="0"/>
-              <a:t>3/18/15</a:t>
+              <a:t>3/19/15</a:t>
             </a:fld>
             <a:endParaRPr lang="en-US"/>
           </a:p>
@@ -2293,7 +2377,7 @@
           <a:p>
             <a:fld id="{A036456A-5EE3-1941-B783-D8D4032F7960}" type="datetimeFigureOut">
               <a:rPr lang="en-US" smtClean="0"/>
-              <a:t>3/18/15</a:t>
+              <a:t>3/19/15</a:t>
             </a:fld>
             <a:endParaRPr lang="en-US"/>
           </a:p>
@@ -2411,7 +2495,7 @@
           <a:p>
             <a:fld id="{A036456A-5EE3-1941-B783-D8D4032F7960}" type="datetimeFigureOut">
               <a:rPr lang="en-US" smtClean="0"/>
-              <a:t>3/18/15</a:t>
+              <a:t>3/19/15</a:t>
             </a:fld>
             <a:endParaRPr lang="en-US"/>
           </a:p>
@@ -2506,7 +2590,7 @@
           <a:p>
             <a:fld id="{A036456A-5EE3-1941-B783-D8D4032F7960}" type="datetimeFigureOut">
               <a:rPr lang="en-US" smtClean="0"/>
-              <a:t>3/18/15</a:t>
+              <a:t>3/19/15</a:t>
             </a:fld>
             <a:endParaRPr lang="en-US"/>
           </a:p>
@@ -2783,7 +2867,7 @@
           <a:p>
             <a:fld id="{A036456A-5EE3-1941-B783-D8D4032F7960}" type="datetimeFigureOut">
               <a:rPr lang="en-US" smtClean="0"/>
-              <a:t>3/18/15</a:t>
+              <a:t>3/19/15</a:t>
             </a:fld>
             <a:endParaRPr lang="en-US"/>
           </a:p>
@@ -3036,7 +3120,7 @@
           <a:p>
             <a:fld id="{A036456A-5EE3-1941-B783-D8D4032F7960}" type="datetimeFigureOut">
               <a:rPr lang="en-US" smtClean="0"/>
-              <a:t>3/18/15</a:t>
+              <a:t>3/19/15</a:t>
             </a:fld>
             <a:endParaRPr lang="en-US"/>
           </a:p>
@@ -3249,7 +3333,7 @@
           <a:p>
             <a:fld id="{A036456A-5EE3-1941-B783-D8D4032F7960}" type="datetimeFigureOut">
               <a:rPr lang="en-US" smtClean="0"/>
-              <a:t>3/18/15</a:t>
+              <a:t>3/19/15</a:t>
             </a:fld>
             <a:endParaRPr lang="en-US"/>
           </a:p>
@@ -6301,10 +6385,6 @@
                 </a:rPr>
                 <a:t>w</a:t>
               </a:r>
-              <a:endParaRPr lang="en-US" sz="2400" dirty="0">
-                <a:latin typeface="Symbol" charset="2"/>
-                <a:cs typeface="Symbol" charset="2"/>
-              </a:endParaRPr>
             </a:p>
           </p:txBody>
         </p:sp>
@@ -6593,7 +6673,7 @@
         </p:nvSpPr>
         <p:spPr>
           <a:xfrm>
-            <a:off x="3206918" y="2205182"/>
+            <a:off x="3605872" y="1954671"/>
             <a:ext cx="2581248" cy="2839904"/>
           </a:xfrm>
           <a:prstGeom prst="rect">
@@ -6602,17 +6682,20 @@
           <a:gradFill flip="none" rotWithShape="1">
             <a:gsLst>
               <a:gs pos="0">
-                <a:srgbClr val="7F7F7F">
+                <a:schemeClr val="tx1">
+                  <a:lumMod val="50000"/>
+                  <a:lumOff val="50000"/>
                   <a:alpha val="24000"/>
-                </a:srgbClr>
+                </a:schemeClr>
               </a:gs>
               <a:gs pos="100000">
-                <a:srgbClr val="FFFFFF">
+                <a:schemeClr val="bg1">
+                  <a:lumMod val="85000"/>
                   <a:alpha val="24000"/>
-                </a:srgbClr>
+                </a:schemeClr>
               </a:gs>
             </a:gsLst>
-            <a:lin ang="10800000" scaled="0"/>
+            <a:lin ang="0" scaled="0"/>
             <a:tileRect/>
           </a:gradFill>
           <a:ln>
@@ -7062,22 +7145,24 @@
         </p:nvGrpSpPr>
         <p:grpSpPr>
           <a:xfrm>
-            <a:off x="3760385" y="3563122"/>
-            <a:ext cx="1049032" cy="579910"/>
-            <a:chOff x="2542827" y="3871270"/>
-            <a:chExt cx="1049032" cy="579910"/>
+            <a:off x="4809418" y="2693323"/>
+            <a:ext cx="816534" cy="869799"/>
+            <a:chOff x="3591860" y="3001471"/>
+            <a:chExt cx="816534" cy="869799"/>
           </a:xfrm>
         </p:grpSpPr>
         <p:cxnSp>
           <p:nvCxnSpPr>
             <p:cNvPr id="39" name="Straight Arrow Connector 38"/>
-            <p:cNvCxnSpPr/>
+            <p:cNvCxnSpPr>
+              <a:endCxn id="47" idx="0"/>
+            </p:cNvCxnSpPr>
             <p:nvPr/>
           </p:nvCxnSpPr>
           <p:spPr>
-            <a:xfrm flipH="1">
-              <a:off x="2840182" y="3871270"/>
-              <a:ext cx="751677" cy="480346"/>
+            <a:xfrm flipV="1">
+              <a:off x="3591860" y="3428001"/>
+              <a:ext cx="647257" cy="443269"/>
             </a:xfrm>
             <a:prstGeom prst="straightConnector1">
               <a:avLst/>
@@ -7112,7 +7197,7 @@
           </p:nvSpPr>
           <p:spPr>
             <a:xfrm>
-              <a:off x="2542827" y="3989515"/>
+              <a:off x="4069840" y="3001471"/>
               <a:ext cx="338554" cy="461665"/>
             </a:xfrm>
             <a:prstGeom prst="rect">
@@ -8750,29 +8835,89 @@
           </a:p>
         </p:txBody>
       </p:sp>
+      <p:sp>
+        <p:nvSpPr>
+          <p:cNvPr id="38" name="TextBox 37"/>
+          <p:cNvSpPr txBox="1"/>
+          <p:nvPr/>
+        </p:nvSpPr>
+        <p:spPr>
+          <a:xfrm>
+            <a:off x="1799303" y="5666525"/>
+            <a:ext cx="1186893" cy="461665"/>
+          </a:xfrm>
+          <a:prstGeom prst="rect">
+            <a:avLst/>
+          </a:prstGeom>
+          <a:noFill/>
+        </p:spPr>
+        <p:txBody>
+          <a:bodyPr wrap="none" rtlCol="0">
+            <a:spAutoFit/>
+          </a:bodyPr>
+          <a:lstStyle/>
+          <a:p>
+            <a:r>
+              <a:rPr lang="en-US" sz="2400" dirty="0" smtClean="0">
+                <a:latin typeface="Gill Sans MT"/>
+                <a:cs typeface="Gill Sans MT"/>
+              </a:rPr>
+              <a:t>In space</a:t>
+            </a:r>
+            <a:endParaRPr lang="en-US" sz="2400" dirty="0">
+              <a:latin typeface="Gill Sans MT"/>
+              <a:cs typeface="Gill Sans MT"/>
+            </a:endParaRPr>
+          </a:p>
+        </p:txBody>
+      </p:sp>
+      <p:pic>
+        <p:nvPicPr>
+          <p:cNvPr id="39" name="Picture 38"/>
+          <p:cNvPicPr>
+            <a:picLocks noChangeAspect="1"/>
+          </p:cNvPicPr>
+          <p:nvPr/>
+        </p:nvPicPr>
+        <p:blipFill>
+          <a:blip r:embed="rId2"/>
+          <a:stretch>
+            <a:fillRect/>
+          </a:stretch>
+        </p:blipFill>
+        <p:spPr>
+          <a:xfrm>
+            <a:off x="353291" y="3126980"/>
+            <a:ext cx="4318000" cy="2019774"/>
+          </a:xfrm>
+          <a:prstGeom prst="rect">
+            <a:avLst/>
+          </a:prstGeom>
+        </p:spPr>
+      </p:pic>
       <p:grpSp>
         <p:nvGrpSpPr>
-          <p:cNvPr id="36" name="Group 35"/>
+          <p:cNvPr id="4" name="Group 3"/>
           <p:cNvGrpSpPr/>
           <p:nvPr/>
         </p:nvGrpSpPr>
         <p:grpSpPr>
           <a:xfrm>
-            <a:off x="5478603" y="2567774"/>
-            <a:ext cx="3059262" cy="2839904"/>
-            <a:chOff x="6418580" y="2593263"/>
-            <a:chExt cx="3059262" cy="2839904"/>
+            <a:off x="5699966" y="2640206"/>
+            <a:ext cx="2660308" cy="2839904"/>
+            <a:chOff x="3605872" y="1954671"/>
+            <a:chExt cx="2660308" cy="2839904"/>
           </a:xfrm>
         </p:grpSpPr>
         <p:sp>
           <p:nvSpPr>
-            <p:cNvPr id="18" name="Rectangle 17"/>
+            <p:cNvPr id="37" name="Rectangle 36"/>
             <p:cNvSpPr/>
             <p:nvPr/>
           </p:nvSpPr>
           <p:spPr>
             <a:xfrm>
-              <a:off x="6418580" y="2593263"/>
+              <a:off x="3605872" y="1954671"/>
               <a:ext cx="2581248" cy="2839904"/>
             </a:xfrm>
             <a:prstGeom prst="rect">
@@ -8781,17 +8926,20 @@
             <a:gradFill flip="none" rotWithShape="1">
               <a:gsLst>
                 <a:gs pos="0">
-                  <a:srgbClr val="7F7F7F">
+                  <a:schemeClr val="tx1">
+                    <a:lumMod val="50000"/>
+                    <a:lumOff val="50000"/>
                     <a:alpha val="24000"/>
-                  </a:srgbClr>
+                  </a:schemeClr>
                 </a:gs>
                 <a:gs pos="100000">
-                  <a:srgbClr val="FFFFFF">
+                  <a:schemeClr val="bg1">
+                    <a:lumMod val="85000"/>
                     <a:alpha val="24000"/>
-                  </a:srgbClr>
+                  </a:schemeClr>
                 </a:gs>
               </a:gsLst>
-              <a:lin ang="10800000" scaled="0"/>
+              <a:lin ang="0" scaled="0"/>
               <a:tileRect/>
             </a:gradFill>
             <a:ln>
@@ -8827,7 +8975,7 @@
         </p:sp>
         <p:sp>
           <p:nvSpPr>
-            <p:cNvPr id="19" name="Oval 18"/>
+            <p:cNvPr id="40" name="Oval 39"/>
             <p:cNvSpPr>
               <a:spLocks noChangeAspect="1"/>
             </p:cNvSpPr>
@@ -8835,7 +8983,7 @@
           </p:nvSpPr>
           <p:spPr>
             <a:xfrm>
-              <a:off x="9377258" y="4834448"/>
+              <a:off x="6165596" y="4446367"/>
               <a:ext cx="100584" cy="100584"/>
             </a:xfrm>
             <a:prstGeom prst="ellipse">
@@ -8875,28 +9023,30 @@
         </p:sp>
         <p:grpSp>
           <p:nvGrpSpPr>
-            <p:cNvPr id="20" name="Group 19"/>
+            <p:cNvPr id="41" name="Group 40"/>
             <p:cNvGrpSpPr/>
             <p:nvPr/>
           </p:nvGrpSpPr>
           <p:grpSpPr>
             <a:xfrm>
-              <a:off x="6972047" y="3951203"/>
-              <a:ext cx="1049032" cy="579910"/>
-              <a:chOff x="2542827" y="3871270"/>
-              <a:chExt cx="1049032" cy="579910"/>
+              <a:off x="4809418" y="2693323"/>
+              <a:ext cx="816534" cy="869799"/>
+              <a:chOff x="3591860" y="3001471"/>
+              <a:chExt cx="816534" cy="869799"/>
             </a:xfrm>
           </p:grpSpPr>
           <p:cxnSp>
             <p:nvCxnSpPr>
-              <p:cNvPr id="21" name="Straight Arrow Connector 20"/>
-              <p:cNvCxnSpPr/>
+              <p:cNvPr id="42" name="Straight Arrow Connector 41"/>
+              <p:cNvCxnSpPr>
+                <a:endCxn id="55" idx="0"/>
+              </p:cNvCxnSpPr>
               <p:nvPr/>
             </p:nvCxnSpPr>
             <p:spPr>
-              <a:xfrm flipH="1">
-                <a:off x="2840182" y="3871270"/>
-                <a:ext cx="751677" cy="480346"/>
+              <a:xfrm flipV="1">
+                <a:off x="3591860" y="3428001"/>
+                <a:ext cx="647257" cy="443269"/>
               </a:xfrm>
               <a:prstGeom prst="straightConnector1">
                 <a:avLst/>
@@ -8925,13 +9075,13 @@
           </p:cxnSp>
           <p:sp>
             <p:nvSpPr>
-              <p:cNvPr id="22" name="TextBox 21"/>
+              <p:cNvPr id="43" name="TextBox 42"/>
               <p:cNvSpPr txBox="1"/>
               <p:nvPr/>
             </p:nvSpPr>
             <p:spPr>
               <a:xfrm>
-                <a:off x="2542827" y="3989515"/>
+                <a:off x="4069840" y="3001471"/>
                 <a:ext cx="338554" cy="461665"/>
               </a:xfrm>
               <a:prstGeom prst="rect">
@@ -8962,13 +9112,13 @@
         </p:grpSp>
         <p:grpSp>
           <p:nvGrpSpPr>
-            <p:cNvPr id="23" name="Group 22"/>
+            <p:cNvPr id="44" name="Group 43"/>
             <p:cNvGrpSpPr/>
             <p:nvPr/>
           </p:nvGrpSpPr>
           <p:grpSpPr>
             <a:xfrm>
-              <a:off x="7990604" y="3951203"/>
+              <a:off x="4778942" y="3563122"/>
               <a:ext cx="1300579" cy="672818"/>
               <a:chOff x="3561384" y="3871270"/>
               <a:chExt cx="1300579" cy="672818"/>
@@ -8976,7 +9126,7 @@
           </p:grpSpPr>
           <p:cxnSp>
             <p:nvCxnSpPr>
-              <p:cNvPr id="24" name="Straight Arrow Connector 23"/>
+              <p:cNvPr id="45" name="Straight Arrow Connector 44"/>
               <p:cNvCxnSpPr/>
               <p:nvPr/>
             </p:nvCxnSpPr>
@@ -9013,7 +9163,7 @@
           </p:cxnSp>
           <p:sp>
             <p:nvSpPr>
-              <p:cNvPr id="25" name="Rectangle 24"/>
+              <p:cNvPr id="46" name="Rectangle 45"/>
               <p:cNvSpPr/>
               <p:nvPr/>
             </p:nvSpPr>
@@ -9049,13 +9199,13 @@
         </p:grpSp>
         <p:cxnSp>
           <p:nvCxnSpPr>
-            <p:cNvPr id="26" name="Straight Arrow Connector 25"/>
+            <p:cNvPr id="47" name="Straight Arrow Connector 46"/>
             <p:cNvCxnSpPr/>
             <p:nvPr/>
           </p:nvCxnSpPr>
           <p:spPr>
             <a:xfrm flipV="1">
-              <a:off x="7990604" y="3552373"/>
+              <a:off x="4778942" y="3164292"/>
               <a:ext cx="0" cy="271759"/>
             </a:xfrm>
             <a:prstGeom prst="straightConnector1">
@@ -9086,13 +9236,13 @@
         </p:cxnSp>
         <p:grpSp>
           <p:nvGrpSpPr>
-            <p:cNvPr id="27" name="Group 26"/>
+            <p:cNvPr id="48" name="Group 47"/>
             <p:cNvGrpSpPr/>
             <p:nvPr/>
           </p:nvGrpSpPr>
           <p:grpSpPr>
             <a:xfrm>
-              <a:off x="7659263" y="2743652"/>
+              <a:off x="4447601" y="2355571"/>
               <a:ext cx="331341" cy="1207551"/>
               <a:chOff x="4447601" y="2355571"/>
               <a:chExt cx="331341" cy="1207551"/>
@@ -9100,7 +9250,7 @@
           </p:grpSpPr>
           <p:sp>
             <p:nvSpPr>
-              <p:cNvPr id="28" name="Rectangle 27"/>
+              <p:cNvPr id="49" name="Rectangle 48"/>
               <p:cNvSpPr/>
               <p:nvPr/>
             </p:nvSpPr>
@@ -9142,7 +9292,7 @@
           </p:sp>
           <p:cxnSp>
             <p:nvCxnSpPr>
-              <p:cNvPr id="29" name="Straight Arrow Connector 28"/>
+              <p:cNvPr id="50" name="Straight Arrow Connector 49"/>
               <p:cNvCxnSpPr/>
               <p:nvPr/>
             </p:nvCxnSpPr>
@@ -9179,13 +9329,13 @@
         </p:grpSp>
         <p:grpSp>
           <p:nvGrpSpPr>
-            <p:cNvPr id="30" name="Group 29"/>
+            <p:cNvPr id="51" name="Group 50"/>
             <p:cNvGrpSpPr/>
             <p:nvPr/>
           </p:nvGrpSpPr>
           <p:grpSpPr>
             <a:xfrm>
-              <a:off x="8021079" y="3507934"/>
+              <a:off x="4809417" y="3119853"/>
               <a:ext cx="1053529" cy="646455"/>
               <a:chOff x="4809417" y="3119853"/>
               <a:chExt cx="1053529" cy="646455"/>
@@ -9193,7 +9343,7 @@
           </p:grpSpPr>
           <p:grpSp>
             <p:nvGrpSpPr>
-              <p:cNvPr id="31" name="Group 30"/>
+              <p:cNvPr id="52" name="Group 51"/>
               <p:cNvGrpSpPr/>
               <p:nvPr/>
             </p:nvGrpSpPr>
@@ -9207,7 +9357,7 @@
             </p:grpSpPr>
             <p:cxnSp>
               <p:nvCxnSpPr>
-                <p:cNvPr id="33" name="Straight Arrow Connector 32"/>
+                <p:cNvPr id="54" name="Straight Arrow Connector 53"/>
                 <p:cNvCxnSpPr/>
                 <p:nvPr/>
               </p:nvCxnSpPr>
@@ -9243,7 +9393,7 @@
             </p:cxnSp>
             <p:sp>
               <p:nvSpPr>
-                <p:cNvPr id="34" name="TextBox 33"/>
+                <p:cNvPr id="55" name="TextBox 54"/>
                 <p:cNvSpPr txBox="1"/>
                 <p:nvPr/>
               </p:nvSpPr>
@@ -9273,7 +9423,7 @@
           </p:grpSp>
           <p:sp>
             <p:nvSpPr>
-              <p:cNvPr id="32" name="Rectangle 31"/>
+              <p:cNvPr id="53" name="Rectangle 52"/>
               <p:cNvSpPr/>
               <p:nvPr/>
             </p:nvSpPr>
@@ -9316,13 +9466,13 @@
         </p:grpSp>
         <p:sp>
           <p:nvSpPr>
-            <p:cNvPr id="35" name="Oval 34"/>
+            <p:cNvPr id="56" name="Oval 55"/>
             <p:cNvSpPr/>
             <p:nvPr/>
           </p:nvSpPr>
           <p:spPr>
             <a:xfrm>
-              <a:off x="7861767" y="3824132"/>
+              <a:off x="4650105" y="3436051"/>
               <a:ext cx="245316" cy="245316"/>
             </a:xfrm>
             <a:prstGeom prst="ellipse">
@@ -9374,66 +9524,6 @@
           </p:txBody>
         </p:sp>
       </p:grpSp>
-      <p:sp>
-        <p:nvSpPr>
-          <p:cNvPr id="38" name="TextBox 37"/>
-          <p:cNvSpPr txBox="1"/>
-          <p:nvPr/>
-        </p:nvSpPr>
-        <p:spPr>
-          <a:xfrm>
-            <a:off x="1799303" y="5666525"/>
-            <a:ext cx="1186893" cy="461665"/>
-          </a:xfrm>
-          <a:prstGeom prst="rect">
-            <a:avLst/>
-          </a:prstGeom>
-          <a:noFill/>
-        </p:spPr>
-        <p:txBody>
-          <a:bodyPr wrap="none" rtlCol="0">
-            <a:spAutoFit/>
-          </a:bodyPr>
-          <a:lstStyle/>
-          <a:p>
-            <a:r>
-              <a:rPr lang="en-US" sz="2400" dirty="0" smtClean="0">
-                <a:latin typeface="Gill Sans MT"/>
-                <a:cs typeface="Gill Sans MT"/>
-              </a:rPr>
-              <a:t>In space</a:t>
-            </a:r>
-            <a:endParaRPr lang="en-US" sz="2400" dirty="0">
-              <a:latin typeface="Gill Sans MT"/>
-              <a:cs typeface="Gill Sans MT"/>
-            </a:endParaRPr>
-          </a:p>
-        </p:txBody>
-      </p:sp>
-      <p:pic>
-        <p:nvPicPr>
-          <p:cNvPr id="39" name="Picture 38"/>
-          <p:cNvPicPr>
-            <a:picLocks noChangeAspect="1"/>
-          </p:cNvPicPr>
-          <p:nvPr/>
-        </p:nvPicPr>
-        <p:blipFill>
-          <a:blip r:embed="rId2"/>
-          <a:stretch>
-            <a:fillRect/>
-          </a:stretch>
-        </p:blipFill>
-        <p:spPr>
-          <a:xfrm>
-            <a:off x="353291" y="3126980"/>
-            <a:ext cx="4318000" cy="2019774"/>
-          </a:xfrm>
-          <a:prstGeom prst="rect">
-            <a:avLst/>
-          </a:prstGeom>
-        </p:spPr>
-      </p:pic>
     </p:spTree>
     <p:extLst>
       <p:ext uri="{BB962C8B-B14F-4D97-AF65-F5344CB8AC3E}">
@@ -9517,630 +9607,6 @@
           </a:p>
         </p:txBody>
       </p:sp>
-      <p:grpSp>
-        <p:nvGrpSpPr>
-          <p:cNvPr id="36" name="Group 35"/>
-          <p:cNvGrpSpPr/>
-          <p:nvPr/>
-        </p:nvGrpSpPr>
-        <p:grpSpPr>
-          <a:xfrm>
-            <a:off x="5478603" y="2567774"/>
-            <a:ext cx="3059262" cy="2839904"/>
-            <a:chOff x="6418580" y="2593263"/>
-            <a:chExt cx="3059262" cy="2839904"/>
-          </a:xfrm>
-        </p:grpSpPr>
-        <p:sp>
-          <p:nvSpPr>
-            <p:cNvPr id="18" name="Rectangle 17"/>
-            <p:cNvSpPr/>
-            <p:nvPr/>
-          </p:nvSpPr>
-          <p:spPr>
-            <a:xfrm>
-              <a:off x="6418580" y="2593263"/>
-              <a:ext cx="2581248" cy="2839904"/>
-            </a:xfrm>
-            <a:prstGeom prst="rect">
-              <a:avLst/>
-            </a:prstGeom>
-            <a:gradFill flip="none" rotWithShape="1">
-              <a:gsLst>
-                <a:gs pos="0">
-                  <a:srgbClr val="7F7F7F">
-                    <a:alpha val="24000"/>
-                  </a:srgbClr>
-                </a:gs>
-                <a:gs pos="100000">
-                  <a:srgbClr val="FFFFFF">
-                    <a:alpha val="24000"/>
-                  </a:srgbClr>
-                </a:gs>
-              </a:gsLst>
-              <a:lin ang="10800000" scaled="0"/>
-              <a:tileRect/>
-            </a:gradFill>
-            <a:ln>
-              <a:noFill/>
-            </a:ln>
-            <a:scene3d>
-              <a:camera prst="isometricRightUp"/>
-              <a:lightRig rig="threePt" dir="t"/>
-            </a:scene3d>
-          </p:spPr>
-          <p:style>
-            <a:lnRef idx="1">
-              <a:schemeClr val="accent1"/>
-            </a:lnRef>
-            <a:fillRef idx="3">
-              <a:schemeClr val="accent1"/>
-            </a:fillRef>
-            <a:effectRef idx="2">
-              <a:schemeClr val="accent1"/>
-            </a:effectRef>
-            <a:fontRef idx="minor">
-              <a:schemeClr val="lt1"/>
-            </a:fontRef>
-          </p:style>
-          <p:txBody>
-            <a:bodyPr rtlCol="0" anchor="ctr"/>
-            <a:lstStyle/>
-            <a:p>
-              <a:pPr algn="ctr"/>
-              <a:endParaRPr lang="en-US"/>
-            </a:p>
-          </p:txBody>
-        </p:sp>
-        <p:sp>
-          <p:nvSpPr>
-            <p:cNvPr id="19" name="Oval 18"/>
-            <p:cNvSpPr>
-              <a:spLocks noChangeAspect="1"/>
-            </p:cNvSpPr>
-            <p:nvPr/>
-          </p:nvSpPr>
-          <p:spPr>
-            <a:xfrm>
-              <a:off x="9377258" y="4834448"/>
-              <a:ext cx="100584" cy="100584"/>
-            </a:xfrm>
-            <a:prstGeom prst="ellipse">
-              <a:avLst/>
-            </a:prstGeom>
-            <a:solidFill>
-              <a:srgbClr val="0D0D0D"/>
-            </a:solidFill>
-            <a:ln>
-              <a:solidFill>
-                <a:schemeClr val="tx1"/>
-              </a:solidFill>
-            </a:ln>
-          </p:spPr>
-          <p:style>
-            <a:lnRef idx="1">
-              <a:schemeClr val="accent1"/>
-            </a:lnRef>
-            <a:fillRef idx="3">
-              <a:schemeClr val="accent1"/>
-            </a:fillRef>
-            <a:effectRef idx="2">
-              <a:schemeClr val="accent1"/>
-            </a:effectRef>
-            <a:fontRef idx="minor">
-              <a:schemeClr val="lt1"/>
-            </a:fontRef>
-          </p:style>
-          <p:txBody>
-            <a:bodyPr rtlCol="0" anchor="ctr"/>
-            <a:lstStyle/>
-            <a:p>
-              <a:pPr algn="ctr"/>
-              <a:endParaRPr lang="en-US"/>
-            </a:p>
-          </p:txBody>
-        </p:sp>
-        <p:grpSp>
-          <p:nvGrpSpPr>
-            <p:cNvPr id="20" name="Group 19"/>
-            <p:cNvGrpSpPr/>
-            <p:nvPr/>
-          </p:nvGrpSpPr>
-          <p:grpSpPr>
-            <a:xfrm>
-              <a:off x="6972047" y="3951203"/>
-              <a:ext cx="1049032" cy="579910"/>
-              <a:chOff x="2542827" y="3871270"/>
-              <a:chExt cx="1049032" cy="579910"/>
-            </a:xfrm>
-          </p:grpSpPr>
-          <p:cxnSp>
-            <p:nvCxnSpPr>
-              <p:cNvPr id="21" name="Straight Arrow Connector 20"/>
-              <p:cNvCxnSpPr/>
-              <p:nvPr/>
-            </p:nvCxnSpPr>
-            <p:spPr>
-              <a:xfrm flipH="1">
-                <a:off x="2840182" y="3871270"/>
-                <a:ext cx="751677" cy="480346"/>
-              </a:xfrm>
-              <a:prstGeom prst="straightConnector1">
-                <a:avLst/>
-              </a:prstGeom>
-              <a:ln>
-                <a:solidFill>
-                  <a:srgbClr val="000000"/>
-                </a:solidFill>
-                <a:tailEnd type="arrow"/>
-              </a:ln>
-            </p:spPr>
-            <p:style>
-              <a:lnRef idx="2">
-                <a:schemeClr val="accent1"/>
-              </a:lnRef>
-              <a:fillRef idx="0">
-                <a:schemeClr val="accent1"/>
-              </a:fillRef>
-              <a:effectRef idx="1">
-                <a:schemeClr val="accent1"/>
-              </a:effectRef>
-              <a:fontRef idx="minor">
-                <a:schemeClr val="tx1"/>
-              </a:fontRef>
-            </p:style>
-          </p:cxnSp>
-          <p:sp>
-            <p:nvSpPr>
-              <p:cNvPr id="22" name="TextBox 21"/>
-              <p:cNvSpPr txBox="1"/>
-              <p:nvPr/>
-            </p:nvSpPr>
-            <p:spPr>
-              <a:xfrm>
-                <a:off x="2542827" y="3989515"/>
-                <a:ext cx="338554" cy="461665"/>
-              </a:xfrm>
-              <a:prstGeom prst="rect">
-                <a:avLst/>
-              </a:prstGeom>
-              <a:noFill/>
-            </p:spPr>
-            <p:txBody>
-              <a:bodyPr wrap="none" rtlCol="0">
-                <a:spAutoFit/>
-              </a:bodyPr>
-              <a:lstStyle/>
-              <a:p>
-                <a:r>
-                  <a:rPr lang="en-US" sz="2400" dirty="0" smtClean="0">
-                    <a:latin typeface="Symbol" charset="2"/>
-                    <a:cs typeface="Symbol" charset="2"/>
-                  </a:rPr>
-                  <a:t>x</a:t>
-                </a:r>
-                <a:endParaRPr lang="en-US" sz="2400" dirty="0">
-                  <a:latin typeface="Symbol" charset="2"/>
-                  <a:cs typeface="Symbol" charset="2"/>
-                </a:endParaRPr>
-              </a:p>
-            </p:txBody>
-          </p:sp>
-        </p:grpSp>
-        <p:grpSp>
-          <p:nvGrpSpPr>
-            <p:cNvPr id="23" name="Group 22"/>
-            <p:cNvGrpSpPr/>
-            <p:nvPr/>
-          </p:nvGrpSpPr>
-          <p:grpSpPr>
-            <a:xfrm>
-              <a:off x="7990604" y="3951203"/>
-              <a:ext cx="1300579" cy="672818"/>
-              <a:chOff x="3561384" y="3871270"/>
-              <a:chExt cx="1300579" cy="672818"/>
-            </a:xfrm>
-          </p:grpSpPr>
-          <p:cxnSp>
-            <p:nvCxnSpPr>
-              <p:cNvPr id="24" name="Straight Arrow Connector 23"/>
-              <p:cNvCxnSpPr/>
-              <p:nvPr/>
-            </p:nvCxnSpPr>
-            <p:spPr>
-              <a:xfrm>
-                <a:off x="3561384" y="3871270"/>
-                <a:ext cx="1060908" cy="664792"/>
-              </a:xfrm>
-              <a:prstGeom prst="straightConnector1">
-                <a:avLst/>
-              </a:prstGeom>
-              <a:ln>
-                <a:solidFill>
-                  <a:srgbClr val="000000"/>
-                </a:solidFill>
-                <a:prstDash val="dot"/>
-                <a:tailEnd type="arrow"/>
-              </a:ln>
-            </p:spPr>
-            <p:style>
-              <a:lnRef idx="2">
-                <a:schemeClr val="accent1"/>
-              </a:lnRef>
-              <a:fillRef idx="0">
-                <a:schemeClr val="accent1"/>
-              </a:fillRef>
-              <a:effectRef idx="1">
-                <a:schemeClr val="accent1"/>
-              </a:effectRef>
-              <a:fontRef idx="minor">
-                <a:schemeClr val="tx1"/>
-              </a:fontRef>
-            </p:style>
-          </p:cxnSp>
-          <p:sp>
-            <p:nvSpPr>
-              <p:cNvPr id="25" name="Rectangle 24"/>
-              <p:cNvSpPr/>
-              <p:nvPr/>
-            </p:nvSpPr>
-            <p:spPr>
-              <a:xfrm>
-                <a:off x="4472113" y="4082423"/>
-                <a:ext cx="389850" cy="461665"/>
-              </a:xfrm>
-              <a:prstGeom prst="rect">
-                <a:avLst/>
-              </a:prstGeom>
-            </p:spPr>
-            <p:txBody>
-              <a:bodyPr wrap="none">
-                <a:spAutoFit/>
-              </a:bodyPr>
-              <a:lstStyle/>
-              <a:p>
-                <a:r>
-                  <a:rPr lang="en-US" sz="2400" dirty="0" smtClean="0">
-                    <a:latin typeface="Symbol" charset="2"/>
-                    <a:cs typeface="Symbol" charset="2"/>
-                  </a:rPr>
-                  <a:t>w</a:t>
-                </a:r>
-                <a:endParaRPr lang="en-US" sz="2400" dirty="0">
-                  <a:latin typeface="Symbol" charset="2"/>
-                  <a:cs typeface="Symbol" charset="2"/>
-                </a:endParaRPr>
-              </a:p>
-            </p:txBody>
-          </p:sp>
-        </p:grpSp>
-        <p:cxnSp>
-          <p:nvCxnSpPr>
-            <p:cNvPr id="26" name="Straight Arrow Connector 25"/>
-            <p:cNvCxnSpPr/>
-            <p:nvPr/>
-          </p:nvCxnSpPr>
-          <p:spPr>
-            <a:xfrm flipV="1">
-              <a:off x="7990604" y="3552373"/>
-              <a:ext cx="0" cy="271759"/>
-            </a:xfrm>
-            <a:prstGeom prst="straightConnector1">
-              <a:avLst/>
-            </a:prstGeom>
-            <a:ln w="57150" cmpd="sng">
-              <a:solidFill>
-                <a:srgbClr val="0D0D0D"/>
-              </a:solidFill>
-              <a:headEnd type="none"/>
-              <a:tailEnd type="triangle"/>
-            </a:ln>
-          </p:spPr>
-          <p:style>
-            <a:lnRef idx="2">
-              <a:schemeClr val="accent1"/>
-            </a:lnRef>
-            <a:fillRef idx="0">
-              <a:schemeClr val="accent1"/>
-            </a:fillRef>
-            <a:effectRef idx="1">
-              <a:schemeClr val="accent1"/>
-            </a:effectRef>
-            <a:fontRef idx="minor">
-              <a:schemeClr val="tx1"/>
-            </a:fontRef>
-          </p:style>
-        </p:cxnSp>
-        <p:grpSp>
-          <p:nvGrpSpPr>
-            <p:cNvPr id="27" name="Group 26"/>
-            <p:cNvGrpSpPr/>
-            <p:nvPr/>
-          </p:nvGrpSpPr>
-          <p:grpSpPr>
-            <a:xfrm>
-              <a:off x="7659263" y="2743652"/>
-              <a:ext cx="331341" cy="1207551"/>
-              <a:chOff x="4447601" y="2355571"/>
-              <a:chExt cx="331341" cy="1207551"/>
-            </a:xfrm>
-          </p:grpSpPr>
-          <p:sp>
-            <p:nvSpPr>
-              <p:cNvPr id="28" name="Rectangle 27"/>
-              <p:cNvSpPr/>
-              <p:nvPr/>
-            </p:nvSpPr>
-            <p:spPr>
-              <a:xfrm>
-                <a:off x="4447601" y="2355571"/>
-                <a:ext cx="331341" cy="461665"/>
-              </a:xfrm>
-              <a:prstGeom prst="rect">
-                <a:avLst/>
-              </a:prstGeom>
-            </p:spPr>
-            <p:txBody>
-              <a:bodyPr wrap="none">
-                <a:spAutoFit/>
-              </a:bodyPr>
-              <a:lstStyle/>
-              <a:p>
-                <a:pPr lvl="0"/>
-                <a:r>
-                  <a:rPr lang="en-US" sz="2400" dirty="0" smtClean="0">
-                    <a:solidFill>
-                      <a:prstClr val="black"/>
-                    </a:solidFill>
-                    <a:latin typeface="Symbol" charset="2"/>
-                    <a:cs typeface="Symbol" charset="2"/>
-                  </a:rPr>
-                  <a:t>y</a:t>
-                </a:r>
-                <a:endParaRPr lang="en-US" sz="2400" dirty="0">
-                  <a:solidFill>
-                    <a:prstClr val="black"/>
-                  </a:solidFill>
-                  <a:latin typeface="Symbol" charset="2"/>
-                  <a:cs typeface="Symbol" charset="2"/>
-                </a:endParaRPr>
-              </a:p>
-            </p:txBody>
-          </p:sp>
-          <p:cxnSp>
-            <p:nvCxnSpPr>
-              <p:cNvPr id="29" name="Straight Arrow Connector 28"/>
-              <p:cNvCxnSpPr/>
-              <p:nvPr/>
-            </p:nvCxnSpPr>
-            <p:spPr>
-              <a:xfrm flipV="1">
-                <a:off x="4778942" y="2611873"/>
-                <a:ext cx="0" cy="951249"/>
-              </a:xfrm>
-              <a:prstGeom prst="straightConnector1">
-                <a:avLst/>
-              </a:prstGeom>
-              <a:ln>
-                <a:solidFill>
-                  <a:srgbClr val="000000"/>
-                </a:solidFill>
-                <a:tailEnd type="arrow"/>
-              </a:ln>
-            </p:spPr>
-            <p:style>
-              <a:lnRef idx="2">
-                <a:schemeClr val="accent1"/>
-              </a:lnRef>
-              <a:fillRef idx="0">
-                <a:schemeClr val="accent1"/>
-              </a:fillRef>
-              <a:effectRef idx="1">
-                <a:schemeClr val="accent1"/>
-              </a:effectRef>
-              <a:fontRef idx="minor">
-                <a:schemeClr val="tx1"/>
-              </a:fontRef>
-            </p:style>
-          </p:cxnSp>
-        </p:grpSp>
-        <p:grpSp>
-          <p:nvGrpSpPr>
-            <p:cNvPr id="30" name="Group 29"/>
-            <p:cNvGrpSpPr/>
-            <p:nvPr/>
-          </p:nvGrpSpPr>
-          <p:grpSpPr>
-            <a:xfrm>
-              <a:off x="8021079" y="3507934"/>
-              <a:ext cx="1053529" cy="646455"/>
-              <a:chOff x="4809417" y="3119853"/>
-              <a:chExt cx="1053529" cy="646455"/>
-            </a:xfrm>
-          </p:grpSpPr>
-          <p:grpSp>
-            <p:nvGrpSpPr>
-              <p:cNvPr id="31" name="Group 30"/>
-              <p:cNvGrpSpPr/>
-              <p:nvPr/>
-            </p:nvGrpSpPr>
-            <p:grpSpPr>
-              <a:xfrm>
-                <a:off x="4809417" y="3119853"/>
-                <a:ext cx="910729" cy="646455"/>
-                <a:chOff x="3591859" y="3428001"/>
-                <a:chExt cx="910729" cy="646455"/>
-              </a:xfrm>
-            </p:grpSpPr>
-            <p:cxnSp>
-              <p:nvCxnSpPr>
-                <p:cNvPr id="33" name="Straight Arrow Connector 32"/>
-                <p:cNvCxnSpPr/>
-                <p:nvPr/>
-              </p:nvCxnSpPr>
-              <p:spPr>
-                <a:xfrm>
-                  <a:off x="3591859" y="3889666"/>
-                  <a:ext cx="910729" cy="184790"/>
-                </a:xfrm>
-                <a:prstGeom prst="straightConnector1">
-                  <a:avLst/>
-                </a:prstGeom>
-                <a:ln>
-                  <a:solidFill>
-                    <a:srgbClr val="000000"/>
-                  </a:solidFill>
-                  <a:tailEnd type="arrow"/>
-                </a:ln>
-              </p:spPr>
-              <p:style>
-                <a:lnRef idx="2">
-                  <a:schemeClr val="accent1"/>
-                </a:lnRef>
-                <a:fillRef idx="0">
-                  <a:schemeClr val="accent1"/>
-                </a:fillRef>
-                <a:effectRef idx="1">
-                  <a:schemeClr val="accent1"/>
-                </a:effectRef>
-                <a:fontRef idx="minor">
-                  <a:schemeClr val="tx1"/>
-                </a:fontRef>
-              </p:style>
-            </p:cxnSp>
-            <p:sp>
-              <p:nvSpPr>
-                <p:cNvPr id="34" name="TextBox 33"/>
-                <p:cNvSpPr txBox="1"/>
-                <p:nvPr/>
-              </p:nvSpPr>
-              <p:spPr>
-                <a:xfrm>
-                  <a:off x="4146784" y="3428001"/>
-                  <a:ext cx="184666" cy="461665"/>
-                </a:xfrm>
-                <a:prstGeom prst="rect">
-                  <a:avLst/>
-                </a:prstGeom>
-                <a:noFill/>
-              </p:spPr>
-              <p:txBody>
-                <a:bodyPr wrap="none" rtlCol="0">
-                  <a:spAutoFit/>
-                </a:bodyPr>
-                <a:lstStyle/>
-                <a:p>
-                  <a:endParaRPr lang="en-US" sz="2400" dirty="0">
-                    <a:latin typeface="Symbol" charset="2"/>
-                    <a:cs typeface="Symbol" charset="2"/>
-                  </a:endParaRPr>
-                </a:p>
-              </p:txBody>
-            </p:sp>
-          </p:grpSp>
-          <p:sp>
-            <p:nvSpPr>
-              <p:cNvPr id="32" name="Rectangle 31"/>
-              <p:cNvSpPr/>
-              <p:nvPr/>
-            </p:nvSpPr>
-            <p:spPr>
-              <a:xfrm>
-                <a:off x="5531605" y="3284159"/>
-                <a:ext cx="331341" cy="461665"/>
-              </a:xfrm>
-              <a:prstGeom prst="rect">
-                <a:avLst/>
-              </a:prstGeom>
-            </p:spPr>
-            <p:txBody>
-              <a:bodyPr wrap="none">
-                <a:spAutoFit/>
-              </a:bodyPr>
-              <a:lstStyle/>
-              <a:p>
-                <a:pPr lvl="0"/>
-                <a:r>
-                  <a:rPr lang="en-US" sz="2400" dirty="0" smtClean="0">
-                    <a:solidFill>
-                      <a:prstClr val="black"/>
-                    </a:solidFill>
-                    <a:latin typeface="Symbol" charset="2"/>
-                    <a:cs typeface="Symbol" charset="2"/>
-                  </a:rPr>
-                  <a:t>z</a:t>
-                </a:r>
-                <a:endParaRPr lang="en-US" sz="2400" dirty="0">
-                  <a:solidFill>
-                    <a:prstClr val="black"/>
-                  </a:solidFill>
-                  <a:latin typeface="Symbol" charset="2"/>
-                  <a:cs typeface="Symbol" charset="2"/>
-                </a:endParaRPr>
-              </a:p>
-            </p:txBody>
-          </p:sp>
-        </p:grpSp>
-        <p:sp>
-          <p:nvSpPr>
-            <p:cNvPr id="35" name="Oval 34"/>
-            <p:cNvSpPr/>
-            <p:nvPr/>
-          </p:nvSpPr>
-          <p:spPr>
-            <a:xfrm>
-              <a:off x="7861767" y="3824132"/>
-              <a:ext cx="245316" cy="245316"/>
-            </a:xfrm>
-            <a:prstGeom prst="ellipse">
-              <a:avLst/>
-            </a:prstGeom>
-            <a:gradFill flip="none" rotWithShape="1">
-              <a:gsLst>
-                <a:gs pos="0">
-                  <a:schemeClr val="bg1">
-                    <a:lumMod val="50000"/>
-                  </a:schemeClr>
-                </a:gs>
-                <a:gs pos="100000">
-                  <a:schemeClr val="bg1"/>
-                </a:gs>
-              </a:gsLst>
-              <a:path path="circle">
-                <a:fillToRect l="100000" t="100000"/>
-              </a:path>
-              <a:tileRect r="-100000" b="-100000"/>
-            </a:gradFill>
-            <a:ln>
-              <a:solidFill>
-                <a:schemeClr val="tx1"/>
-              </a:solidFill>
-            </a:ln>
-          </p:spPr>
-          <p:style>
-            <a:lnRef idx="1">
-              <a:schemeClr val="accent1"/>
-            </a:lnRef>
-            <a:fillRef idx="3">
-              <a:schemeClr val="accent1"/>
-            </a:fillRef>
-            <a:effectRef idx="2">
-              <a:schemeClr val="accent1"/>
-            </a:effectRef>
-            <a:fontRef idx="minor">
-              <a:schemeClr val="lt1"/>
-            </a:fontRef>
-          </p:style>
-          <p:txBody>
-            <a:bodyPr rtlCol="0" anchor="ctr"/>
-            <a:lstStyle/>
-            <a:p>
-              <a:pPr algn="ctr"/>
-              <a:endParaRPr lang="en-US"/>
-            </a:p>
-          </p:txBody>
-        </p:sp>
-      </p:grpSp>
       <p:grpSp>
         <p:nvGrpSpPr>
           <p:cNvPr id="63" name="Group 62"/>
@@ -10516,10 +9982,6 @@
                   </a:rPr>
                   <a:t>w</a:t>
                 </a:r>
-                <a:endParaRPr lang="en-US" sz="2400" dirty="0">
-                  <a:latin typeface="Symbol" charset="2"/>
-                  <a:cs typeface="Symbol" charset="2"/>
-                </a:endParaRPr>
               </a:p>
             </p:txBody>
           </p:sp>
@@ -10745,6 +10207,635 @@
           </a:p>
         </p:txBody>
       </p:sp>
+      <p:grpSp>
+        <p:nvGrpSpPr>
+          <p:cNvPr id="71" name="Group 70"/>
+          <p:cNvGrpSpPr/>
+          <p:nvPr/>
+        </p:nvGrpSpPr>
+        <p:grpSpPr>
+          <a:xfrm>
+            <a:off x="5839833" y="2669235"/>
+            <a:ext cx="2660308" cy="2839904"/>
+            <a:chOff x="3605872" y="1954671"/>
+            <a:chExt cx="2660308" cy="2839904"/>
+          </a:xfrm>
+        </p:grpSpPr>
+        <p:sp>
+          <p:nvSpPr>
+            <p:cNvPr id="72" name="Rectangle 71"/>
+            <p:cNvSpPr/>
+            <p:nvPr/>
+          </p:nvSpPr>
+          <p:spPr>
+            <a:xfrm>
+              <a:off x="3605872" y="1954671"/>
+              <a:ext cx="2581248" cy="2839904"/>
+            </a:xfrm>
+            <a:prstGeom prst="rect">
+              <a:avLst/>
+            </a:prstGeom>
+            <a:gradFill flip="none" rotWithShape="1">
+              <a:gsLst>
+                <a:gs pos="0">
+                  <a:schemeClr val="tx1">
+                    <a:lumMod val="50000"/>
+                    <a:lumOff val="50000"/>
+                    <a:alpha val="24000"/>
+                  </a:schemeClr>
+                </a:gs>
+                <a:gs pos="100000">
+                  <a:schemeClr val="bg1">
+                    <a:lumMod val="85000"/>
+                    <a:alpha val="24000"/>
+                  </a:schemeClr>
+                </a:gs>
+              </a:gsLst>
+              <a:lin ang="0" scaled="0"/>
+              <a:tileRect/>
+            </a:gradFill>
+            <a:ln>
+              <a:noFill/>
+            </a:ln>
+            <a:scene3d>
+              <a:camera prst="isometricRightUp"/>
+              <a:lightRig rig="threePt" dir="t"/>
+            </a:scene3d>
+          </p:spPr>
+          <p:style>
+            <a:lnRef idx="1">
+              <a:schemeClr val="accent1"/>
+            </a:lnRef>
+            <a:fillRef idx="3">
+              <a:schemeClr val="accent1"/>
+            </a:fillRef>
+            <a:effectRef idx="2">
+              <a:schemeClr val="accent1"/>
+            </a:effectRef>
+            <a:fontRef idx="minor">
+              <a:schemeClr val="lt1"/>
+            </a:fontRef>
+          </p:style>
+          <p:txBody>
+            <a:bodyPr rtlCol="0" anchor="ctr"/>
+            <a:lstStyle/>
+            <a:p>
+              <a:pPr algn="ctr"/>
+              <a:endParaRPr lang="en-US"/>
+            </a:p>
+          </p:txBody>
+        </p:sp>
+        <p:sp>
+          <p:nvSpPr>
+            <p:cNvPr id="73" name="Oval 72"/>
+            <p:cNvSpPr>
+              <a:spLocks noChangeAspect="1"/>
+            </p:cNvSpPr>
+            <p:nvPr/>
+          </p:nvSpPr>
+          <p:spPr>
+            <a:xfrm>
+              <a:off x="6165596" y="4446367"/>
+              <a:ext cx="100584" cy="100584"/>
+            </a:xfrm>
+            <a:prstGeom prst="ellipse">
+              <a:avLst/>
+            </a:prstGeom>
+            <a:solidFill>
+              <a:srgbClr val="0D0D0D"/>
+            </a:solidFill>
+            <a:ln>
+              <a:solidFill>
+                <a:schemeClr val="tx1"/>
+              </a:solidFill>
+            </a:ln>
+          </p:spPr>
+          <p:style>
+            <a:lnRef idx="1">
+              <a:schemeClr val="accent1"/>
+            </a:lnRef>
+            <a:fillRef idx="3">
+              <a:schemeClr val="accent1"/>
+            </a:fillRef>
+            <a:effectRef idx="2">
+              <a:schemeClr val="accent1"/>
+            </a:effectRef>
+            <a:fontRef idx="minor">
+              <a:schemeClr val="lt1"/>
+            </a:fontRef>
+          </p:style>
+          <p:txBody>
+            <a:bodyPr rtlCol="0" anchor="ctr"/>
+            <a:lstStyle/>
+            <a:p>
+              <a:pPr algn="ctr"/>
+              <a:endParaRPr lang="en-US"/>
+            </a:p>
+          </p:txBody>
+        </p:sp>
+        <p:grpSp>
+          <p:nvGrpSpPr>
+            <p:cNvPr id="74" name="Group 73"/>
+            <p:cNvGrpSpPr/>
+            <p:nvPr/>
+          </p:nvGrpSpPr>
+          <p:grpSpPr>
+            <a:xfrm>
+              <a:off x="4809418" y="2693323"/>
+              <a:ext cx="816534" cy="869799"/>
+              <a:chOff x="3591860" y="3001471"/>
+              <a:chExt cx="816534" cy="869799"/>
+            </a:xfrm>
+          </p:grpSpPr>
+          <p:cxnSp>
+            <p:nvCxnSpPr>
+              <p:cNvPr id="88" name="Straight Arrow Connector 87"/>
+              <p:cNvCxnSpPr>
+                <a:endCxn id="83" idx="0"/>
+              </p:cNvCxnSpPr>
+              <p:nvPr/>
+            </p:nvCxnSpPr>
+            <p:spPr>
+              <a:xfrm flipV="1">
+                <a:off x="3591860" y="3428001"/>
+                <a:ext cx="647257" cy="443269"/>
+              </a:xfrm>
+              <a:prstGeom prst="straightConnector1">
+                <a:avLst/>
+              </a:prstGeom>
+              <a:ln>
+                <a:solidFill>
+                  <a:srgbClr val="000000"/>
+                </a:solidFill>
+                <a:tailEnd type="arrow"/>
+              </a:ln>
+            </p:spPr>
+            <p:style>
+              <a:lnRef idx="2">
+                <a:schemeClr val="accent1"/>
+              </a:lnRef>
+              <a:fillRef idx="0">
+                <a:schemeClr val="accent1"/>
+              </a:fillRef>
+              <a:effectRef idx="1">
+                <a:schemeClr val="accent1"/>
+              </a:effectRef>
+              <a:fontRef idx="minor">
+                <a:schemeClr val="tx1"/>
+              </a:fontRef>
+            </p:style>
+          </p:cxnSp>
+          <p:sp>
+            <p:nvSpPr>
+              <p:cNvPr id="89" name="TextBox 88"/>
+              <p:cNvSpPr txBox="1"/>
+              <p:nvPr/>
+            </p:nvSpPr>
+            <p:spPr>
+              <a:xfrm>
+                <a:off x="4069840" y="3001471"/>
+                <a:ext cx="338554" cy="461665"/>
+              </a:xfrm>
+              <a:prstGeom prst="rect">
+                <a:avLst/>
+              </a:prstGeom>
+              <a:noFill/>
+            </p:spPr>
+            <p:txBody>
+              <a:bodyPr wrap="none" rtlCol="0">
+                <a:spAutoFit/>
+              </a:bodyPr>
+              <a:lstStyle/>
+              <a:p>
+                <a:r>
+                  <a:rPr lang="en-US" sz="2400" dirty="0" smtClean="0">
+                    <a:latin typeface="Symbol" charset="2"/>
+                    <a:cs typeface="Symbol" charset="2"/>
+                  </a:rPr>
+                  <a:t>x</a:t>
+                </a:r>
+                <a:endParaRPr lang="en-US" sz="2400" dirty="0">
+                  <a:latin typeface="Symbol" charset="2"/>
+                  <a:cs typeface="Symbol" charset="2"/>
+                </a:endParaRPr>
+              </a:p>
+            </p:txBody>
+          </p:sp>
+        </p:grpSp>
+        <p:grpSp>
+          <p:nvGrpSpPr>
+            <p:cNvPr id="75" name="Group 74"/>
+            <p:cNvGrpSpPr/>
+            <p:nvPr/>
+          </p:nvGrpSpPr>
+          <p:grpSpPr>
+            <a:xfrm>
+              <a:off x="4778942" y="3563122"/>
+              <a:ext cx="1300579" cy="672818"/>
+              <a:chOff x="3561384" y="3871270"/>
+              <a:chExt cx="1300579" cy="672818"/>
+            </a:xfrm>
+          </p:grpSpPr>
+          <p:cxnSp>
+            <p:nvCxnSpPr>
+              <p:cNvPr id="86" name="Straight Arrow Connector 85"/>
+              <p:cNvCxnSpPr/>
+              <p:nvPr/>
+            </p:nvCxnSpPr>
+            <p:spPr>
+              <a:xfrm>
+                <a:off x="3561384" y="3871270"/>
+                <a:ext cx="1060908" cy="664792"/>
+              </a:xfrm>
+              <a:prstGeom prst="straightConnector1">
+                <a:avLst/>
+              </a:prstGeom>
+              <a:ln>
+                <a:solidFill>
+                  <a:srgbClr val="000000"/>
+                </a:solidFill>
+                <a:prstDash val="dot"/>
+                <a:tailEnd type="arrow"/>
+              </a:ln>
+            </p:spPr>
+            <p:style>
+              <a:lnRef idx="2">
+                <a:schemeClr val="accent1"/>
+              </a:lnRef>
+              <a:fillRef idx="0">
+                <a:schemeClr val="accent1"/>
+              </a:fillRef>
+              <a:effectRef idx="1">
+                <a:schemeClr val="accent1"/>
+              </a:effectRef>
+              <a:fontRef idx="minor">
+                <a:schemeClr val="tx1"/>
+              </a:fontRef>
+            </p:style>
+          </p:cxnSp>
+          <p:sp>
+            <p:nvSpPr>
+              <p:cNvPr id="87" name="Rectangle 86"/>
+              <p:cNvSpPr/>
+              <p:nvPr/>
+            </p:nvSpPr>
+            <p:spPr>
+              <a:xfrm>
+                <a:off x="4472113" y="4082423"/>
+                <a:ext cx="389850" cy="461665"/>
+              </a:xfrm>
+              <a:prstGeom prst="rect">
+                <a:avLst/>
+              </a:prstGeom>
+            </p:spPr>
+            <p:txBody>
+              <a:bodyPr wrap="none">
+                <a:spAutoFit/>
+              </a:bodyPr>
+              <a:lstStyle/>
+              <a:p>
+                <a:r>
+                  <a:rPr lang="en-US" sz="2400" dirty="0" smtClean="0">
+                    <a:latin typeface="Symbol" charset="2"/>
+                    <a:cs typeface="Symbol" charset="2"/>
+                  </a:rPr>
+                  <a:t>w</a:t>
+                </a:r>
+                <a:endParaRPr lang="en-US" sz="2400" dirty="0">
+                  <a:latin typeface="Symbol" charset="2"/>
+                  <a:cs typeface="Symbol" charset="2"/>
+                </a:endParaRPr>
+              </a:p>
+            </p:txBody>
+          </p:sp>
+        </p:grpSp>
+        <p:cxnSp>
+          <p:nvCxnSpPr>
+            <p:cNvPr id="76" name="Straight Arrow Connector 75"/>
+            <p:cNvCxnSpPr/>
+            <p:nvPr/>
+          </p:nvCxnSpPr>
+          <p:spPr>
+            <a:xfrm flipV="1">
+              <a:off x="4778942" y="3164292"/>
+              <a:ext cx="0" cy="271759"/>
+            </a:xfrm>
+            <a:prstGeom prst="straightConnector1">
+              <a:avLst/>
+            </a:prstGeom>
+            <a:ln w="57150" cmpd="sng">
+              <a:solidFill>
+                <a:srgbClr val="0D0D0D"/>
+              </a:solidFill>
+              <a:headEnd type="none"/>
+              <a:tailEnd type="triangle"/>
+            </a:ln>
+          </p:spPr>
+          <p:style>
+            <a:lnRef idx="2">
+              <a:schemeClr val="accent1"/>
+            </a:lnRef>
+            <a:fillRef idx="0">
+              <a:schemeClr val="accent1"/>
+            </a:fillRef>
+            <a:effectRef idx="1">
+              <a:schemeClr val="accent1"/>
+            </a:effectRef>
+            <a:fontRef idx="minor">
+              <a:schemeClr val="tx1"/>
+            </a:fontRef>
+          </p:style>
+        </p:cxnSp>
+        <p:grpSp>
+          <p:nvGrpSpPr>
+            <p:cNvPr id="77" name="Group 76"/>
+            <p:cNvGrpSpPr/>
+            <p:nvPr/>
+          </p:nvGrpSpPr>
+          <p:grpSpPr>
+            <a:xfrm>
+              <a:off x="4447601" y="2355571"/>
+              <a:ext cx="331341" cy="1207551"/>
+              <a:chOff x="4447601" y="2355571"/>
+              <a:chExt cx="331341" cy="1207551"/>
+            </a:xfrm>
+          </p:grpSpPr>
+          <p:sp>
+            <p:nvSpPr>
+              <p:cNvPr id="84" name="Rectangle 83"/>
+              <p:cNvSpPr/>
+              <p:nvPr/>
+            </p:nvSpPr>
+            <p:spPr>
+              <a:xfrm>
+                <a:off x="4447601" y="2355571"/>
+                <a:ext cx="331341" cy="461665"/>
+              </a:xfrm>
+              <a:prstGeom prst="rect">
+                <a:avLst/>
+              </a:prstGeom>
+            </p:spPr>
+            <p:txBody>
+              <a:bodyPr wrap="none">
+                <a:spAutoFit/>
+              </a:bodyPr>
+              <a:lstStyle/>
+              <a:p>
+                <a:pPr lvl="0"/>
+                <a:r>
+                  <a:rPr lang="en-US" sz="2400" dirty="0" smtClean="0">
+                    <a:solidFill>
+                      <a:prstClr val="black"/>
+                    </a:solidFill>
+                    <a:latin typeface="Symbol" charset="2"/>
+                    <a:cs typeface="Symbol" charset="2"/>
+                  </a:rPr>
+                  <a:t>y</a:t>
+                </a:r>
+                <a:endParaRPr lang="en-US" sz="2400" dirty="0">
+                  <a:solidFill>
+                    <a:prstClr val="black"/>
+                  </a:solidFill>
+                  <a:latin typeface="Symbol" charset="2"/>
+                  <a:cs typeface="Symbol" charset="2"/>
+                </a:endParaRPr>
+              </a:p>
+            </p:txBody>
+          </p:sp>
+          <p:cxnSp>
+            <p:nvCxnSpPr>
+              <p:cNvPr id="85" name="Straight Arrow Connector 84"/>
+              <p:cNvCxnSpPr/>
+              <p:nvPr/>
+            </p:nvCxnSpPr>
+            <p:spPr>
+              <a:xfrm flipV="1">
+                <a:off x="4778942" y="2611873"/>
+                <a:ext cx="0" cy="951249"/>
+              </a:xfrm>
+              <a:prstGeom prst="straightConnector1">
+                <a:avLst/>
+              </a:prstGeom>
+              <a:ln>
+                <a:solidFill>
+                  <a:srgbClr val="000000"/>
+                </a:solidFill>
+                <a:tailEnd type="arrow"/>
+              </a:ln>
+            </p:spPr>
+            <p:style>
+              <a:lnRef idx="2">
+                <a:schemeClr val="accent1"/>
+              </a:lnRef>
+              <a:fillRef idx="0">
+                <a:schemeClr val="accent1"/>
+              </a:fillRef>
+              <a:effectRef idx="1">
+                <a:schemeClr val="accent1"/>
+              </a:effectRef>
+              <a:fontRef idx="minor">
+                <a:schemeClr val="tx1"/>
+              </a:fontRef>
+            </p:style>
+          </p:cxnSp>
+        </p:grpSp>
+        <p:grpSp>
+          <p:nvGrpSpPr>
+            <p:cNvPr id="78" name="Group 77"/>
+            <p:cNvGrpSpPr/>
+            <p:nvPr/>
+          </p:nvGrpSpPr>
+          <p:grpSpPr>
+            <a:xfrm>
+              <a:off x="4809417" y="3119853"/>
+              <a:ext cx="1053529" cy="646455"/>
+              <a:chOff x="4809417" y="3119853"/>
+              <a:chExt cx="1053529" cy="646455"/>
+            </a:xfrm>
+          </p:grpSpPr>
+          <p:grpSp>
+            <p:nvGrpSpPr>
+              <p:cNvPr id="80" name="Group 79"/>
+              <p:cNvGrpSpPr/>
+              <p:nvPr/>
+            </p:nvGrpSpPr>
+            <p:grpSpPr>
+              <a:xfrm>
+                <a:off x="4809417" y="3119853"/>
+                <a:ext cx="910729" cy="646455"/>
+                <a:chOff x="3591859" y="3428001"/>
+                <a:chExt cx="910729" cy="646455"/>
+              </a:xfrm>
+            </p:grpSpPr>
+            <p:cxnSp>
+              <p:nvCxnSpPr>
+                <p:cNvPr id="82" name="Straight Arrow Connector 81"/>
+                <p:cNvCxnSpPr/>
+                <p:nvPr/>
+              </p:nvCxnSpPr>
+              <p:spPr>
+                <a:xfrm>
+                  <a:off x="3591859" y="3889666"/>
+                  <a:ext cx="910729" cy="184790"/>
+                </a:xfrm>
+                <a:prstGeom prst="straightConnector1">
+                  <a:avLst/>
+                </a:prstGeom>
+                <a:ln>
+                  <a:solidFill>
+                    <a:srgbClr val="000000"/>
+                  </a:solidFill>
+                  <a:tailEnd type="arrow"/>
+                </a:ln>
+              </p:spPr>
+              <p:style>
+                <a:lnRef idx="2">
+                  <a:schemeClr val="accent1"/>
+                </a:lnRef>
+                <a:fillRef idx="0">
+                  <a:schemeClr val="accent1"/>
+                </a:fillRef>
+                <a:effectRef idx="1">
+                  <a:schemeClr val="accent1"/>
+                </a:effectRef>
+                <a:fontRef idx="minor">
+                  <a:schemeClr val="tx1"/>
+                </a:fontRef>
+              </p:style>
+            </p:cxnSp>
+            <p:sp>
+              <p:nvSpPr>
+                <p:cNvPr id="83" name="TextBox 82"/>
+                <p:cNvSpPr txBox="1"/>
+                <p:nvPr/>
+              </p:nvSpPr>
+              <p:spPr>
+                <a:xfrm>
+                  <a:off x="4146784" y="3428001"/>
+                  <a:ext cx="184666" cy="461665"/>
+                </a:xfrm>
+                <a:prstGeom prst="rect">
+                  <a:avLst/>
+                </a:prstGeom>
+                <a:noFill/>
+              </p:spPr>
+              <p:txBody>
+                <a:bodyPr wrap="none" rtlCol="0">
+                  <a:spAutoFit/>
+                </a:bodyPr>
+                <a:lstStyle/>
+                <a:p>
+                  <a:endParaRPr lang="en-US" sz="2400" dirty="0">
+                    <a:latin typeface="Symbol" charset="2"/>
+                    <a:cs typeface="Symbol" charset="2"/>
+                  </a:endParaRPr>
+                </a:p>
+              </p:txBody>
+            </p:sp>
+          </p:grpSp>
+          <p:sp>
+            <p:nvSpPr>
+              <p:cNvPr id="81" name="Rectangle 80"/>
+              <p:cNvSpPr/>
+              <p:nvPr/>
+            </p:nvSpPr>
+            <p:spPr>
+              <a:xfrm>
+                <a:off x="5531605" y="3284159"/>
+                <a:ext cx="331341" cy="461665"/>
+              </a:xfrm>
+              <a:prstGeom prst="rect">
+                <a:avLst/>
+              </a:prstGeom>
+            </p:spPr>
+            <p:txBody>
+              <a:bodyPr wrap="none">
+                <a:spAutoFit/>
+              </a:bodyPr>
+              <a:lstStyle/>
+              <a:p>
+                <a:pPr lvl="0"/>
+                <a:r>
+                  <a:rPr lang="en-US" sz="2400" dirty="0" smtClean="0">
+                    <a:solidFill>
+                      <a:prstClr val="black"/>
+                    </a:solidFill>
+                    <a:latin typeface="Symbol" charset="2"/>
+                    <a:cs typeface="Symbol" charset="2"/>
+                  </a:rPr>
+                  <a:t>z</a:t>
+                </a:r>
+                <a:endParaRPr lang="en-US" sz="2400" dirty="0">
+                  <a:solidFill>
+                    <a:prstClr val="black"/>
+                  </a:solidFill>
+                  <a:latin typeface="Symbol" charset="2"/>
+                  <a:cs typeface="Symbol" charset="2"/>
+                </a:endParaRPr>
+              </a:p>
+            </p:txBody>
+          </p:sp>
+        </p:grpSp>
+        <p:sp>
+          <p:nvSpPr>
+            <p:cNvPr id="79" name="Oval 78"/>
+            <p:cNvSpPr/>
+            <p:nvPr/>
+          </p:nvSpPr>
+          <p:spPr>
+            <a:xfrm>
+              <a:off x="4650105" y="3436051"/>
+              <a:ext cx="245316" cy="245316"/>
+            </a:xfrm>
+            <a:prstGeom prst="ellipse">
+              <a:avLst/>
+            </a:prstGeom>
+            <a:gradFill flip="none" rotWithShape="1">
+              <a:gsLst>
+                <a:gs pos="0">
+                  <a:schemeClr val="bg1">
+                    <a:lumMod val="50000"/>
+                  </a:schemeClr>
+                </a:gs>
+                <a:gs pos="100000">
+                  <a:schemeClr val="bg1"/>
+                </a:gs>
+              </a:gsLst>
+              <a:path path="circle">
+                <a:fillToRect l="100000" t="100000"/>
+              </a:path>
+              <a:tileRect r="-100000" b="-100000"/>
+            </a:gradFill>
+            <a:ln>
+              <a:solidFill>
+                <a:schemeClr val="tx1"/>
+              </a:solidFill>
+            </a:ln>
+          </p:spPr>
+          <p:style>
+            <a:lnRef idx="1">
+              <a:schemeClr val="accent1"/>
+            </a:lnRef>
+            <a:fillRef idx="3">
+              <a:schemeClr val="accent1"/>
+            </a:fillRef>
+            <a:effectRef idx="2">
+              <a:schemeClr val="accent1"/>
+            </a:effectRef>
+            <a:fontRef idx="minor">
+              <a:schemeClr val="lt1"/>
+            </a:fontRef>
+          </p:style>
+          <p:txBody>
+            <a:bodyPr rtlCol="0" anchor="ctr"/>
+            <a:lstStyle/>
+            <a:p>
+              <a:pPr algn="ctr"/>
+              <a:endParaRPr lang="en-US"/>
+            </a:p>
+          </p:txBody>
+        </p:sp>
+      </p:grpSp>
     </p:spTree>
     <p:extLst>
       <p:ext uri="{BB962C8B-B14F-4D97-AF65-F5344CB8AC3E}">
@@ -10828,630 +10919,6 @@
           </a:p>
         </p:txBody>
       </p:sp>
-      <p:grpSp>
-        <p:nvGrpSpPr>
-          <p:cNvPr id="36" name="Group 35"/>
-          <p:cNvGrpSpPr/>
-          <p:nvPr/>
-        </p:nvGrpSpPr>
-        <p:grpSpPr>
-          <a:xfrm>
-            <a:off x="5478603" y="2567774"/>
-            <a:ext cx="3059262" cy="2839904"/>
-            <a:chOff x="6418580" y="2593263"/>
-            <a:chExt cx="3059262" cy="2839904"/>
-          </a:xfrm>
-        </p:grpSpPr>
-        <p:sp>
-          <p:nvSpPr>
-            <p:cNvPr id="18" name="Rectangle 17"/>
-            <p:cNvSpPr/>
-            <p:nvPr/>
-          </p:nvSpPr>
-          <p:spPr>
-            <a:xfrm>
-              <a:off x="6418580" y="2593263"/>
-              <a:ext cx="2581248" cy="2839904"/>
-            </a:xfrm>
-            <a:prstGeom prst="rect">
-              <a:avLst/>
-            </a:prstGeom>
-            <a:gradFill flip="none" rotWithShape="1">
-              <a:gsLst>
-                <a:gs pos="0">
-                  <a:srgbClr val="7F7F7F">
-                    <a:alpha val="24000"/>
-                  </a:srgbClr>
-                </a:gs>
-                <a:gs pos="100000">
-                  <a:srgbClr val="FFFFFF">
-                    <a:alpha val="24000"/>
-                  </a:srgbClr>
-                </a:gs>
-              </a:gsLst>
-              <a:lin ang="10800000" scaled="0"/>
-              <a:tileRect/>
-            </a:gradFill>
-            <a:ln>
-              <a:noFill/>
-            </a:ln>
-            <a:scene3d>
-              <a:camera prst="isometricRightUp"/>
-              <a:lightRig rig="threePt" dir="t"/>
-            </a:scene3d>
-          </p:spPr>
-          <p:style>
-            <a:lnRef idx="1">
-              <a:schemeClr val="accent1"/>
-            </a:lnRef>
-            <a:fillRef idx="3">
-              <a:schemeClr val="accent1"/>
-            </a:fillRef>
-            <a:effectRef idx="2">
-              <a:schemeClr val="accent1"/>
-            </a:effectRef>
-            <a:fontRef idx="minor">
-              <a:schemeClr val="lt1"/>
-            </a:fontRef>
-          </p:style>
-          <p:txBody>
-            <a:bodyPr rtlCol="0" anchor="ctr"/>
-            <a:lstStyle/>
-            <a:p>
-              <a:pPr algn="ctr"/>
-              <a:endParaRPr lang="en-US"/>
-            </a:p>
-          </p:txBody>
-        </p:sp>
-        <p:sp>
-          <p:nvSpPr>
-            <p:cNvPr id="19" name="Oval 18"/>
-            <p:cNvSpPr>
-              <a:spLocks noChangeAspect="1"/>
-            </p:cNvSpPr>
-            <p:nvPr/>
-          </p:nvSpPr>
-          <p:spPr>
-            <a:xfrm>
-              <a:off x="9377258" y="4834448"/>
-              <a:ext cx="100584" cy="100584"/>
-            </a:xfrm>
-            <a:prstGeom prst="ellipse">
-              <a:avLst/>
-            </a:prstGeom>
-            <a:solidFill>
-              <a:srgbClr val="0D0D0D"/>
-            </a:solidFill>
-            <a:ln>
-              <a:solidFill>
-                <a:schemeClr val="tx1"/>
-              </a:solidFill>
-            </a:ln>
-          </p:spPr>
-          <p:style>
-            <a:lnRef idx="1">
-              <a:schemeClr val="accent1"/>
-            </a:lnRef>
-            <a:fillRef idx="3">
-              <a:schemeClr val="accent1"/>
-            </a:fillRef>
-            <a:effectRef idx="2">
-              <a:schemeClr val="accent1"/>
-            </a:effectRef>
-            <a:fontRef idx="minor">
-              <a:schemeClr val="lt1"/>
-            </a:fontRef>
-          </p:style>
-          <p:txBody>
-            <a:bodyPr rtlCol="0" anchor="ctr"/>
-            <a:lstStyle/>
-            <a:p>
-              <a:pPr algn="ctr"/>
-              <a:endParaRPr lang="en-US"/>
-            </a:p>
-          </p:txBody>
-        </p:sp>
-        <p:grpSp>
-          <p:nvGrpSpPr>
-            <p:cNvPr id="20" name="Group 19"/>
-            <p:cNvGrpSpPr/>
-            <p:nvPr/>
-          </p:nvGrpSpPr>
-          <p:grpSpPr>
-            <a:xfrm>
-              <a:off x="6972047" y="3951203"/>
-              <a:ext cx="1049032" cy="579910"/>
-              <a:chOff x="2542827" y="3871270"/>
-              <a:chExt cx="1049032" cy="579910"/>
-            </a:xfrm>
-          </p:grpSpPr>
-          <p:cxnSp>
-            <p:nvCxnSpPr>
-              <p:cNvPr id="21" name="Straight Arrow Connector 20"/>
-              <p:cNvCxnSpPr/>
-              <p:nvPr/>
-            </p:nvCxnSpPr>
-            <p:spPr>
-              <a:xfrm flipH="1">
-                <a:off x="2840182" y="3871270"/>
-                <a:ext cx="751677" cy="480346"/>
-              </a:xfrm>
-              <a:prstGeom prst="straightConnector1">
-                <a:avLst/>
-              </a:prstGeom>
-              <a:ln>
-                <a:solidFill>
-                  <a:srgbClr val="000000"/>
-                </a:solidFill>
-                <a:tailEnd type="arrow"/>
-              </a:ln>
-            </p:spPr>
-            <p:style>
-              <a:lnRef idx="2">
-                <a:schemeClr val="accent1"/>
-              </a:lnRef>
-              <a:fillRef idx="0">
-                <a:schemeClr val="accent1"/>
-              </a:fillRef>
-              <a:effectRef idx="1">
-                <a:schemeClr val="accent1"/>
-              </a:effectRef>
-              <a:fontRef idx="minor">
-                <a:schemeClr val="tx1"/>
-              </a:fontRef>
-            </p:style>
-          </p:cxnSp>
-          <p:sp>
-            <p:nvSpPr>
-              <p:cNvPr id="22" name="TextBox 21"/>
-              <p:cNvSpPr txBox="1"/>
-              <p:nvPr/>
-            </p:nvSpPr>
-            <p:spPr>
-              <a:xfrm>
-                <a:off x="2542827" y="3989515"/>
-                <a:ext cx="338554" cy="461665"/>
-              </a:xfrm>
-              <a:prstGeom prst="rect">
-                <a:avLst/>
-              </a:prstGeom>
-              <a:noFill/>
-            </p:spPr>
-            <p:txBody>
-              <a:bodyPr wrap="none" rtlCol="0">
-                <a:spAutoFit/>
-              </a:bodyPr>
-              <a:lstStyle/>
-              <a:p>
-                <a:r>
-                  <a:rPr lang="en-US" sz="2400" dirty="0" smtClean="0">
-                    <a:latin typeface="Symbol" charset="2"/>
-                    <a:cs typeface="Symbol" charset="2"/>
-                  </a:rPr>
-                  <a:t>x</a:t>
-                </a:r>
-                <a:endParaRPr lang="en-US" sz="2400" dirty="0">
-                  <a:latin typeface="Symbol" charset="2"/>
-                  <a:cs typeface="Symbol" charset="2"/>
-                </a:endParaRPr>
-              </a:p>
-            </p:txBody>
-          </p:sp>
-        </p:grpSp>
-        <p:grpSp>
-          <p:nvGrpSpPr>
-            <p:cNvPr id="23" name="Group 22"/>
-            <p:cNvGrpSpPr/>
-            <p:nvPr/>
-          </p:nvGrpSpPr>
-          <p:grpSpPr>
-            <a:xfrm>
-              <a:off x="7990604" y="3951203"/>
-              <a:ext cx="1300579" cy="672818"/>
-              <a:chOff x="3561384" y="3871270"/>
-              <a:chExt cx="1300579" cy="672818"/>
-            </a:xfrm>
-          </p:grpSpPr>
-          <p:cxnSp>
-            <p:nvCxnSpPr>
-              <p:cNvPr id="24" name="Straight Arrow Connector 23"/>
-              <p:cNvCxnSpPr/>
-              <p:nvPr/>
-            </p:nvCxnSpPr>
-            <p:spPr>
-              <a:xfrm>
-                <a:off x="3561384" y="3871270"/>
-                <a:ext cx="1060908" cy="664792"/>
-              </a:xfrm>
-              <a:prstGeom prst="straightConnector1">
-                <a:avLst/>
-              </a:prstGeom>
-              <a:ln>
-                <a:solidFill>
-                  <a:srgbClr val="000000"/>
-                </a:solidFill>
-                <a:prstDash val="dot"/>
-                <a:tailEnd type="arrow"/>
-              </a:ln>
-            </p:spPr>
-            <p:style>
-              <a:lnRef idx="2">
-                <a:schemeClr val="accent1"/>
-              </a:lnRef>
-              <a:fillRef idx="0">
-                <a:schemeClr val="accent1"/>
-              </a:fillRef>
-              <a:effectRef idx="1">
-                <a:schemeClr val="accent1"/>
-              </a:effectRef>
-              <a:fontRef idx="minor">
-                <a:schemeClr val="tx1"/>
-              </a:fontRef>
-            </p:style>
-          </p:cxnSp>
-          <p:sp>
-            <p:nvSpPr>
-              <p:cNvPr id="25" name="Rectangle 24"/>
-              <p:cNvSpPr/>
-              <p:nvPr/>
-            </p:nvSpPr>
-            <p:spPr>
-              <a:xfrm>
-                <a:off x="4472113" y="4082423"/>
-                <a:ext cx="389850" cy="461665"/>
-              </a:xfrm>
-              <a:prstGeom prst="rect">
-                <a:avLst/>
-              </a:prstGeom>
-            </p:spPr>
-            <p:txBody>
-              <a:bodyPr wrap="none">
-                <a:spAutoFit/>
-              </a:bodyPr>
-              <a:lstStyle/>
-              <a:p>
-                <a:r>
-                  <a:rPr lang="en-US" sz="2400" dirty="0" smtClean="0">
-                    <a:latin typeface="Symbol" charset="2"/>
-                    <a:cs typeface="Symbol" charset="2"/>
-                  </a:rPr>
-                  <a:t>w</a:t>
-                </a:r>
-                <a:endParaRPr lang="en-US" sz="2400" dirty="0">
-                  <a:latin typeface="Symbol" charset="2"/>
-                  <a:cs typeface="Symbol" charset="2"/>
-                </a:endParaRPr>
-              </a:p>
-            </p:txBody>
-          </p:sp>
-        </p:grpSp>
-        <p:cxnSp>
-          <p:nvCxnSpPr>
-            <p:cNvPr id="26" name="Straight Arrow Connector 25"/>
-            <p:cNvCxnSpPr/>
-            <p:nvPr/>
-          </p:nvCxnSpPr>
-          <p:spPr>
-            <a:xfrm flipV="1">
-              <a:off x="7990604" y="3552373"/>
-              <a:ext cx="0" cy="271759"/>
-            </a:xfrm>
-            <a:prstGeom prst="straightConnector1">
-              <a:avLst/>
-            </a:prstGeom>
-            <a:ln w="57150" cmpd="sng">
-              <a:solidFill>
-                <a:srgbClr val="0D0D0D"/>
-              </a:solidFill>
-              <a:headEnd type="none"/>
-              <a:tailEnd type="triangle"/>
-            </a:ln>
-          </p:spPr>
-          <p:style>
-            <a:lnRef idx="2">
-              <a:schemeClr val="accent1"/>
-            </a:lnRef>
-            <a:fillRef idx="0">
-              <a:schemeClr val="accent1"/>
-            </a:fillRef>
-            <a:effectRef idx="1">
-              <a:schemeClr val="accent1"/>
-            </a:effectRef>
-            <a:fontRef idx="minor">
-              <a:schemeClr val="tx1"/>
-            </a:fontRef>
-          </p:style>
-        </p:cxnSp>
-        <p:grpSp>
-          <p:nvGrpSpPr>
-            <p:cNvPr id="27" name="Group 26"/>
-            <p:cNvGrpSpPr/>
-            <p:nvPr/>
-          </p:nvGrpSpPr>
-          <p:grpSpPr>
-            <a:xfrm>
-              <a:off x="7659263" y="2743652"/>
-              <a:ext cx="331341" cy="1207551"/>
-              <a:chOff x="4447601" y="2355571"/>
-              <a:chExt cx="331341" cy="1207551"/>
-            </a:xfrm>
-          </p:grpSpPr>
-          <p:sp>
-            <p:nvSpPr>
-              <p:cNvPr id="28" name="Rectangle 27"/>
-              <p:cNvSpPr/>
-              <p:nvPr/>
-            </p:nvSpPr>
-            <p:spPr>
-              <a:xfrm>
-                <a:off x="4447601" y="2355571"/>
-                <a:ext cx="331341" cy="461665"/>
-              </a:xfrm>
-              <a:prstGeom prst="rect">
-                <a:avLst/>
-              </a:prstGeom>
-            </p:spPr>
-            <p:txBody>
-              <a:bodyPr wrap="none">
-                <a:spAutoFit/>
-              </a:bodyPr>
-              <a:lstStyle/>
-              <a:p>
-                <a:pPr lvl="0"/>
-                <a:r>
-                  <a:rPr lang="en-US" sz="2400" dirty="0" smtClean="0">
-                    <a:solidFill>
-                      <a:prstClr val="black"/>
-                    </a:solidFill>
-                    <a:latin typeface="Symbol" charset="2"/>
-                    <a:cs typeface="Symbol" charset="2"/>
-                  </a:rPr>
-                  <a:t>y</a:t>
-                </a:r>
-                <a:endParaRPr lang="en-US" sz="2400" dirty="0">
-                  <a:solidFill>
-                    <a:prstClr val="black"/>
-                  </a:solidFill>
-                  <a:latin typeface="Symbol" charset="2"/>
-                  <a:cs typeface="Symbol" charset="2"/>
-                </a:endParaRPr>
-              </a:p>
-            </p:txBody>
-          </p:sp>
-          <p:cxnSp>
-            <p:nvCxnSpPr>
-              <p:cNvPr id="29" name="Straight Arrow Connector 28"/>
-              <p:cNvCxnSpPr/>
-              <p:nvPr/>
-            </p:nvCxnSpPr>
-            <p:spPr>
-              <a:xfrm flipV="1">
-                <a:off x="4778942" y="2611873"/>
-                <a:ext cx="0" cy="951249"/>
-              </a:xfrm>
-              <a:prstGeom prst="straightConnector1">
-                <a:avLst/>
-              </a:prstGeom>
-              <a:ln>
-                <a:solidFill>
-                  <a:srgbClr val="000000"/>
-                </a:solidFill>
-                <a:tailEnd type="arrow"/>
-              </a:ln>
-            </p:spPr>
-            <p:style>
-              <a:lnRef idx="2">
-                <a:schemeClr val="accent1"/>
-              </a:lnRef>
-              <a:fillRef idx="0">
-                <a:schemeClr val="accent1"/>
-              </a:fillRef>
-              <a:effectRef idx="1">
-                <a:schemeClr val="accent1"/>
-              </a:effectRef>
-              <a:fontRef idx="minor">
-                <a:schemeClr val="tx1"/>
-              </a:fontRef>
-            </p:style>
-          </p:cxnSp>
-        </p:grpSp>
-        <p:grpSp>
-          <p:nvGrpSpPr>
-            <p:cNvPr id="30" name="Group 29"/>
-            <p:cNvGrpSpPr/>
-            <p:nvPr/>
-          </p:nvGrpSpPr>
-          <p:grpSpPr>
-            <a:xfrm>
-              <a:off x="8021079" y="3507934"/>
-              <a:ext cx="1053529" cy="646455"/>
-              <a:chOff x="4809417" y="3119853"/>
-              <a:chExt cx="1053529" cy="646455"/>
-            </a:xfrm>
-          </p:grpSpPr>
-          <p:grpSp>
-            <p:nvGrpSpPr>
-              <p:cNvPr id="31" name="Group 30"/>
-              <p:cNvGrpSpPr/>
-              <p:nvPr/>
-            </p:nvGrpSpPr>
-            <p:grpSpPr>
-              <a:xfrm>
-                <a:off x="4809417" y="3119853"/>
-                <a:ext cx="910729" cy="646455"/>
-                <a:chOff x="3591859" y="3428001"/>
-                <a:chExt cx="910729" cy="646455"/>
-              </a:xfrm>
-            </p:grpSpPr>
-            <p:cxnSp>
-              <p:nvCxnSpPr>
-                <p:cNvPr id="33" name="Straight Arrow Connector 32"/>
-                <p:cNvCxnSpPr/>
-                <p:nvPr/>
-              </p:nvCxnSpPr>
-              <p:spPr>
-                <a:xfrm>
-                  <a:off x="3591859" y="3889666"/>
-                  <a:ext cx="910729" cy="184790"/>
-                </a:xfrm>
-                <a:prstGeom prst="straightConnector1">
-                  <a:avLst/>
-                </a:prstGeom>
-                <a:ln>
-                  <a:solidFill>
-                    <a:srgbClr val="000000"/>
-                  </a:solidFill>
-                  <a:tailEnd type="arrow"/>
-                </a:ln>
-              </p:spPr>
-              <p:style>
-                <a:lnRef idx="2">
-                  <a:schemeClr val="accent1"/>
-                </a:lnRef>
-                <a:fillRef idx="0">
-                  <a:schemeClr val="accent1"/>
-                </a:fillRef>
-                <a:effectRef idx="1">
-                  <a:schemeClr val="accent1"/>
-                </a:effectRef>
-                <a:fontRef idx="minor">
-                  <a:schemeClr val="tx1"/>
-                </a:fontRef>
-              </p:style>
-            </p:cxnSp>
-            <p:sp>
-              <p:nvSpPr>
-                <p:cNvPr id="34" name="TextBox 33"/>
-                <p:cNvSpPr txBox="1"/>
-                <p:nvPr/>
-              </p:nvSpPr>
-              <p:spPr>
-                <a:xfrm>
-                  <a:off x="4146784" y="3428001"/>
-                  <a:ext cx="184666" cy="461665"/>
-                </a:xfrm>
-                <a:prstGeom prst="rect">
-                  <a:avLst/>
-                </a:prstGeom>
-                <a:noFill/>
-              </p:spPr>
-              <p:txBody>
-                <a:bodyPr wrap="none" rtlCol="0">
-                  <a:spAutoFit/>
-                </a:bodyPr>
-                <a:lstStyle/>
-                <a:p>
-                  <a:endParaRPr lang="en-US" sz="2400" dirty="0">
-                    <a:latin typeface="Symbol" charset="2"/>
-                    <a:cs typeface="Symbol" charset="2"/>
-                  </a:endParaRPr>
-                </a:p>
-              </p:txBody>
-            </p:sp>
-          </p:grpSp>
-          <p:sp>
-            <p:nvSpPr>
-              <p:cNvPr id="32" name="Rectangle 31"/>
-              <p:cNvSpPr/>
-              <p:nvPr/>
-            </p:nvSpPr>
-            <p:spPr>
-              <a:xfrm>
-                <a:off x="5531605" y="3284159"/>
-                <a:ext cx="331341" cy="461665"/>
-              </a:xfrm>
-              <a:prstGeom prst="rect">
-                <a:avLst/>
-              </a:prstGeom>
-            </p:spPr>
-            <p:txBody>
-              <a:bodyPr wrap="none">
-                <a:spAutoFit/>
-              </a:bodyPr>
-              <a:lstStyle/>
-              <a:p>
-                <a:pPr lvl="0"/>
-                <a:r>
-                  <a:rPr lang="en-US" sz="2400" dirty="0" smtClean="0">
-                    <a:solidFill>
-                      <a:prstClr val="black"/>
-                    </a:solidFill>
-                    <a:latin typeface="Symbol" charset="2"/>
-                    <a:cs typeface="Symbol" charset="2"/>
-                  </a:rPr>
-                  <a:t>z</a:t>
-                </a:r>
-                <a:endParaRPr lang="en-US" sz="2400" dirty="0">
-                  <a:solidFill>
-                    <a:prstClr val="black"/>
-                  </a:solidFill>
-                  <a:latin typeface="Symbol" charset="2"/>
-                  <a:cs typeface="Symbol" charset="2"/>
-                </a:endParaRPr>
-              </a:p>
-            </p:txBody>
-          </p:sp>
-        </p:grpSp>
-        <p:sp>
-          <p:nvSpPr>
-            <p:cNvPr id="35" name="Oval 34"/>
-            <p:cNvSpPr/>
-            <p:nvPr/>
-          </p:nvSpPr>
-          <p:spPr>
-            <a:xfrm>
-              <a:off x="7861767" y="3824132"/>
-              <a:ext cx="245316" cy="245316"/>
-            </a:xfrm>
-            <a:prstGeom prst="ellipse">
-              <a:avLst/>
-            </a:prstGeom>
-            <a:gradFill flip="none" rotWithShape="1">
-              <a:gsLst>
-                <a:gs pos="0">
-                  <a:schemeClr val="bg1">
-                    <a:lumMod val="50000"/>
-                  </a:schemeClr>
-                </a:gs>
-                <a:gs pos="100000">
-                  <a:schemeClr val="bg1"/>
-                </a:gs>
-              </a:gsLst>
-              <a:path path="circle">
-                <a:fillToRect l="100000" t="100000"/>
-              </a:path>
-              <a:tileRect r="-100000" b="-100000"/>
-            </a:gradFill>
-            <a:ln>
-              <a:solidFill>
-                <a:schemeClr val="tx1"/>
-              </a:solidFill>
-            </a:ln>
-          </p:spPr>
-          <p:style>
-            <a:lnRef idx="1">
-              <a:schemeClr val="accent1"/>
-            </a:lnRef>
-            <a:fillRef idx="3">
-              <a:schemeClr val="accent1"/>
-            </a:fillRef>
-            <a:effectRef idx="2">
-              <a:schemeClr val="accent1"/>
-            </a:effectRef>
-            <a:fontRef idx="minor">
-              <a:schemeClr val="lt1"/>
-            </a:fontRef>
-          </p:style>
-          <p:txBody>
-            <a:bodyPr rtlCol="0" anchor="ctr"/>
-            <a:lstStyle/>
-            <a:p>
-              <a:pPr algn="ctr"/>
-              <a:endParaRPr lang="en-US"/>
-            </a:p>
-          </p:txBody>
-        </p:sp>
-      </p:grpSp>
       <p:grpSp>
         <p:nvGrpSpPr>
           <p:cNvPr id="63" name="Group 62"/>
@@ -11827,10 +11294,6 @@
                   </a:rPr>
                   <a:t>w</a:t>
                 </a:r>
-                <a:endParaRPr lang="en-US" sz="2400" dirty="0">
-                  <a:latin typeface="Symbol" charset="2"/>
-                  <a:cs typeface="Symbol" charset="2"/>
-                </a:endParaRPr>
               </a:p>
             </p:txBody>
           </p:sp>
@@ -11970,35 +11433,7 @@
                 <a:latin typeface="Gill Sans MT"/>
                 <a:cs typeface="Gill Sans MT"/>
               </a:rPr>
-              <a:t>±u, </a:t>
-            </a:r>
-            <a:r>
-              <a:rPr lang="en-US" sz="2400" dirty="0" smtClean="0">
-                <a:latin typeface="Gill Sans MT"/>
-                <a:cs typeface="Gill Sans MT"/>
-              </a:rPr>
-              <a:t>±</a:t>
-            </a:r>
-            <a:r>
-              <a:rPr lang="en-US" sz="2400" dirty="0" smtClean="0">
-                <a:latin typeface="Gill Sans MT"/>
-                <a:cs typeface="Gill Sans MT"/>
-              </a:rPr>
-              <a:t>v, </a:t>
-            </a:r>
-            <a:r>
-              <a:rPr lang="en-US" sz="2400" dirty="0" smtClean="0">
-                <a:latin typeface="Gill Sans MT"/>
-                <a:cs typeface="Gill Sans MT"/>
-              </a:rPr>
-              <a:t>±</a:t>
-            </a:r>
-            <a:r>
-              <a:rPr lang="en-US" sz="2400" dirty="0" smtClean="0">
-                <a:latin typeface="Gill Sans MT"/>
-                <a:cs typeface="Gill Sans MT"/>
-              </a:rPr>
-              <a:t>w</a:t>
+              <a:t>±u, ±v, ±w</a:t>
             </a:r>
           </a:p>
           <a:p>
@@ -12008,42 +11443,7 @@
                 <a:latin typeface="Gill Sans MT"/>
                 <a:cs typeface="Gill Sans MT"/>
               </a:rPr>
-              <a:t>±</a:t>
-            </a:r>
-            <a:r>
-              <a:rPr lang="en-US" sz="2400" dirty="0" smtClean="0">
-                <a:latin typeface="Gill Sans MT"/>
-                <a:cs typeface="Gill Sans MT"/>
-              </a:rPr>
-              <a:t>x, </a:t>
-            </a:r>
-            <a:r>
-              <a:rPr lang="en-US" sz="2400" dirty="0" smtClean="0">
-                <a:latin typeface="Gill Sans MT"/>
-                <a:cs typeface="Gill Sans MT"/>
-              </a:rPr>
-              <a:t>±</a:t>
-            </a:r>
-            <a:r>
-              <a:rPr lang="en-US" sz="2400" dirty="0" smtClean="0">
-                <a:latin typeface="Gill Sans MT"/>
-                <a:cs typeface="Gill Sans MT"/>
-              </a:rPr>
-              <a:t>y, </a:t>
-            </a:r>
-            <a:r>
-              <a:rPr lang="en-US" sz="2400" dirty="0" smtClean="0">
-                <a:latin typeface="Gill Sans MT"/>
-                <a:cs typeface="Gill Sans MT"/>
-              </a:rPr>
-              <a:t>±</a:t>
-            </a:r>
-            <a:r>
-              <a:rPr lang="en-US" sz="2400" dirty="0" smtClean="0">
-                <a:latin typeface="Gill Sans MT"/>
-                <a:cs typeface="Gill Sans MT"/>
-              </a:rPr>
-              <a:t>z</a:t>
+              <a:t>±x, ±y, ±z</a:t>
             </a:r>
           </a:p>
         </p:txBody>
@@ -12056,8 +11456,8 @@
         </p:nvSpPr>
         <p:spPr>
           <a:xfrm>
-            <a:off x="6370624" y="5664498"/>
-            <a:ext cx="2169509" cy="923330"/>
+            <a:off x="1211683" y="5664498"/>
+            <a:ext cx="2068520" cy="923330"/>
           </a:xfrm>
           <a:prstGeom prst="rect">
             <a:avLst/>
@@ -12070,25 +11470,663 @@
           <a:lstStyle/>
           <a:p>
             <a:r>
-              <a:rPr lang="en-US" dirty="0" smtClean="0"/>
-              <a:t>Upward | Downward</a:t>
+              <a:rPr lang="en-US"/>
+              <a:t>Upward</a:t>
+            </a:r>
+            <a:r>
+              <a:rPr lang="en-US"/>
+              <a:t>, </a:t>
+            </a:r>
+            <a:r>
+              <a:rPr lang="en-US" smtClean="0"/>
+              <a:t>Downward</a:t>
             </a:r>
           </a:p>
           <a:p>
             <a:r>
               <a:rPr lang="en-US" dirty="0" smtClean="0"/>
-              <a:t>Forward| Backward</a:t>
+              <a:t>Left, Right</a:t>
             </a:r>
+            <a:endParaRPr lang="en-US" dirty="0" smtClean="0"/>
           </a:p>
           <a:p>
             <a:r>
               <a:rPr lang="en-US" dirty="0" smtClean="0"/>
-              <a:t>Left | Right</a:t>
+              <a:t>Forward, Backward</a:t>
             </a:r>
             <a:endParaRPr lang="en-US" dirty="0"/>
           </a:p>
         </p:txBody>
       </p:sp>
+      <p:grpSp>
+        <p:nvGrpSpPr>
+          <p:cNvPr id="39" name="Group 38"/>
+          <p:cNvGrpSpPr/>
+          <p:nvPr/>
+        </p:nvGrpSpPr>
+        <p:grpSpPr>
+          <a:xfrm>
+            <a:off x="5938084" y="2298954"/>
+            <a:ext cx="2660308" cy="2839904"/>
+            <a:chOff x="3605872" y="1954671"/>
+            <a:chExt cx="2660308" cy="2839904"/>
+          </a:xfrm>
+        </p:grpSpPr>
+        <p:sp>
+          <p:nvSpPr>
+            <p:cNvPr id="40" name="Rectangle 39"/>
+            <p:cNvSpPr/>
+            <p:nvPr/>
+          </p:nvSpPr>
+          <p:spPr>
+            <a:xfrm>
+              <a:off x="3605872" y="1954671"/>
+              <a:ext cx="2581248" cy="2839904"/>
+            </a:xfrm>
+            <a:prstGeom prst="rect">
+              <a:avLst/>
+            </a:prstGeom>
+            <a:gradFill flip="none" rotWithShape="1">
+              <a:gsLst>
+                <a:gs pos="0">
+                  <a:schemeClr val="tx1">
+                    <a:lumMod val="50000"/>
+                    <a:lumOff val="50000"/>
+                    <a:alpha val="24000"/>
+                  </a:schemeClr>
+                </a:gs>
+                <a:gs pos="100000">
+                  <a:schemeClr val="bg1">
+                    <a:lumMod val="85000"/>
+                    <a:alpha val="24000"/>
+                  </a:schemeClr>
+                </a:gs>
+              </a:gsLst>
+              <a:lin ang="0" scaled="0"/>
+              <a:tileRect/>
+            </a:gradFill>
+            <a:ln>
+              <a:noFill/>
+            </a:ln>
+            <a:scene3d>
+              <a:camera prst="isometricRightUp"/>
+              <a:lightRig rig="threePt" dir="t"/>
+            </a:scene3d>
+          </p:spPr>
+          <p:style>
+            <a:lnRef idx="1">
+              <a:schemeClr val="accent1"/>
+            </a:lnRef>
+            <a:fillRef idx="3">
+              <a:schemeClr val="accent1"/>
+            </a:fillRef>
+            <a:effectRef idx="2">
+              <a:schemeClr val="accent1"/>
+            </a:effectRef>
+            <a:fontRef idx="minor">
+              <a:schemeClr val="lt1"/>
+            </a:fontRef>
+          </p:style>
+          <p:txBody>
+            <a:bodyPr rtlCol="0" anchor="ctr"/>
+            <a:lstStyle/>
+            <a:p>
+              <a:pPr algn="ctr"/>
+              <a:endParaRPr lang="en-US"/>
+            </a:p>
+          </p:txBody>
+        </p:sp>
+        <p:sp>
+          <p:nvSpPr>
+            <p:cNvPr id="41" name="Oval 40"/>
+            <p:cNvSpPr>
+              <a:spLocks noChangeAspect="1"/>
+            </p:cNvSpPr>
+            <p:nvPr/>
+          </p:nvSpPr>
+          <p:spPr>
+            <a:xfrm>
+              <a:off x="6165596" y="4446367"/>
+              <a:ext cx="100584" cy="100584"/>
+            </a:xfrm>
+            <a:prstGeom prst="ellipse">
+              <a:avLst/>
+            </a:prstGeom>
+            <a:solidFill>
+              <a:srgbClr val="0D0D0D"/>
+            </a:solidFill>
+            <a:ln>
+              <a:solidFill>
+                <a:schemeClr val="tx1"/>
+              </a:solidFill>
+            </a:ln>
+          </p:spPr>
+          <p:style>
+            <a:lnRef idx="1">
+              <a:schemeClr val="accent1"/>
+            </a:lnRef>
+            <a:fillRef idx="3">
+              <a:schemeClr val="accent1"/>
+            </a:fillRef>
+            <a:effectRef idx="2">
+              <a:schemeClr val="accent1"/>
+            </a:effectRef>
+            <a:fontRef idx="minor">
+              <a:schemeClr val="lt1"/>
+            </a:fontRef>
+          </p:style>
+          <p:txBody>
+            <a:bodyPr rtlCol="0" anchor="ctr"/>
+            <a:lstStyle/>
+            <a:p>
+              <a:pPr algn="ctr"/>
+              <a:endParaRPr lang="en-US"/>
+            </a:p>
+          </p:txBody>
+        </p:sp>
+        <p:grpSp>
+          <p:nvGrpSpPr>
+            <p:cNvPr id="42" name="Group 41"/>
+            <p:cNvGrpSpPr/>
+            <p:nvPr/>
+          </p:nvGrpSpPr>
+          <p:grpSpPr>
+            <a:xfrm>
+              <a:off x="4809418" y="2693323"/>
+              <a:ext cx="816534" cy="869799"/>
+              <a:chOff x="3591860" y="3001471"/>
+              <a:chExt cx="816534" cy="869799"/>
+            </a:xfrm>
+          </p:grpSpPr>
+          <p:cxnSp>
+            <p:nvCxnSpPr>
+              <p:cNvPr id="71" name="Straight Arrow Connector 70"/>
+              <p:cNvCxnSpPr>
+                <a:endCxn id="66" idx="0"/>
+              </p:cNvCxnSpPr>
+              <p:nvPr/>
+            </p:nvCxnSpPr>
+            <p:spPr>
+              <a:xfrm flipV="1">
+                <a:off x="3591860" y="3428001"/>
+                <a:ext cx="647257" cy="443269"/>
+              </a:xfrm>
+              <a:prstGeom prst="straightConnector1">
+                <a:avLst/>
+              </a:prstGeom>
+              <a:ln>
+                <a:solidFill>
+                  <a:srgbClr val="000000"/>
+                </a:solidFill>
+                <a:tailEnd type="arrow"/>
+              </a:ln>
+            </p:spPr>
+            <p:style>
+              <a:lnRef idx="2">
+                <a:schemeClr val="accent1"/>
+              </a:lnRef>
+              <a:fillRef idx="0">
+                <a:schemeClr val="accent1"/>
+              </a:fillRef>
+              <a:effectRef idx="1">
+                <a:schemeClr val="accent1"/>
+              </a:effectRef>
+              <a:fontRef idx="minor">
+                <a:schemeClr val="tx1"/>
+              </a:fontRef>
+            </p:style>
+          </p:cxnSp>
+          <p:sp>
+            <p:nvSpPr>
+              <p:cNvPr id="72" name="TextBox 71"/>
+              <p:cNvSpPr txBox="1"/>
+              <p:nvPr/>
+            </p:nvSpPr>
+            <p:spPr>
+              <a:xfrm>
+                <a:off x="4069840" y="3001471"/>
+                <a:ext cx="338554" cy="461665"/>
+              </a:xfrm>
+              <a:prstGeom prst="rect">
+                <a:avLst/>
+              </a:prstGeom>
+              <a:noFill/>
+            </p:spPr>
+            <p:txBody>
+              <a:bodyPr wrap="none" rtlCol="0">
+                <a:spAutoFit/>
+              </a:bodyPr>
+              <a:lstStyle/>
+              <a:p>
+                <a:r>
+                  <a:rPr lang="en-US" sz="2400" dirty="0" smtClean="0">
+                    <a:latin typeface="Symbol" charset="2"/>
+                    <a:cs typeface="Symbol" charset="2"/>
+                  </a:rPr>
+                  <a:t>x</a:t>
+                </a:r>
+                <a:endParaRPr lang="en-US" sz="2400" dirty="0">
+                  <a:latin typeface="Symbol" charset="2"/>
+                  <a:cs typeface="Symbol" charset="2"/>
+                </a:endParaRPr>
+              </a:p>
+            </p:txBody>
+          </p:sp>
+        </p:grpSp>
+        <p:grpSp>
+          <p:nvGrpSpPr>
+            <p:cNvPr id="43" name="Group 42"/>
+            <p:cNvGrpSpPr/>
+            <p:nvPr/>
+          </p:nvGrpSpPr>
+          <p:grpSpPr>
+            <a:xfrm>
+              <a:off x="4778942" y="3563122"/>
+              <a:ext cx="1300579" cy="672818"/>
+              <a:chOff x="3561384" y="3871270"/>
+              <a:chExt cx="1300579" cy="672818"/>
+            </a:xfrm>
+          </p:grpSpPr>
+          <p:cxnSp>
+            <p:nvCxnSpPr>
+              <p:cNvPr id="69" name="Straight Arrow Connector 68"/>
+              <p:cNvCxnSpPr/>
+              <p:nvPr/>
+            </p:nvCxnSpPr>
+            <p:spPr>
+              <a:xfrm>
+                <a:off x="3561384" y="3871270"/>
+                <a:ext cx="1060908" cy="664792"/>
+              </a:xfrm>
+              <a:prstGeom prst="straightConnector1">
+                <a:avLst/>
+              </a:prstGeom>
+              <a:ln>
+                <a:solidFill>
+                  <a:srgbClr val="000000"/>
+                </a:solidFill>
+                <a:prstDash val="dot"/>
+                <a:tailEnd type="arrow"/>
+              </a:ln>
+            </p:spPr>
+            <p:style>
+              <a:lnRef idx="2">
+                <a:schemeClr val="accent1"/>
+              </a:lnRef>
+              <a:fillRef idx="0">
+                <a:schemeClr val="accent1"/>
+              </a:fillRef>
+              <a:effectRef idx="1">
+                <a:schemeClr val="accent1"/>
+              </a:effectRef>
+              <a:fontRef idx="minor">
+                <a:schemeClr val="tx1"/>
+              </a:fontRef>
+            </p:style>
+          </p:cxnSp>
+          <p:sp>
+            <p:nvSpPr>
+              <p:cNvPr id="70" name="Rectangle 69"/>
+              <p:cNvSpPr/>
+              <p:nvPr/>
+            </p:nvSpPr>
+            <p:spPr>
+              <a:xfrm>
+                <a:off x="4472113" y="4082423"/>
+                <a:ext cx="389850" cy="461665"/>
+              </a:xfrm>
+              <a:prstGeom prst="rect">
+                <a:avLst/>
+              </a:prstGeom>
+            </p:spPr>
+            <p:txBody>
+              <a:bodyPr wrap="none">
+                <a:spAutoFit/>
+              </a:bodyPr>
+              <a:lstStyle/>
+              <a:p>
+                <a:r>
+                  <a:rPr lang="en-US" sz="2400" dirty="0" smtClean="0">
+                    <a:latin typeface="Symbol" charset="2"/>
+                    <a:cs typeface="Symbol" charset="2"/>
+                  </a:rPr>
+                  <a:t>w</a:t>
+                </a:r>
+                <a:endParaRPr lang="en-US" sz="2400" dirty="0">
+                  <a:latin typeface="Symbol" charset="2"/>
+                  <a:cs typeface="Symbol" charset="2"/>
+                </a:endParaRPr>
+              </a:p>
+            </p:txBody>
+          </p:sp>
+        </p:grpSp>
+        <p:cxnSp>
+          <p:nvCxnSpPr>
+            <p:cNvPr id="44" name="Straight Arrow Connector 43"/>
+            <p:cNvCxnSpPr/>
+            <p:nvPr/>
+          </p:nvCxnSpPr>
+          <p:spPr>
+            <a:xfrm flipV="1">
+              <a:off x="4778942" y="3164292"/>
+              <a:ext cx="0" cy="271759"/>
+            </a:xfrm>
+            <a:prstGeom prst="straightConnector1">
+              <a:avLst/>
+            </a:prstGeom>
+            <a:ln w="57150" cmpd="sng">
+              <a:solidFill>
+                <a:srgbClr val="0D0D0D"/>
+              </a:solidFill>
+              <a:headEnd type="none"/>
+              <a:tailEnd type="triangle"/>
+            </a:ln>
+          </p:spPr>
+          <p:style>
+            <a:lnRef idx="2">
+              <a:schemeClr val="accent1"/>
+            </a:lnRef>
+            <a:fillRef idx="0">
+              <a:schemeClr val="accent1"/>
+            </a:fillRef>
+            <a:effectRef idx="1">
+              <a:schemeClr val="accent1"/>
+            </a:effectRef>
+            <a:fontRef idx="minor">
+              <a:schemeClr val="tx1"/>
+            </a:fontRef>
+          </p:style>
+        </p:cxnSp>
+        <p:grpSp>
+          <p:nvGrpSpPr>
+            <p:cNvPr id="45" name="Group 44"/>
+            <p:cNvGrpSpPr/>
+            <p:nvPr/>
+          </p:nvGrpSpPr>
+          <p:grpSpPr>
+            <a:xfrm>
+              <a:off x="4447601" y="2355571"/>
+              <a:ext cx="331341" cy="1207551"/>
+              <a:chOff x="4447601" y="2355571"/>
+              <a:chExt cx="331341" cy="1207551"/>
+            </a:xfrm>
+          </p:grpSpPr>
+          <p:sp>
+            <p:nvSpPr>
+              <p:cNvPr id="67" name="Rectangle 66"/>
+              <p:cNvSpPr/>
+              <p:nvPr/>
+            </p:nvSpPr>
+            <p:spPr>
+              <a:xfrm>
+                <a:off x="4447601" y="2355571"/>
+                <a:ext cx="331341" cy="461665"/>
+              </a:xfrm>
+              <a:prstGeom prst="rect">
+                <a:avLst/>
+              </a:prstGeom>
+            </p:spPr>
+            <p:txBody>
+              <a:bodyPr wrap="none">
+                <a:spAutoFit/>
+              </a:bodyPr>
+              <a:lstStyle/>
+              <a:p>
+                <a:pPr lvl="0"/>
+                <a:r>
+                  <a:rPr lang="en-US" sz="2400" dirty="0" smtClean="0">
+                    <a:solidFill>
+                      <a:prstClr val="black"/>
+                    </a:solidFill>
+                    <a:latin typeface="Symbol" charset="2"/>
+                    <a:cs typeface="Symbol" charset="2"/>
+                  </a:rPr>
+                  <a:t>y</a:t>
+                </a:r>
+                <a:endParaRPr lang="en-US" sz="2400" dirty="0">
+                  <a:solidFill>
+                    <a:prstClr val="black"/>
+                  </a:solidFill>
+                  <a:latin typeface="Symbol" charset="2"/>
+                  <a:cs typeface="Symbol" charset="2"/>
+                </a:endParaRPr>
+              </a:p>
+            </p:txBody>
+          </p:sp>
+          <p:cxnSp>
+            <p:nvCxnSpPr>
+              <p:cNvPr id="68" name="Straight Arrow Connector 67"/>
+              <p:cNvCxnSpPr/>
+              <p:nvPr/>
+            </p:nvCxnSpPr>
+            <p:spPr>
+              <a:xfrm flipV="1">
+                <a:off x="4778942" y="2611873"/>
+                <a:ext cx="0" cy="951249"/>
+              </a:xfrm>
+              <a:prstGeom prst="straightConnector1">
+                <a:avLst/>
+              </a:prstGeom>
+              <a:ln>
+                <a:solidFill>
+                  <a:srgbClr val="000000"/>
+                </a:solidFill>
+                <a:tailEnd type="arrow"/>
+              </a:ln>
+            </p:spPr>
+            <p:style>
+              <a:lnRef idx="2">
+                <a:schemeClr val="accent1"/>
+              </a:lnRef>
+              <a:fillRef idx="0">
+                <a:schemeClr val="accent1"/>
+              </a:fillRef>
+              <a:effectRef idx="1">
+                <a:schemeClr val="accent1"/>
+              </a:effectRef>
+              <a:fontRef idx="minor">
+                <a:schemeClr val="tx1"/>
+              </a:fontRef>
+            </p:style>
+          </p:cxnSp>
+        </p:grpSp>
+        <p:grpSp>
+          <p:nvGrpSpPr>
+            <p:cNvPr id="46" name="Group 45"/>
+            <p:cNvGrpSpPr/>
+            <p:nvPr/>
+          </p:nvGrpSpPr>
+          <p:grpSpPr>
+            <a:xfrm>
+              <a:off x="4809417" y="3119853"/>
+              <a:ext cx="1053529" cy="646455"/>
+              <a:chOff x="4809417" y="3119853"/>
+              <a:chExt cx="1053529" cy="646455"/>
+            </a:xfrm>
+          </p:grpSpPr>
+          <p:grpSp>
+            <p:nvGrpSpPr>
+              <p:cNvPr id="48" name="Group 47"/>
+              <p:cNvGrpSpPr/>
+              <p:nvPr/>
+            </p:nvGrpSpPr>
+            <p:grpSpPr>
+              <a:xfrm>
+                <a:off x="4809417" y="3119853"/>
+                <a:ext cx="910729" cy="646455"/>
+                <a:chOff x="3591859" y="3428001"/>
+                <a:chExt cx="910729" cy="646455"/>
+              </a:xfrm>
+            </p:grpSpPr>
+            <p:cxnSp>
+              <p:nvCxnSpPr>
+                <p:cNvPr id="65" name="Straight Arrow Connector 64"/>
+                <p:cNvCxnSpPr/>
+                <p:nvPr/>
+              </p:nvCxnSpPr>
+              <p:spPr>
+                <a:xfrm>
+                  <a:off x="3591859" y="3889666"/>
+                  <a:ext cx="910729" cy="184790"/>
+                </a:xfrm>
+                <a:prstGeom prst="straightConnector1">
+                  <a:avLst/>
+                </a:prstGeom>
+                <a:ln>
+                  <a:solidFill>
+                    <a:srgbClr val="000000"/>
+                  </a:solidFill>
+                  <a:tailEnd type="arrow"/>
+                </a:ln>
+              </p:spPr>
+              <p:style>
+                <a:lnRef idx="2">
+                  <a:schemeClr val="accent1"/>
+                </a:lnRef>
+                <a:fillRef idx="0">
+                  <a:schemeClr val="accent1"/>
+                </a:fillRef>
+                <a:effectRef idx="1">
+                  <a:schemeClr val="accent1"/>
+                </a:effectRef>
+                <a:fontRef idx="minor">
+                  <a:schemeClr val="tx1"/>
+                </a:fontRef>
+              </p:style>
+            </p:cxnSp>
+            <p:sp>
+              <p:nvSpPr>
+                <p:cNvPr id="66" name="TextBox 65"/>
+                <p:cNvSpPr txBox="1"/>
+                <p:nvPr/>
+              </p:nvSpPr>
+              <p:spPr>
+                <a:xfrm>
+                  <a:off x="4146784" y="3428001"/>
+                  <a:ext cx="184666" cy="461665"/>
+                </a:xfrm>
+                <a:prstGeom prst="rect">
+                  <a:avLst/>
+                </a:prstGeom>
+                <a:noFill/>
+              </p:spPr>
+              <p:txBody>
+                <a:bodyPr wrap="none" rtlCol="0">
+                  <a:spAutoFit/>
+                </a:bodyPr>
+                <a:lstStyle/>
+                <a:p>
+                  <a:endParaRPr lang="en-US" sz="2400" dirty="0">
+                    <a:latin typeface="Symbol" charset="2"/>
+                    <a:cs typeface="Symbol" charset="2"/>
+                  </a:endParaRPr>
+                </a:p>
+              </p:txBody>
+            </p:sp>
+          </p:grpSp>
+          <p:sp>
+            <p:nvSpPr>
+              <p:cNvPr id="49" name="Rectangle 48"/>
+              <p:cNvSpPr/>
+              <p:nvPr/>
+            </p:nvSpPr>
+            <p:spPr>
+              <a:xfrm>
+                <a:off x="5531605" y="3284159"/>
+                <a:ext cx="331341" cy="461665"/>
+              </a:xfrm>
+              <a:prstGeom prst="rect">
+                <a:avLst/>
+              </a:prstGeom>
+            </p:spPr>
+            <p:txBody>
+              <a:bodyPr wrap="none">
+                <a:spAutoFit/>
+              </a:bodyPr>
+              <a:lstStyle/>
+              <a:p>
+                <a:pPr lvl="0"/>
+                <a:r>
+                  <a:rPr lang="en-US" sz="2400" dirty="0" smtClean="0">
+                    <a:solidFill>
+                      <a:prstClr val="black"/>
+                    </a:solidFill>
+                    <a:latin typeface="Symbol" charset="2"/>
+                    <a:cs typeface="Symbol" charset="2"/>
+                  </a:rPr>
+                  <a:t>z</a:t>
+                </a:r>
+                <a:endParaRPr lang="en-US" sz="2400" dirty="0">
+                  <a:solidFill>
+                    <a:prstClr val="black"/>
+                  </a:solidFill>
+                  <a:latin typeface="Symbol" charset="2"/>
+                  <a:cs typeface="Symbol" charset="2"/>
+                </a:endParaRPr>
+              </a:p>
+            </p:txBody>
+          </p:sp>
+        </p:grpSp>
+        <p:sp>
+          <p:nvSpPr>
+            <p:cNvPr id="47" name="Oval 46"/>
+            <p:cNvSpPr/>
+            <p:nvPr/>
+          </p:nvSpPr>
+          <p:spPr>
+            <a:xfrm>
+              <a:off x="4650105" y="3436051"/>
+              <a:ext cx="245316" cy="245316"/>
+            </a:xfrm>
+            <a:prstGeom prst="ellipse">
+              <a:avLst/>
+            </a:prstGeom>
+            <a:gradFill flip="none" rotWithShape="1">
+              <a:gsLst>
+                <a:gs pos="0">
+                  <a:schemeClr val="bg1">
+                    <a:lumMod val="50000"/>
+                  </a:schemeClr>
+                </a:gs>
+                <a:gs pos="100000">
+                  <a:schemeClr val="bg1"/>
+                </a:gs>
+              </a:gsLst>
+              <a:path path="circle">
+                <a:fillToRect l="100000" t="100000"/>
+              </a:path>
+              <a:tileRect r="-100000" b="-100000"/>
+            </a:gradFill>
+            <a:ln>
+              <a:solidFill>
+                <a:schemeClr val="tx1"/>
+              </a:solidFill>
+            </a:ln>
+          </p:spPr>
+          <p:style>
+            <a:lnRef idx="1">
+              <a:schemeClr val="accent1"/>
+            </a:lnRef>
+            <a:fillRef idx="3">
+              <a:schemeClr val="accent1"/>
+            </a:fillRef>
+            <a:effectRef idx="2">
+              <a:schemeClr val="accent1"/>
+            </a:effectRef>
+            <a:fontRef idx="minor">
+              <a:schemeClr val="lt1"/>
+            </a:fontRef>
+          </p:style>
+          <p:txBody>
+            <a:bodyPr rtlCol="0" anchor="ctr"/>
+            <a:lstStyle/>
+            <a:p>
+              <a:pPr algn="ctr"/>
+              <a:endParaRPr lang="en-US"/>
+            </a:p>
+          </p:txBody>
+        </p:sp>
+      </p:grpSp>
     </p:spTree>
     <p:extLst>
       <p:ext uri="{BB962C8B-B14F-4D97-AF65-F5344CB8AC3E}">
@@ -13044,10 +13082,6 @@
                   </a:rPr>
                   <a:t>w</a:t>
                 </a:r>
-                <a:endParaRPr lang="en-US" sz="2400" dirty="0">
-                  <a:latin typeface="Symbol" charset="2"/>
-                  <a:cs typeface="Symbol" charset="2"/>
-                </a:endParaRPr>
               </a:p>
             </p:txBody>
           </p:sp>
@@ -13620,10 +13654,6 @@
               </a:rPr>
               <a:t>Special:  ±u, ±v</a:t>
             </a:r>
-            <a:endParaRPr lang="en-US" sz="2400" dirty="0" smtClean="0">
-              <a:latin typeface="Gill Sans MT"/>
-              <a:cs typeface="Gill Sans MT"/>
-            </a:endParaRPr>
           </a:p>
         </p:txBody>
       </p:sp>

</xml_diff>

<commit_message>
update the related documents
</commit_message>
<xml_diff>
--- a/docs/motion.pptx
+++ b/docs/motion.pptx
@@ -5,18 +5,17 @@
     <p:sldMasterId id="2147483648" r:id="rId1"/>
   </p:sldMasterIdLst>
   <p:notesMasterIdLst>
-    <p:notesMasterId r:id="rId11"/>
+    <p:notesMasterId r:id="rId10"/>
   </p:notesMasterIdLst>
   <p:sldIdLst>
     <p:sldId id="257" r:id="rId2"/>
     <p:sldId id="260" r:id="rId3"/>
     <p:sldId id="261" r:id="rId4"/>
-    <p:sldId id="258" r:id="rId5"/>
-    <p:sldId id="264" r:id="rId6"/>
-    <p:sldId id="262" r:id="rId7"/>
-    <p:sldId id="263" r:id="rId8"/>
-    <p:sldId id="265" r:id="rId9"/>
-    <p:sldId id="266" r:id="rId10"/>
+    <p:sldId id="264" r:id="rId5"/>
+    <p:sldId id="262" r:id="rId6"/>
+    <p:sldId id="263" r:id="rId7"/>
+    <p:sldId id="265" r:id="rId8"/>
+    <p:sldId id="266" r:id="rId9"/>
   </p:sldIdLst>
   <p:sldSz cx="9144000" cy="6858000" type="screen4x3"/>
   <p:notesSz cx="6858000" cy="9144000"/>
@@ -617,91 +616,7 @@
           <a:p>
             <a:fld id="{581E570C-5B74-DA42-9606-4B699AA513A4}" type="slidenum">
               <a:rPr lang="en-US" smtClean="0"/>
-              <a:t>4</a:t>
-            </a:fld>
-            <a:endParaRPr lang="en-US"/>
-          </a:p>
-        </p:txBody>
-      </p:sp>
-    </p:spTree>
-    <p:extLst>
-      <p:ext uri="{BB962C8B-B14F-4D97-AF65-F5344CB8AC3E}">
-        <p14:creationId xmlns:p14="http://schemas.microsoft.com/office/powerpoint/2010/main" val="1661670680"/>
-      </p:ext>
-    </p:extLst>
-  </p:cSld>
-  <p:clrMapOvr>
-    <a:masterClrMapping/>
-  </p:clrMapOvr>
-</p:notes>
-</file>
-
-<file path=ppt/notesSlides/notesSlide3.xml><?xml version="1.0" encoding="utf-8"?>
-<p:notes xmlns:a="http://schemas.openxmlformats.org/drawingml/2006/main" xmlns:r="http://schemas.openxmlformats.org/officeDocument/2006/relationships" xmlns:p="http://schemas.openxmlformats.org/presentationml/2006/main">
-  <p:cSld>
-    <p:spTree>
-      <p:nvGrpSpPr>
-        <p:cNvPr id="1" name=""/>
-        <p:cNvGrpSpPr/>
-        <p:nvPr/>
-      </p:nvGrpSpPr>
-      <p:grpSpPr>
-        <a:xfrm>
-          <a:off x="0" y="0"/>
-          <a:ext cx="0" cy="0"/>
-          <a:chOff x="0" y="0"/>
-          <a:chExt cx="0" cy="0"/>
-        </a:xfrm>
-      </p:grpSpPr>
-      <p:sp>
-        <p:nvSpPr>
-          <p:cNvPr id="2" name="Slide Image Placeholder 1"/>
-          <p:cNvSpPr>
-            <a:spLocks noGrp="1" noRot="1" noChangeAspect="1"/>
-          </p:cNvSpPr>
-          <p:nvPr>
-            <p:ph type="sldImg"/>
-          </p:nvPr>
-        </p:nvSpPr>
-        <p:spPr/>
-      </p:sp>
-      <p:sp>
-        <p:nvSpPr>
-          <p:cNvPr id="3" name="Notes Placeholder 2"/>
-          <p:cNvSpPr>
-            <a:spLocks noGrp="1"/>
-          </p:cNvSpPr>
-          <p:nvPr>
-            <p:ph type="body" idx="1"/>
-          </p:nvPr>
-        </p:nvSpPr>
-        <p:spPr/>
-        <p:txBody>
-          <a:bodyPr/>
-          <a:lstStyle/>
-          <a:p>
-            <a:endParaRPr lang="en-US" dirty="0"/>
-          </a:p>
-        </p:txBody>
-      </p:sp>
-      <p:sp>
-        <p:nvSpPr>
-          <p:cNvPr id="4" name="Slide Number Placeholder 3"/>
-          <p:cNvSpPr>
-            <a:spLocks noGrp="1"/>
-          </p:cNvSpPr>
-          <p:nvPr>
-            <p:ph type="sldNum" sz="quarter" idx="10"/>
-          </p:nvPr>
-        </p:nvSpPr>
-        <p:spPr/>
-        <p:txBody>
-          <a:bodyPr/>
-          <a:lstStyle/>
-          <a:p>
-            <a:fld id="{581E570C-5B74-DA42-9606-4B699AA513A4}" type="slidenum">
-              <a:rPr lang="en-US" smtClean="0"/>
-              <a:t>7</a:t>
+              <a:t>6</a:t>
             </a:fld>
             <a:endParaRPr lang="en-US"/>
           </a:p>
@@ -7937,12 +7852,7 @@
             <p:ph type="title"/>
           </p:nvPr>
         </p:nvSpPr>
-        <p:spPr>
-          <a:xfrm>
-            <a:off x="457200" y="353552"/>
-            <a:ext cx="8229600" cy="1143000"/>
-          </a:xfrm>
-        </p:spPr>
+        <p:spPr/>
         <p:txBody>
           <a:bodyPr/>
           <a:lstStyle/>
@@ -7955,285 +7865,153 @@
           </a:p>
         </p:txBody>
       </p:sp>
+      <p:sp>
+        <p:nvSpPr>
+          <p:cNvPr id="3" name="Content Placeholder 2"/>
+          <p:cNvSpPr>
+            <a:spLocks noGrp="1"/>
+          </p:cNvSpPr>
+          <p:nvPr>
+            <p:ph idx="1"/>
+          </p:nvPr>
+        </p:nvSpPr>
+        <p:spPr/>
+        <p:txBody>
+          <a:bodyPr/>
+          <a:lstStyle/>
+          <a:p>
+            <a:r>
+              <a:rPr lang="en-US" dirty="0" smtClean="0"/>
+              <a:t>Linear Motion</a:t>
+            </a:r>
+            <a:endParaRPr lang="en-US" dirty="0"/>
+          </a:p>
+        </p:txBody>
+      </p:sp>
+      <p:sp>
+        <p:nvSpPr>
+          <p:cNvPr id="38" name="TextBox 37"/>
+          <p:cNvSpPr txBox="1"/>
+          <p:nvPr/>
+        </p:nvSpPr>
+        <p:spPr>
+          <a:xfrm>
+            <a:off x="4497980" y="5664498"/>
+            <a:ext cx="4447552" cy="461665"/>
+          </a:xfrm>
+          <a:prstGeom prst="rect">
+            <a:avLst/>
+          </a:prstGeom>
+          <a:noFill/>
+        </p:spPr>
+        <p:txBody>
+          <a:bodyPr wrap="none" rtlCol="0">
+            <a:spAutoFit/>
+          </a:bodyPr>
+          <a:lstStyle/>
+          <a:p>
+            <a:r>
+              <a:rPr lang="en-US" sz="2400" dirty="0" smtClean="0">
+                <a:latin typeface="Gill Sans MT"/>
+                <a:cs typeface="Gill Sans MT"/>
+              </a:rPr>
+              <a:t>Sample motion </a:t>
+            </a:r>
+            <a:r>
+              <a:rPr lang="en-US" sz="2400" dirty="0" smtClean="0">
+                <a:latin typeface="Gill Sans MT"/>
+                <a:cs typeface="Gill Sans MT"/>
+              </a:rPr>
+              <a:t>directions in </a:t>
+            </a:r>
+            <a:r>
+              <a:rPr lang="en-US" sz="2400" dirty="0" smtClean="0">
+                <a:latin typeface="Gill Sans MT"/>
+                <a:cs typeface="Gill Sans MT"/>
+              </a:rPr>
+              <a:t>space</a:t>
+            </a:r>
+            <a:endParaRPr lang="en-US" sz="2400" dirty="0">
+              <a:latin typeface="Gill Sans MT"/>
+              <a:cs typeface="Gill Sans MT"/>
+            </a:endParaRPr>
+          </a:p>
+        </p:txBody>
+      </p:sp>
+      <p:pic>
+        <p:nvPicPr>
+          <p:cNvPr id="39" name="Picture 38"/>
+          <p:cNvPicPr>
+            <a:picLocks noChangeAspect="1"/>
+          </p:cNvPicPr>
+          <p:nvPr/>
+        </p:nvPicPr>
+        <p:blipFill>
+          <a:blip r:embed="rId2"/>
+          <a:stretch>
+            <a:fillRect/>
+          </a:stretch>
+        </p:blipFill>
+        <p:spPr>
+          <a:xfrm>
+            <a:off x="4262403" y="3085623"/>
+            <a:ext cx="4318000" cy="2019774"/>
+          </a:xfrm>
+          <a:prstGeom prst="rect">
+            <a:avLst/>
+          </a:prstGeom>
+        </p:spPr>
+      </p:pic>
       <p:grpSp>
         <p:nvGrpSpPr>
-          <p:cNvPr id="4" name="Group 3"/>
+          <p:cNvPr id="57" name="Group 56"/>
           <p:cNvGrpSpPr/>
           <p:nvPr/>
         </p:nvGrpSpPr>
         <p:grpSpPr>
           <a:xfrm>
-            <a:off x="301920" y="3185576"/>
-            <a:ext cx="2164686" cy="1976955"/>
-            <a:chOff x="2280124" y="851385"/>
-            <a:chExt cx="2164686" cy="1976955"/>
+            <a:off x="397910" y="2839524"/>
+            <a:ext cx="3272143" cy="2265873"/>
+            <a:chOff x="-340446" y="2493341"/>
+            <a:chExt cx="3272143" cy="2265873"/>
           </a:xfrm>
         </p:grpSpPr>
-        <p:grpSp>
-          <p:nvGrpSpPr>
-            <p:cNvPr id="5" name="Group 4"/>
-            <p:cNvGrpSpPr/>
-            <p:nvPr/>
-          </p:nvGrpSpPr>
-          <p:grpSpPr>
-            <a:xfrm>
-              <a:off x="2467744" y="1096701"/>
-              <a:ext cx="1731750" cy="1515183"/>
-              <a:chOff x="4098475" y="1082271"/>
-              <a:chExt cx="1731750" cy="1515183"/>
-            </a:xfrm>
-          </p:grpSpPr>
-          <p:cxnSp>
-            <p:nvCxnSpPr>
-              <p:cNvPr id="13" name="Straight Arrow Connector 12"/>
-              <p:cNvCxnSpPr/>
-              <p:nvPr/>
-            </p:nvCxnSpPr>
-            <p:spPr>
-              <a:xfrm flipH="1">
-                <a:off x="4098475" y="2142900"/>
-                <a:ext cx="533902" cy="454554"/>
-              </a:xfrm>
-              <a:prstGeom prst="straightConnector1">
-                <a:avLst/>
-              </a:prstGeom>
-              <a:ln>
-                <a:solidFill>
-                  <a:srgbClr val="000000"/>
-                </a:solidFill>
-                <a:tailEnd type="arrow"/>
-              </a:ln>
-            </p:spPr>
-            <p:style>
-              <a:lnRef idx="2">
-                <a:schemeClr val="accent1"/>
-              </a:lnRef>
-              <a:fillRef idx="0">
-                <a:schemeClr val="accent1"/>
-              </a:fillRef>
-              <a:effectRef idx="1">
-                <a:schemeClr val="accent1"/>
-              </a:effectRef>
-              <a:fontRef idx="minor">
-                <a:schemeClr val="tx1"/>
-              </a:fontRef>
-            </p:style>
-          </p:cxnSp>
-          <p:cxnSp>
-            <p:nvCxnSpPr>
-              <p:cNvPr id="14" name="Straight Arrow Connector 13"/>
-              <p:cNvCxnSpPr/>
-              <p:nvPr/>
-            </p:nvCxnSpPr>
-            <p:spPr>
-              <a:xfrm>
-                <a:off x="4632375" y="2142902"/>
-                <a:ext cx="1197850" cy="0"/>
-              </a:xfrm>
-              <a:prstGeom prst="straightConnector1">
-                <a:avLst/>
-              </a:prstGeom>
-              <a:ln>
-                <a:solidFill>
-                  <a:srgbClr val="000000"/>
-                </a:solidFill>
-                <a:tailEnd type="arrow"/>
-              </a:ln>
-            </p:spPr>
-            <p:style>
-              <a:lnRef idx="2">
-                <a:schemeClr val="accent1"/>
-              </a:lnRef>
-              <a:fillRef idx="0">
-                <a:schemeClr val="accent1"/>
-              </a:fillRef>
-              <a:effectRef idx="1">
-                <a:schemeClr val="accent1"/>
-              </a:effectRef>
-              <a:fontRef idx="minor">
-                <a:schemeClr val="tx1"/>
-              </a:fontRef>
-            </p:style>
-          </p:cxnSp>
-          <p:cxnSp>
-            <p:nvCxnSpPr>
-              <p:cNvPr id="15" name="Straight Arrow Connector 14"/>
-              <p:cNvCxnSpPr/>
-              <p:nvPr/>
-            </p:nvCxnSpPr>
-            <p:spPr>
-              <a:xfrm flipV="1">
-                <a:off x="4639561" y="1082271"/>
-                <a:ext cx="7188" cy="1060629"/>
-              </a:xfrm>
-              <a:prstGeom prst="straightConnector1">
-                <a:avLst/>
-              </a:prstGeom>
-              <a:ln>
-                <a:solidFill>
-                  <a:srgbClr val="000000"/>
-                </a:solidFill>
-                <a:tailEnd type="arrow"/>
-              </a:ln>
-            </p:spPr>
-            <p:style>
-              <a:lnRef idx="2">
-                <a:schemeClr val="accent1"/>
-              </a:lnRef>
-              <a:fillRef idx="0">
-                <a:schemeClr val="accent1"/>
-              </a:fillRef>
-              <a:effectRef idx="1">
-                <a:schemeClr val="accent1"/>
-              </a:effectRef>
-              <a:fontRef idx="minor">
-                <a:schemeClr val="tx1"/>
-              </a:fontRef>
-            </p:style>
-          </p:cxnSp>
-          <p:cxnSp>
-            <p:nvCxnSpPr>
-              <p:cNvPr id="16" name="Straight Arrow Connector 15"/>
-              <p:cNvCxnSpPr/>
-              <p:nvPr/>
-            </p:nvCxnSpPr>
-            <p:spPr>
-              <a:xfrm flipV="1">
-                <a:off x="4646749" y="1818218"/>
-                <a:ext cx="649519" cy="324683"/>
-              </a:xfrm>
-              <a:prstGeom prst="straightConnector1">
-                <a:avLst/>
-              </a:prstGeom>
-              <a:ln>
-                <a:solidFill>
-                  <a:srgbClr val="000000"/>
-                </a:solidFill>
-                <a:tailEnd type="arrow"/>
-              </a:ln>
-            </p:spPr>
-            <p:style>
-              <a:lnRef idx="2">
-                <a:schemeClr val="accent1"/>
-              </a:lnRef>
-              <a:fillRef idx="0">
-                <a:schemeClr val="accent1"/>
-              </a:fillRef>
-              <a:effectRef idx="1">
-                <a:schemeClr val="accent1"/>
-              </a:effectRef>
-              <a:fontRef idx="minor">
-                <a:schemeClr val="tx1"/>
-              </a:fontRef>
-            </p:style>
-          </p:cxnSp>
-          <p:cxnSp>
-            <p:nvCxnSpPr>
-              <p:cNvPr id="17" name="Straight Arrow Connector 16"/>
-              <p:cNvCxnSpPr/>
-              <p:nvPr/>
-            </p:nvCxnSpPr>
-            <p:spPr>
-              <a:xfrm>
-                <a:off x="4646749" y="2142903"/>
-                <a:ext cx="332032" cy="353539"/>
-              </a:xfrm>
-              <a:prstGeom prst="straightConnector1">
-                <a:avLst/>
-              </a:prstGeom>
-              <a:ln>
-                <a:solidFill>
-                  <a:srgbClr val="000000"/>
-                </a:solidFill>
-                <a:tailEnd type="arrow"/>
-              </a:ln>
-            </p:spPr>
-            <p:style>
-              <a:lnRef idx="2">
-                <a:schemeClr val="accent1"/>
-              </a:lnRef>
-              <a:fillRef idx="0">
-                <a:schemeClr val="accent1"/>
-              </a:fillRef>
-              <a:effectRef idx="1">
-                <a:schemeClr val="accent1"/>
-              </a:effectRef>
-              <a:fontRef idx="minor">
-                <a:schemeClr val="tx1"/>
-              </a:fontRef>
-            </p:style>
-          </p:cxnSp>
-          <p:cxnSp>
-            <p:nvCxnSpPr>
-              <p:cNvPr id="18" name="Straight Arrow Connector 17"/>
-              <p:cNvCxnSpPr/>
-              <p:nvPr/>
-            </p:nvCxnSpPr>
-            <p:spPr>
-              <a:xfrm flipH="1" flipV="1">
-                <a:off x="4213925" y="1688345"/>
-                <a:ext cx="418450" cy="454558"/>
-              </a:xfrm>
-              <a:prstGeom prst="straightConnector1">
-                <a:avLst/>
-              </a:prstGeom>
-              <a:ln>
-                <a:solidFill>
-                  <a:srgbClr val="000000"/>
-                </a:solidFill>
-                <a:tailEnd type="arrow"/>
-              </a:ln>
-            </p:spPr>
-            <p:style>
-              <a:lnRef idx="2">
-                <a:schemeClr val="accent1"/>
-              </a:lnRef>
-              <a:fillRef idx="0">
-                <a:schemeClr val="accent1"/>
-              </a:fillRef>
-              <a:effectRef idx="1">
-                <a:schemeClr val="accent1"/>
-              </a:effectRef>
-              <a:fontRef idx="minor">
-                <a:schemeClr val="tx1"/>
-              </a:fontRef>
-            </p:style>
-          </p:cxnSp>
-        </p:grpSp>
         <p:sp>
           <p:nvSpPr>
-            <p:cNvPr id="6" name="Oval 5"/>
+            <p:cNvPr id="58" name="Parallelogram 57"/>
             <p:cNvSpPr/>
             <p:nvPr/>
           </p:nvSpPr>
           <p:spPr>
-            <a:xfrm>
-              <a:off x="2886228" y="2020242"/>
-              <a:ext cx="245316" cy="245316"/>
+            <a:xfrm rot="2211199">
+              <a:off x="-340446" y="3094135"/>
+              <a:ext cx="3272143" cy="1665079"/>
             </a:xfrm>
-            <a:prstGeom prst="ellipse">
-              <a:avLst/>
+            <a:prstGeom prst="parallelogram">
+              <a:avLst>
+                <a:gd name="adj" fmla="val 46281"/>
+              </a:avLst>
             </a:prstGeom>
             <a:gradFill flip="none" rotWithShape="1">
               <a:gsLst>
                 <a:gs pos="0">
                   <a:schemeClr val="bg1">
                     <a:lumMod val="50000"/>
+                    <a:alpha val="30000"/>
                   </a:schemeClr>
                 </a:gs>
                 <a:gs pos="100000">
-                  <a:schemeClr val="bg1"/>
+                  <a:schemeClr val="bg1">
+                    <a:lumMod val="95000"/>
+                    <a:alpha val="27000"/>
+                  </a:schemeClr>
                 </a:gs>
               </a:gsLst>
-              <a:path path="circle">
-                <a:fillToRect l="100000" t="100000"/>
-              </a:path>
-              <a:tileRect r="-100000" b="-100000"/>
+              <a:lin ang="16200000" scaled="0"/>
+              <a:tileRect/>
             </a:gradFill>
             <a:ln>
-              <a:solidFill>
-                <a:schemeClr val="tx1"/>
-              </a:solidFill>
+              <a:noFill/>
             </a:ln>
           </p:spPr>
           <p:style>
@@ -8261,721 +8039,7 @@
         </p:sp>
         <p:sp>
           <p:nvSpPr>
-            <p:cNvPr id="7" name="Oval 6"/>
-            <p:cNvSpPr/>
-            <p:nvPr/>
-          </p:nvSpPr>
-          <p:spPr>
-            <a:xfrm>
-              <a:off x="4199494" y="2020242"/>
-              <a:ext cx="245316" cy="245316"/>
-            </a:xfrm>
-            <a:prstGeom prst="ellipse">
-              <a:avLst/>
-            </a:prstGeom>
-            <a:solidFill>
-              <a:srgbClr val="BFBFBF"/>
-            </a:solidFill>
-            <a:ln>
-              <a:solidFill>
-                <a:schemeClr val="tx1"/>
-              </a:solidFill>
-              <a:prstDash val="dash"/>
-            </a:ln>
-          </p:spPr>
-          <p:style>
-            <a:lnRef idx="1">
-              <a:schemeClr val="accent1"/>
-            </a:lnRef>
-            <a:fillRef idx="3">
-              <a:schemeClr val="accent1"/>
-            </a:fillRef>
-            <a:effectRef idx="2">
-              <a:schemeClr val="accent1"/>
-            </a:effectRef>
-            <a:fontRef idx="minor">
-              <a:schemeClr val="lt1"/>
-            </a:fontRef>
-          </p:style>
-          <p:txBody>
-            <a:bodyPr rtlCol="0" anchor="ctr"/>
-            <a:lstStyle/>
-            <a:p>
-              <a:pPr algn="ctr"/>
-              <a:endParaRPr lang="en-US"/>
-            </a:p>
-          </p:txBody>
-        </p:sp>
-        <p:sp>
-          <p:nvSpPr>
-            <p:cNvPr id="8" name="Oval 7"/>
-            <p:cNvSpPr/>
-            <p:nvPr/>
-          </p:nvSpPr>
-          <p:spPr>
-            <a:xfrm>
-              <a:off x="3665537" y="1653151"/>
-              <a:ext cx="245316" cy="245316"/>
-            </a:xfrm>
-            <a:prstGeom prst="ellipse">
-              <a:avLst/>
-            </a:prstGeom>
-            <a:solidFill>
-              <a:srgbClr val="BFBFBF"/>
-            </a:solidFill>
-            <a:ln>
-              <a:solidFill>
-                <a:schemeClr val="tx1"/>
-              </a:solidFill>
-              <a:prstDash val="dash"/>
-            </a:ln>
-          </p:spPr>
-          <p:style>
-            <a:lnRef idx="1">
-              <a:schemeClr val="accent1"/>
-            </a:lnRef>
-            <a:fillRef idx="3">
-              <a:schemeClr val="accent1"/>
-            </a:fillRef>
-            <a:effectRef idx="2">
-              <a:schemeClr val="accent1"/>
-            </a:effectRef>
-            <a:fontRef idx="minor">
-              <a:schemeClr val="lt1"/>
-            </a:fontRef>
-          </p:style>
-          <p:txBody>
-            <a:bodyPr rtlCol="0" anchor="ctr"/>
-            <a:lstStyle/>
-            <a:p>
-              <a:pPr algn="ctr"/>
-              <a:endParaRPr lang="en-US"/>
-            </a:p>
-          </p:txBody>
-        </p:sp>
-        <p:sp>
-          <p:nvSpPr>
-            <p:cNvPr id="9" name="Oval 8"/>
-            <p:cNvSpPr/>
-            <p:nvPr/>
-          </p:nvSpPr>
-          <p:spPr>
-            <a:xfrm>
-              <a:off x="3319173" y="2489226"/>
-              <a:ext cx="245316" cy="245316"/>
-            </a:xfrm>
-            <a:prstGeom prst="ellipse">
-              <a:avLst/>
-            </a:prstGeom>
-            <a:solidFill>
-              <a:srgbClr val="BFBFBF"/>
-            </a:solidFill>
-            <a:ln>
-              <a:solidFill>
-                <a:schemeClr val="tx1"/>
-              </a:solidFill>
-              <a:prstDash val="dash"/>
-            </a:ln>
-          </p:spPr>
-          <p:style>
-            <a:lnRef idx="1">
-              <a:schemeClr val="accent1"/>
-            </a:lnRef>
-            <a:fillRef idx="3">
-              <a:schemeClr val="accent1"/>
-            </a:fillRef>
-            <a:effectRef idx="2">
-              <a:schemeClr val="accent1"/>
-            </a:effectRef>
-            <a:fontRef idx="minor">
-              <a:schemeClr val="lt1"/>
-            </a:fontRef>
-          </p:style>
-          <p:txBody>
-            <a:bodyPr rtlCol="0" anchor="ctr"/>
-            <a:lstStyle/>
-            <a:p>
-              <a:pPr algn="ctr"/>
-              <a:endParaRPr lang="en-US"/>
-            </a:p>
-          </p:txBody>
-        </p:sp>
-        <p:sp>
-          <p:nvSpPr>
-            <p:cNvPr id="10" name="Oval 9"/>
-            <p:cNvSpPr/>
-            <p:nvPr/>
-          </p:nvSpPr>
-          <p:spPr>
-            <a:xfrm>
-              <a:off x="2280124" y="2583024"/>
-              <a:ext cx="245316" cy="245316"/>
-            </a:xfrm>
-            <a:prstGeom prst="ellipse">
-              <a:avLst/>
-            </a:prstGeom>
-            <a:solidFill>
-              <a:srgbClr val="BFBFBF"/>
-            </a:solidFill>
-            <a:ln>
-              <a:solidFill>
-                <a:schemeClr val="tx1"/>
-              </a:solidFill>
-              <a:prstDash val="dash"/>
-            </a:ln>
-          </p:spPr>
-          <p:style>
-            <a:lnRef idx="1">
-              <a:schemeClr val="accent1"/>
-            </a:lnRef>
-            <a:fillRef idx="3">
-              <a:schemeClr val="accent1"/>
-            </a:fillRef>
-            <a:effectRef idx="2">
-              <a:schemeClr val="accent1"/>
-            </a:effectRef>
-            <a:fontRef idx="minor">
-              <a:schemeClr val="lt1"/>
-            </a:fontRef>
-          </p:style>
-          <p:txBody>
-            <a:bodyPr rtlCol="0" anchor="ctr"/>
-            <a:lstStyle/>
-            <a:p>
-              <a:pPr algn="ctr"/>
-              <a:endParaRPr lang="en-US"/>
-            </a:p>
-          </p:txBody>
-        </p:sp>
-        <p:sp>
-          <p:nvSpPr>
-            <p:cNvPr id="11" name="Oval 10"/>
-            <p:cNvSpPr/>
-            <p:nvPr/>
-          </p:nvSpPr>
-          <p:spPr>
-            <a:xfrm>
-              <a:off x="2352310" y="1457459"/>
-              <a:ext cx="245316" cy="245316"/>
-            </a:xfrm>
-            <a:prstGeom prst="ellipse">
-              <a:avLst/>
-            </a:prstGeom>
-            <a:solidFill>
-              <a:srgbClr val="BFBFBF"/>
-            </a:solidFill>
-            <a:ln>
-              <a:solidFill>
-                <a:schemeClr val="tx1"/>
-              </a:solidFill>
-              <a:prstDash val="dash"/>
-            </a:ln>
-          </p:spPr>
-          <p:style>
-            <a:lnRef idx="1">
-              <a:schemeClr val="accent1"/>
-            </a:lnRef>
-            <a:fillRef idx="3">
-              <a:schemeClr val="accent1"/>
-            </a:fillRef>
-            <a:effectRef idx="2">
-              <a:schemeClr val="accent1"/>
-            </a:effectRef>
-            <a:fontRef idx="minor">
-              <a:schemeClr val="lt1"/>
-            </a:fontRef>
-          </p:style>
-          <p:txBody>
-            <a:bodyPr rtlCol="0" anchor="ctr"/>
-            <a:lstStyle/>
-            <a:p>
-              <a:pPr algn="ctr"/>
-              <a:endParaRPr lang="en-US"/>
-            </a:p>
-          </p:txBody>
-        </p:sp>
-        <p:sp>
-          <p:nvSpPr>
-            <p:cNvPr id="12" name="Oval 11"/>
-            <p:cNvSpPr/>
-            <p:nvPr/>
-          </p:nvSpPr>
-          <p:spPr>
-            <a:xfrm>
-              <a:off x="2878988" y="851385"/>
-              <a:ext cx="245316" cy="245316"/>
-            </a:xfrm>
-            <a:prstGeom prst="ellipse">
-              <a:avLst/>
-            </a:prstGeom>
-            <a:solidFill>
-              <a:srgbClr val="BFBFBF"/>
-            </a:solidFill>
-            <a:ln>
-              <a:solidFill>
-                <a:schemeClr val="tx1"/>
-              </a:solidFill>
-              <a:prstDash val="dash"/>
-            </a:ln>
-          </p:spPr>
-          <p:style>
-            <a:lnRef idx="1">
-              <a:schemeClr val="accent1"/>
-            </a:lnRef>
-            <a:fillRef idx="3">
-              <a:schemeClr val="accent1"/>
-            </a:fillRef>
-            <a:effectRef idx="2">
-              <a:schemeClr val="accent1"/>
-            </a:effectRef>
-            <a:fontRef idx="minor">
-              <a:schemeClr val="lt1"/>
-            </a:fontRef>
-          </p:style>
-          <p:txBody>
-            <a:bodyPr rtlCol="0" anchor="ctr"/>
-            <a:lstStyle/>
-            <a:p>
-              <a:pPr algn="ctr"/>
-              <a:endParaRPr lang="en-US"/>
-            </a:p>
-          </p:txBody>
-        </p:sp>
-      </p:grpSp>
-      <p:sp>
-        <p:nvSpPr>
-          <p:cNvPr id="33" name="TextBox 32"/>
-          <p:cNvSpPr txBox="1"/>
-          <p:nvPr/>
-        </p:nvSpPr>
-        <p:spPr>
-          <a:xfrm>
-            <a:off x="410830" y="1965042"/>
-            <a:ext cx="1946867" cy="461665"/>
-          </a:xfrm>
-          <a:prstGeom prst="rect">
-            <a:avLst/>
-          </a:prstGeom>
-          <a:noFill/>
-        </p:spPr>
-        <p:txBody>
-          <a:bodyPr wrap="none" rtlCol="0">
-            <a:spAutoFit/>
-          </a:bodyPr>
-          <a:lstStyle/>
-          <a:p>
-            <a:r>
-              <a:rPr lang="en-US" sz="2400" dirty="0" smtClean="0">
-                <a:latin typeface="Gill Sans MT"/>
-                <a:cs typeface="Gill Sans MT"/>
-              </a:rPr>
-              <a:t>Linear Motion</a:t>
-            </a:r>
-            <a:endParaRPr lang="en-US" sz="2400" dirty="0">
-              <a:latin typeface="Gill Sans MT"/>
-              <a:cs typeface="Gill Sans MT"/>
-            </a:endParaRPr>
-          </a:p>
-        </p:txBody>
-      </p:sp>
-      <p:sp>
-        <p:nvSpPr>
-          <p:cNvPr id="44" name="TextBox 43"/>
-          <p:cNvSpPr txBox="1"/>
-          <p:nvPr/>
-        </p:nvSpPr>
-        <p:spPr>
-          <a:xfrm>
-            <a:off x="10189882" y="3227294"/>
-            <a:ext cx="184666" cy="369332"/>
-          </a:xfrm>
-          <a:prstGeom prst="rect">
-            <a:avLst/>
-          </a:prstGeom>
-          <a:noFill/>
-        </p:spPr>
-        <p:txBody>
-          <a:bodyPr wrap="none" rtlCol="0">
-            <a:spAutoFit/>
-          </a:bodyPr>
-          <a:lstStyle/>
-          <a:p>
-            <a:endParaRPr lang="en-US" dirty="0"/>
-          </a:p>
-        </p:txBody>
-      </p:sp>
-      <p:sp>
-        <p:nvSpPr>
-          <p:cNvPr id="61" name="Oval 60"/>
-          <p:cNvSpPr>
-            <a:spLocks noChangeAspect="1"/>
-          </p:cNvSpPr>
-          <p:nvPr/>
-        </p:nvSpPr>
-        <p:spPr>
-          <a:xfrm>
-            <a:off x="1339824" y="3668992"/>
-            <a:ext cx="100584" cy="100584"/>
-          </a:xfrm>
-          <a:prstGeom prst="ellipse">
-            <a:avLst/>
-          </a:prstGeom>
-          <a:solidFill>
-            <a:schemeClr val="tx1">
-              <a:lumMod val="95000"/>
-              <a:lumOff val="5000"/>
-            </a:schemeClr>
-          </a:solidFill>
-          <a:ln>
-            <a:solidFill>
-              <a:schemeClr val="tx1"/>
-            </a:solidFill>
-          </a:ln>
-        </p:spPr>
-        <p:style>
-          <a:lnRef idx="1">
-            <a:schemeClr val="accent1"/>
-          </a:lnRef>
-          <a:fillRef idx="3">
-            <a:schemeClr val="accent1"/>
-          </a:fillRef>
-          <a:effectRef idx="2">
-            <a:schemeClr val="accent1"/>
-          </a:effectRef>
-          <a:fontRef idx="minor">
-            <a:schemeClr val="lt1"/>
-          </a:fontRef>
-        </p:style>
-        <p:txBody>
-          <a:bodyPr rtlCol="0" anchor="ctr"/>
-          <a:lstStyle/>
-          <a:p>
-            <a:pPr algn="ctr"/>
-            <a:endParaRPr lang="en-US"/>
-          </a:p>
-        </p:txBody>
-      </p:sp>
-      <p:cxnSp>
-        <p:nvCxnSpPr>
-          <p:cNvPr id="65" name="Straight Arrow Connector 64"/>
-          <p:cNvCxnSpPr/>
-          <p:nvPr/>
-        </p:nvCxnSpPr>
-        <p:spPr>
-          <a:xfrm flipV="1">
-            <a:off x="301920" y="3159133"/>
-            <a:ext cx="0" cy="271759"/>
-          </a:xfrm>
-          <a:prstGeom prst="straightConnector1">
-            <a:avLst/>
-          </a:prstGeom>
-          <a:ln w="57150" cmpd="sng">
-            <a:solidFill>
-              <a:srgbClr val="0D0D0D"/>
-            </a:solidFill>
-            <a:headEnd type="none"/>
-            <a:tailEnd type="triangle"/>
-          </a:ln>
-        </p:spPr>
-        <p:style>
-          <a:lnRef idx="2">
-            <a:schemeClr val="accent1"/>
-          </a:lnRef>
-          <a:fillRef idx="0">
-            <a:schemeClr val="accent1"/>
-          </a:fillRef>
-          <a:effectRef idx="1">
-            <a:schemeClr val="accent1"/>
-          </a:effectRef>
-          <a:fontRef idx="minor">
-            <a:schemeClr val="tx1"/>
-          </a:fontRef>
-        </p:style>
-      </p:cxnSp>
-      <p:sp>
-        <p:nvSpPr>
-          <p:cNvPr id="51" name="TextBox 50"/>
-          <p:cNvSpPr txBox="1"/>
-          <p:nvPr/>
-        </p:nvSpPr>
-        <p:spPr>
-          <a:xfrm>
-            <a:off x="5455832" y="1978132"/>
-            <a:ext cx="1186893" cy="461665"/>
-          </a:xfrm>
-          <a:prstGeom prst="rect">
-            <a:avLst/>
-          </a:prstGeom>
-          <a:noFill/>
-        </p:spPr>
-        <p:txBody>
-          <a:bodyPr wrap="none" rtlCol="0">
-            <a:spAutoFit/>
-          </a:bodyPr>
-          <a:lstStyle/>
-          <a:p>
-            <a:r>
-              <a:rPr lang="en-US" sz="2400" dirty="0" smtClean="0">
-                <a:latin typeface="Gill Sans MT"/>
-                <a:cs typeface="Gill Sans MT"/>
-              </a:rPr>
-              <a:t>In space</a:t>
-            </a:r>
-            <a:endParaRPr lang="en-US" sz="2400" dirty="0">
-              <a:latin typeface="Gill Sans MT"/>
-              <a:cs typeface="Gill Sans MT"/>
-            </a:endParaRPr>
-          </a:p>
-        </p:txBody>
-      </p:sp>
-      <p:pic>
-        <p:nvPicPr>
-          <p:cNvPr id="3" name="Picture 2"/>
-          <p:cNvPicPr>
-            <a:picLocks noChangeAspect="1"/>
-          </p:cNvPicPr>
-          <p:nvPr/>
-        </p:nvPicPr>
-        <p:blipFill>
-          <a:blip r:embed="rId3"/>
-          <a:stretch>
-            <a:fillRect/>
-          </a:stretch>
-        </p:blipFill>
-        <p:spPr>
-          <a:xfrm>
-            <a:off x="4113729" y="3112739"/>
-            <a:ext cx="4318000" cy="2108200"/>
-          </a:xfrm>
-          <a:prstGeom prst="rect">
-            <a:avLst/>
-          </a:prstGeom>
-        </p:spPr>
-      </p:pic>
-    </p:spTree>
-    <p:extLst>
-      <p:ext uri="{BB962C8B-B14F-4D97-AF65-F5344CB8AC3E}">
-        <p14:creationId xmlns:p14="http://schemas.microsoft.com/office/powerpoint/2010/main" val="1432632787"/>
-      </p:ext>
-    </p:extLst>
-  </p:cSld>
-  <p:clrMapOvr>
-    <a:masterClrMapping/>
-  </p:clrMapOvr>
-  <p:timing>
-    <p:tnLst>
-      <p:par>
-        <p:cTn xmlns:p14="http://schemas.microsoft.com/office/powerpoint/2010/main" id="1" dur="indefinite" restart="never" nodeType="tmRoot"/>
-      </p:par>
-    </p:tnLst>
-  </p:timing>
-</p:sld>
-</file>
-
-<file path=ppt/slides/slide5.xml><?xml version="1.0" encoding="utf-8"?>
-<p:sld xmlns:a="http://schemas.openxmlformats.org/drawingml/2006/main" xmlns:r="http://schemas.openxmlformats.org/officeDocument/2006/relationships" xmlns:p="http://schemas.openxmlformats.org/presentationml/2006/main">
-  <p:cSld>
-    <p:spTree>
-      <p:nvGrpSpPr>
-        <p:cNvPr id="1" name=""/>
-        <p:cNvGrpSpPr/>
-        <p:nvPr/>
-      </p:nvGrpSpPr>
-      <p:grpSpPr>
-        <a:xfrm>
-          <a:off x="0" y="0"/>
-          <a:ext cx="0" cy="0"/>
-          <a:chOff x="0" y="0"/>
-          <a:chExt cx="0" cy="0"/>
-        </a:xfrm>
-      </p:grpSpPr>
-      <p:sp>
-        <p:nvSpPr>
-          <p:cNvPr id="2" name="Title 1"/>
-          <p:cNvSpPr>
-            <a:spLocks noGrp="1"/>
-          </p:cNvSpPr>
-          <p:nvPr>
-            <p:ph type="title"/>
-          </p:nvPr>
-        </p:nvSpPr>
-        <p:spPr/>
-        <p:txBody>
-          <a:bodyPr/>
-          <a:lstStyle/>
-          <a:p>
-            <a:r>
-              <a:rPr lang="en-US" dirty="0" smtClean="0"/>
-              <a:t>Direction</a:t>
-            </a:r>
-            <a:endParaRPr lang="en-US" dirty="0"/>
-          </a:p>
-        </p:txBody>
-      </p:sp>
-      <p:sp>
-        <p:nvSpPr>
-          <p:cNvPr id="3" name="Content Placeholder 2"/>
-          <p:cNvSpPr>
-            <a:spLocks noGrp="1"/>
-          </p:cNvSpPr>
-          <p:nvPr>
-            <p:ph idx="1"/>
-          </p:nvPr>
-        </p:nvSpPr>
-        <p:spPr/>
-        <p:txBody>
-          <a:bodyPr/>
-          <a:lstStyle/>
-          <a:p>
-            <a:r>
-              <a:rPr lang="en-US" dirty="0" smtClean="0"/>
-              <a:t>Linear Motion</a:t>
-            </a:r>
-            <a:endParaRPr lang="en-US" dirty="0"/>
-          </a:p>
-        </p:txBody>
-      </p:sp>
-      <p:sp>
-        <p:nvSpPr>
-          <p:cNvPr id="38" name="TextBox 37"/>
-          <p:cNvSpPr txBox="1"/>
-          <p:nvPr/>
-        </p:nvSpPr>
-        <p:spPr>
-          <a:xfrm>
-            <a:off x="1799303" y="5666525"/>
-            <a:ext cx="1186893" cy="461665"/>
-          </a:xfrm>
-          <a:prstGeom prst="rect">
-            <a:avLst/>
-          </a:prstGeom>
-          <a:noFill/>
-        </p:spPr>
-        <p:txBody>
-          <a:bodyPr wrap="none" rtlCol="0">
-            <a:spAutoFit/>
-          </a:bodyPr>
-          <a:lstStyle/>
-          <a:p>
-            <a:r>
-              <a:rPr lang="en-US" sz="2400" dirty="0" smtClean="0">
-                <a:latin typeface="Gill Sans MT"/>
-                <a:cs typeface="Gill Sans MT"/>
-              </a:rPr>
-              <a:t>In space</a:t>
-            </a:r>
-            <a:endParaRPr lang="en-US" sz="2400" dirty="0">
-              <a:latin typeface="Gill Sans MT"/>
-              <a:cs typeface="Gill Sans MT"/>
-            </a:endParaRPr>
-          </a:p>
-        </p:txBody>
-      </p:sp>
-      <p:pic>
-        <p:nvPicPr>
-          <p:cNvPr id="39" name="Picture 38"/>
-          <p:cNvPicPr>
-            <a:picLocks noChangeAspect="1"/>
-          </p:cNvPicPr>
-          <p:nvPr/>
-        </p:nvPicPr>
-        <p:blipFill>
-          <a:blip r:embed="rId2"/>
-          <a:stretch>
-            <a:fillRect/>
-          </a:stretch>
-        </p:blipFill>
-        <p:spPr>
-          <a:xfrm>
-            <a:off x="353291" y="3126980"/>
-            <a:ext cx="4318000" cy="2019774"/>
-          </a:xfrm>
-          <a:prstGeom prst="rect">
-            <a:avLst/>
-          </a:prstGeom>
-        </p:spPr>
-      </p:pic>
-      <p:grpSp>
-        <p:nvGrpSpPr>
-          <p:cNvPr id="4" name="Group 3"/>
-          <p:cNvGrpSpPr/>
-          <p:nvPr/>
-        </p:nvGrpSpPr>
-        <p:grpSpPr>
-          <a:xfrm>
-            <a:off x="5699966" y="2640206"/>
-            <a:ext cx="2660308" cy="2839904"/>
-            <a:chOff x="3605872" y="1954671"/>
-            <a:chExt cx="2660308" cy="2839904"/>
-          </a:xfrm>
-        </p:grpSpPr>
-        <p:sp>
-          <p:nvSpPr>
-            <p:cNvPr id="37" name="Rectangle 36"/>
-            <p:cNvSpPr/>
-            <p:nvPr/>
-          </p:nvSpPr>
-          <p:spPr>
-            <a:xfrm>
-              <a:off x="3605872" y="1954671"/>
-              <a:ext cx="2581248" cy="2839904"/>
-            </a:xfrm>
-            <a:prstGeom prst="rect">
-              <a:avLst/>
-            </a:prstGeom>
-            <a:gradFill flip="none" rotWithShape="1">
-              <a:gsLst>
-                <a:gs pos="0">
-                  <a:schemeClr val="tx1">
-                    <a:lumMod val="50000"/>
-                    <a:lumOff val="50000"/>
-                    <a:alpha val="24000"/>
-                  </a:schemeClr>
-                </a:gs>
-                <a:gs pos="100000">
-                  <a:schemeClr val="bg1">
-                    <a:lumMod val="85000"/>
-                    <a:alpha val="24000"/>
-                  </a:schemeClr>
-                </a:gs>
-              </a:gsLst>
-              <a:lin ang="0" scaled="0"/>
-              <a:tileRect/>
-            </a:gradFill>
-            <a:ln>
-              <a:noFill/>
-            </a:ln>
-            <a:scene3d>
-              <a:camera prst="isometricRightUp"/>
-              <a:lightRig rig="threePt" dir="t"/>
-            </a:scene3d>
-          </p:spPr>
-          <p:style>
-            <a:lnRef idx="1">
-              <a:schemeClr val="accent1"/>
-            </a:lnRef>
-            <a:fillRef idx="3">
-              <a:schemeClr val="accent1"/>
-            </a:fillRef>
-            <a:effectRef idx="2">
-              <a:schemeClr val="accent1"/>
-            </a:effectRef>
-            <a:fontRef idx="minor">
-              <a:schemeClr val="lt1"/>
-            </a:fontRef>
-          </p:style>
-          <p:txBody>
-            <a:bodyPr rtlCol="0" anchor="ctr"/>
-            <a:lstStyle/>
-            <a:p>
-              <a:pPr algn="ctr"/>
-              <a:endParaRPr lang="en-US"/>
-            </a:p>
-          </p:txBody>
-        </p:sp>
-        <p:sp>
-          <p:nvSpPr>
-            <p:cNvPr id="40" name="Oval 39"/>
+            <p:cNvPr id="59" name="Oval 58"/>
             <p:cNvSpPr>
               <a:spLocks noChangeAspect="1"/>
             </p:cNvSpPr>
@@ -8983,7 +8047,7 @@
           </p:nvSpPr>
           <p:spPr>
             <a:xfrm>
-              <a:off x="6165596" y="4446367"/>
+              <a:off x="2548651" y="4338402"/>
               <a:ext cx="100584" cy="100584"/>
             </a:xfrm>
             <a:prstGeom prst="ellipse">
@@ -9023,30 +8087,28 @@
         </p:sp>
         <p:grpSp>
           <p:nvGrpSpPr>
-            <p:cNvPr id="41" name="Group 40"/>
+            <p:cNvPr id="60" name="Group 59"/>
             <p:cNvGrpSpPr/>
             <p:nvPr/>
           </p:nvGrpSpPr>
           <p:grpSpPr>
             <a:xfrm>
-              <a:off x="4809418" y="2693323"/>
-              <a:ext cx="816534" cy="869799"/>
-              <a:chOff x="3591860" y="3001471"/>
-              <a:chExt cx="816534" cy="869799"/>
+              <a:off x="1161997" y="2493341"/>
+              <a:ext cx="552534" cy="988179"/>
+              <a:chOff x="3561384" y="2909454"/>
+              <a:chExt cx="552534" cy="988179"/>
             </a:xfrm>
           </p:grpSpPr>
           <p:cxnSp>
             <p:nvCxnSpPr>
-              <p:cNvPr id="42" name="Straight Arrow Connector 41"/>
-              <p:cNvCxnSpPr>
-                <a:endCxn id="55" idx="0"/>
-              </p:cNvCxnSpPr>
+              <p:cNvPr id="69" name="Straight Arrow Connector 68"/>
+              <p:cNvCxnSpPr/>
               <p:nvPr/>
             </p:nvCxnSpPr>
             <p:spPr>
               <a:xfrm flipV="1">
-                <a:off x="3591860" y="3428001"/>
-                <a:ext cx="647257" cy="443269"/>
+                <a:off x="3561384" y="3140287"/>
+                <a:ext cx="213980" cy="757346"/>
               </a:xfrm>
               <a:prstGeom prst="straightConnector1">
                 <a:avLst/>
@@ -9075,13 +8137,13 @@
           </p:cxnSp>
           <p:sp>
             <p:nvSpPr>
-              <p:cNvPr id="43" name="TextBox 42"/>
+              <p:cNvPr id="70" name="TextBox 69"/>
               <p:cNvSpPr txBox="1"/>
               <p:nvPr/>
             </p:nvSpPr>
             <p:spPr>
               <a:xfrm>
-                <a:off x="4069840" y="3001471"/>
+                <a:off x="3775364" y="2909454"/>
                 <a:ext cx="338554" cy="461665"/>
               </a:xfrm>
               <a:prstGeom prst="rect">
@@ -9100,7 +8162,7 @@
                     <a:latin typeface="Symbol" charset="2"/>
                     <a:cs typeface="Symbol" charset="2"/>
                   </a:rPr>
-                  <a:t>x</a:t>
+                  <a:t>u</a:t>
                 </a:r>
                 <a:endParaRPr lang="en-US" sz="2400" dirty="0">
                   <a:latin typeface="Symbol" charset="2"/>
@@ -9112,13 +8174,100 @@
         </p:grpSp>
         <p:grpSp>
           <p:nvGrpSpPr>
-            <p:cNvPr id="44" name="Group 43"/>
+            <p:cNvPr id="61" name="Group 60"/>
             <p:cNvGrpSpPr/>
             <p:nvPr/>
           </p:nvGrpSpPr>
           <p:grpSpPr>
             <a:xfrm>
-              <a:off x="4778942" y="3563122"/>
+              <a:off x="143440" y="3455157"/>
+              <a:ext cx="1049032" cy="579910"/>
+              <a:chOff x="2542827" y="3871270"/>
+              <a:chExt cx="1049032" cy="579910"/>
+            </a:xfrm>
+          </p:grpSpPr>
+          <p:cxnSp>
+            <p:nvCxnSpPr>
+              <p:cNvPr id="67" name="Straight Arrow Connector 66"/>
+              <p:cNvCxnSpPr/>
+              <p:nvPr/>
+            </p:nvCxnSpPr>
+            <p:spPr>
+              <a:xfrm flipH="1">
+                <a:off x="2840182" y="3871270"/>
+                <a:ext cx="751677" cy="480346"/>
+              </a:xfrm>
+              <a:prstGeom prst="straightConnector1">
+                <a:avLst/>
+              </a:prstGeom>
+              <a:ln>
+                <a:solidFill>
+                  <a:srgbClr val="000000"/>
+                </a:solidFill>
+                <a:tailEnd type="arrow"/>
+              </a:ln>
+            </p:spPr>
+            <p:style>
+              <a:lnRef idx="2">
+                <a:schemeClr val="accent1"/>
+              </a:lnRef>
+              <a:fillRef idx="0">
+                <a:schemeClr val="accent1"/>
+              </a:fillRef>
+              <a:effectRef idx="1">
+                <a:schemeClr val="accent1"/>
+              </a:effectRef>
+              <a:fontRef idx="minor">
+                <a:schemeClr val="tx1"/>
+              </a:fontRef>
+            </p:style>
+          </p:cxnSp>
+          <p:sp>
+            <p:nvSpPr>
+              <p:cNvPr id="68" name="TextBox 67"/>
+              <p:cNvSpPr txBox="1"/>
+              <p:nvPr/>
+            </p:nvSpPr>
+            <p:spPr>
+              <a:xfrm>
+                <a:off x="2542827" y="3989515"/>
+                <a:ext cx="338554" cy="461665"/>
+              </a:xfrm>
+              <a:prstGeom prst="rect">
+                <a:avLst/>
+              </a:prstGeom>
+              <a:noFill/>
+            </p:spPr>
+            <p:txBody>
+              <a:bodyPr wrap="none" rtlCol="0">
+                <a:spAutoFit/>
+              </a:bodyPr>
+              <a:lstStyle/>
+              <a:p>
+                <a:r>
+                  <a:rPr lang="en-US" sz="2400" dirty="0" smtClean="0">
+                    <a:latin typeface="Symbol" charset="2"/>
+                    <a:cs typeface="Symbol" charset="2"/>
+                  </a:rPr>
+                  <a:t>v</a:t>
+                </a:r>
+                <a:endParaRPr lang="en-US" sz="2400" dirty="0">
+                  <a:latin typeface="Symbol" charset="2"/>
+                  <a:cs typeface="Symbol" charset="2"/>
+                </a:endParaRPr>
+              </a:p>
+            </p:txBody>
+          </p:sp>
+        </p:grpSp>
+        <p:grpSp>
+          <p:nvGrpSpPr>
+            <p:cNvPr id="62" name="Group 61"/>
+            <p:cNvGrpSpPr/>
+            <p:nvPr/>
+          </p:nvGrpSpPr>
+          <p:grpSpPr>
+            <a:xfrm>
+              <a:off x="1161997" y="3455157"/>
               <a:ext cx="1300579" cy="672818"/>
               <a:chOff x="3561384" y="3871270"/>
               <a:chExt cx="1300579" cy="672818"/>
@@ -9126,7 +8275,7 @@
           </p:grpSpPr>
           <p:cxnSp>
             <p:nvCxnSpPr>
-              <p:cNvPr id="45" name="Straight Arrow Connector 44"/>
+              <p:cNvPr id="65" name="Straight Arrow Connector 64"/>
               <p:cNvCxnSpPr/>
               <p:nvPr/>
             </p:nvCxnSpPr>
@@ -9142,7 +8291,6 @@
                 <a:solidFill>
                   <a:srgbClr val="000000"/>
                 </a:solidFill>
-                <a:prstDash val="dot"/>
                 <a:tailEnd type="arrow"/>
               </a:ln>
             </p:spPr>
@@ -9163,7 +8311,7 @@
           </p:cxnSp>
           <p:sp>
             <p:nvSpPr>
-              <p:cNvPr id="46" name="Rectangle 45"/>
+              <p:cNvPr id="66" name="Rectangle 65"/>
               <p:cNvSpPr/>
               <p:nvPr/>
             </p:nvSpPr>
@@ -9183,29 +8331,25 @@
               <a:lstStyle/>
               <a:p>
                 <a:r>
-                  <a:rPr lang="en-US" sz="2400" dirty="0" smtClean="0">
+                  <a:rPr lang="en-US" sz="2400" dirty="0">
                     <a:latin typeface="Symbol" charset="2"/>
                     <a:cs typeface="Symbol" charset="2"/>
                   </a:rPr>
                   <a:t>w</a:t>
                 </a:r>
-                <a:endParaRPr lang="en-US" sz="2400" dirty="0">
-                  <a:latin typeface="Symbol" charset="2"/>
-                  <a:cs typeface="Symbol" charset="2"/>
-                </a:endParaRPr>
               </a:p>
             </p:txBody>
           </p:sp>
         </p:grpSp>
         <p:cxnSp>
           <p:nvCxnSpPr>
-            <p:cNvPr id="47" name="Straight Arrow Connector 46"/>
+            <p:cNvPr id="63" name="Straight Arrow Connector 62"/>
             <p:cNvCxnSpPr/>
             <p:nvPr/>
           </p:nvCxnSpPr>
           <p:spPr>
             <a:xfrm flipV="1">
-              <a:off x="4778942" y="3164292"/>
+              <a:off x="1161997" y="3056327"/>
               <a:ext cx="0" cy="271759"/>
             </a:xfrm>
             <a:prstGeom prst="straightConnector1">
@@ -9234,245 +8378,15 @@
             </a:fontRef>
           </p:style>
         </p:cxnSp>
-        <p:grpSp>
-          <p:nvGrpSpPr>
-            <p:cNvPr id="48" name="Group 47"/>
-            <p:cNvGrpSpPr/>
-            <p:nvPr/>
-          </p:nvGrpSpPr>
-          <p:grpSpPr>
-            <a:xfrm>
-              <a:off x="4447601" y="2355571"/>
-              <a:ext cx="331341" cy="1207551"/>
-              <a:chOff x="4447601" y="2355571"/>
-              <a:chExt cx="331341" cy="1207551"/>
-            </a:xfrm>
-          </p:grpSpPr>
-          <p:sp>
-            <p:nvSpPr>
-              <p:cNvPr id="49" name="Rectangle 48"/>
-              <p:cNvSpPr/>
-              <p:nvPr/>
-            </p:nvSpPr>
-            <p:spPr>
-              <a:xfrm>
-                <a:off x="4447601" y="2355571"/>
-                <a:ext cx="331341" cy="461665"/>
-              </a:xfrm>
-              <a:prstGeom prst="rect">
-                <a:avLst/>
-              </a:prstGeom>
-            </p:spPr>
-            <p:txBody>
-              <a:bodyPr wrap="none">
-                <a:spAutoFit/>
-              </a:bodyPr>
-              <a:lstStyle/>
-              <a:p>
-                <a:pPr lvl="0"/>
-                <a:r>
-                  <a:rPr lang="en-US" sz="2400" dirty="0" smtClean="0">
-                    <a:solidFill>
-                      <a:prstClr val="black"/>
-                    </a:solidFill>
-                    <a:latin typeface="Symbol" charset="2"/>
-                    <a:cs typeface="Symbol" charset="2"/>
-                  </a:rPr>
-                  <a:t>y</a:t>
-                </a:r>
-                <a:endParaRPr lang="en-US" sz="2400" dirty="0">
-                  <a:solidFill>
-                    <a:prstClr val="black"/>
-                  </a:solidFill>
-                  <a:latin typeface="Symbol" charset="2"/>
-                  <a:cs typeface="Symbol" charset="2"/>
-                </a:endParaRPr>
-              </a:p>
-            </p:txBody>
-          </p:sp>
-          <p:cxnSp>
-            <p:nvCxnSpPr>
-              <p:cNvPr id="50" name="Straight Arrow Connector 49"/>
-              <p:cNvCxnSpPr/>
-              <p:nvPr/>
-            </p:nvCxnSpPr>
-            <p:spPr>
-              <a:xfrm flipV="1">
-                <a:off x="4778942" y="2611873"/>
-                <a:ext cx="0" cy="951249"/>
-              </a:xfrm>
-              <a:prstGeom prst="straightConnector1">
-                <a:avLst/>
-              </a:prstGeom>
-              <a:ln>
-                <a:solidFill>
-                  <a:srgbClr val="000000"/>
-                </a:solidFill>
-                <a:tailEnd type="arrow"/>
-              </a:ln>
-            </p:spPr>
-            <p:style>
-              <a:lnRef idx="2">
-                <a:schemeClr val="accent1"/>
-              </a:lnRef>
-              <a:fillRef idx="0">
-                <a:schemeClr val="accent1"/>
-              </a:fillRef>
-              <a:effectRef idx="1">
-                <a:schemeClr val="accent1"/>
-              </a:effectRef>
-              <a:fontRef idx="minor">
-                <a:schemeClr val="tx1"/>
-              </a:fontRef>
-            </p:style>
-          </p:cxnSp>
-        </p:grpSp>
-        <p:grpSp>
-          <p:nvGrpSpPr>
-            <p:cNvPr id="51" name="Group 50"/>
-            <p:cNvGrpSpPr/>
-            <p:nvPr/>
-          </p:nvGrpSpPr>
-          <p:grpSpPr>
-            <a:xfrm>
-              <a:off x="4809417" y="3119853"/>
-              <a:ext cx="1053529" cy="646455"/>
-              <a:chOff x="4809417" y="3119853"/>
-              <a:chExt cx="1053529" cy="646455"/>
-            </a:xfrm>
-          </p:grpSpPr>
-          <p:grpSp>
-            <p:nvGrpSpPr>
-              <p:cNvPr id="52" name="Group 51"/>
-              <p:cNvGrpSpPr/>
-              <p:nvPr/>
-            </p:nvGrpSpPr>
-            <p:grpSpPr>
-              <a:xfrm>
-                <a:off x="4809417" y="3119853"/>
-                <a:ext cx="910729" cy="646455"/>
-                <a:chOff x="3591859" y="3428001"/>
-                <a:chExt cx="910729" cy="646455"/>
-              </a:xfrm>
-            </p:grpSpPr>
-            <p:cxnSp>
-              <p:nvCxnSpPr>
-                <p:cNvPr id="54" name="Straight Arrow Connector 53"/>
-                <p:cNvCxnSpPr/>
-                <p:nvPr/>
-              </p:nvCxnSpPr>
-              <p:spPr>
-                <a:xfrm>
-                  <a:off x="3591859" y="3889666"/>
-                  <a:ext cx="910729" cy="184790"/>
-                </a:xfrm>
-                <a:prstGeom prst="straightConnector1">
-                  <a:avLst/>
-                </a:prstGeom>
-                <a:ln>
-                  <a:solidFill>
-                    <a:srgbClr val="000000"/>
-                  </a:solidFill>
-                  <a:tailEnd type="arrow"/>
-                </a:ln>
-              </p:spPr>
-              <p:style>
-                <a:lnRef idx="2">
-                  <a:schemeClr val="accent1"/>
-                </a:lnRef>
-                <a:fillRef idx="0">
-                  <a:schemeClr val="accent1"/>
-                </a:fillRef>
-                <a:effectRef idx="1">
-                  <a:schemeClr val="accent1"/>
-                </a:effectRef>
-                <a:fontRef idx="minor">
-                  <a:schemeClr val="tx1"/>
-                </a:fontRef>
-              </p:style>
-            </p:cxnSp>
-            <p:sp>
-              <p:nvSpPr>
-                <p:cNvPr id="55" name="TextBox 54"/>
-                <p:cNvSpPr txBox="1"/>
-                <p:nvPr/>
-              </p:nvSpPr>
-              <p:spPr>
-                <a:xfrm>
-                  <a:off x="4146784" y="3428001"/>
-                  <a:ext cx="184666" cy="461665"/>
-                </a:xfrm>
-                <a:prstGeom prst="rect">
-                  <a:avLst/>
-                </a:prstGeom>
-                <a:noFill/>
-              </p:spPr>
-              <p:txBody>
-                <a:bodyPr wrap="none" rtlCol="0">
-                  <a:spAutoFit/>
-                </a:bodyPr>
-                <a:lstStyle/>
-                <a:p>
-                  <a:endParaRPr lang="en-US" sz="2400" dirty="0">
-                    <a:latin typeface="Symbol" charset="2"/>
-                    <a:cs typeface="Symbol" charset="2"/>
-                  </a:endParaRPr>
-                </a:p>
-              </p:txBody>
-            </p:sp>
-          </p:grpSp>
-          <p:sp>
-            <p:nvSpPr>
-              <p:cNvPr id="53" name="Rectangle 52"/>
-              <p:cNvSpPr/>
-              <p:nvPr/>
-            </p:nvSpPr>
-            <p:spPr>
-              <a:xfrm>
-                <a:off x="5531605" y="3284159"/>
-                <a:ext cx="331341" cy="461665"/>
-              </a:xfrm>
-              <a:prstGeom prst="rect">
-                <a:avLst/>
-              </a:prstGeom>
-            </p:spPr>
-            <p:txBody>
-              <a:bodyPr wrap="none">
-                <a:spAutoFit/>
-              </a:bodyPr>
-              <a:lstStyle/>
-              <a:p>
-                <a:pPr lvl="0"/>
-                <a:r>
-                  <a:rPr lang="en-US" sz="2400" dirty="0" smtClean="0">
-                    <a:solidFill>
-                      <a:prstClr val="black"/>
-                    </a:solidFill>
-                    <a:latin typeface="Symbol" charset="2"/>
-                    <a:cs typeface="Symbol" charset="2"/>
-                  </a:rPr>
-                  <a:t>z</a:t>
-                </a:r>
-                <a:endParaRPr lang="en-US" sz="2400" dirty="0">
-                  <a:solidFill>
-                    <a:prstClr val="black"/>
-                  </a:solidFill>
-                  <a:latin typeface="Symbol" charset="2"/>
-                  <a:cs typeface="Symbol" charset="2"/>
-                </a:endParaRPr>
-              </a:p>
-            </p:txBody>
-          </p:sp>
-        </p:grpSp>
         <p:sp>
           <p:nvSpPr>
-            <p:cNvPr id="56" name="Oval 55"/>
+            <p:cNvPr id="64" name="Oval 63"/>
             <p:cNvSpPr/>
             <p:nvPr/>
           </p:nvSpPr>
           <p:spPr>
             <a:xfrm>
-              <a:off x="4650105" y="3436051"/>
+              <a:off x="1033160" y="3328086"/>
               <a:ext cx="245316" cy="245316"/>
             </a:xfrm>
             <a:prstGeom prst="ellipse">
@@ -9544,7 +8458,7 @@
 </p:sld>
 </file>
 
-<file path=ppt/slides/slide6.xml><?xml version="1.0" encoding="utf-8"?>
+<file path=ppt/slides/slide5.xml><?xml version="1.0" encoding="utf-8"?>
 <p:sld xmlns:a="http://schemas.openxmlformats.org/drawingml/2006/main" xmlns:r="http://schemas.openxmlformats.org/officeDocument/2006/relationships" xmlns:p="http://schemas.openxmlformats.org/presentationml/2006/main">
   <p:cSld>
     <p:spTree>
@@ -10836,6 +9750,85 @@
           </p:txBody>
         </p:sp>
       </p:grpSp>
+      <p:sp>
+        <p:nvSpPr>
+          <p:cNvPr id="90" name="TextBox 89"/>
+          <p:cNvSpPr txBox="1"/>
+          <p:nvPr/>
+        </p:nvSpPr>
+        <p:spPr>
+          <a:xfrm>
+            <a:off x="1715536" y="5948097"/>
+            <a:ext cx="5493361" cy="461665"/>
+          </a:xfrm>
+          <a:prstGeom prst="rect">
+            <a:avLst/>
+          </a:prstGeom>
+          <a:noFill/>
+        </p:spPr>
+        <p:txBody>
+          <a:bodyPr wrap="none" rtlCol="0">
+            <a:spAutoFit/>
+          </a:bodyPr>
+          <a:lstStyle/>
+          <a:p>
+            <a:pPr algn="ctr"/>
+            <a:r>
+              <a:rPr lang="en-US" sz="2400" dirty="0">
+                <a:latin typeface="Gill Sans MT"/>
+                <a:cs typeface="Gill Sans MT"/>
+              </a:rPr>
+              <a:t>e</a:t>
+            </a:r>
+            <a:r>
+              <a:rPr lang="en-US" sz="2400" dirty="0" smtClean="0">
+                <a:latin typeface="Gill Sans MT"/>
+                <a:cs typeface="Gill Sans MT"/>
+              </a:rPr>
+              <a:t>x.  Walking. Sample </a:t>
+            </a:r>
+            <a:r>
+              <a:rPr lang="en-US" sz="2400" dirty="0" smtClean="0">
+                <a:latin typeface="Gill Sans MT"/>
+                <a:cs typeface="Gill Sans MT"/>
+              </a:rPr>
+              <a:t>directions </a:t>
+            </a:r>
+            <a:r>
+              <a:rPr lang="en-US" sz="2400" dirty="0" smtClean="0">
+                <a:latin typeface="Gill Sans MT"/>
+                <a:cs typeface="Gill Sans MT"/>
+              </a:rPr>
+              <a:t>on </a:t>
+            </a:r>
+            <a:r>
+              <a:rPr lang="en-US" sz="2400" dirty="0" err="1" smtClean="0">
+                <a:latin typeface="Gill Sans MT"/>
+                <a:cs typeface="Gill Sans MT"/>
+              </a:rPr>
+              <a:t>zx</a:t>
+            </a:r>
+            <a:r>
+              <a:rPr lang="en-US" sz="2400" dirty="0">
+                <a:latin typeface="Gill Sans MT"/>
+                <a:cs typeface="Gill Sans MT"/>
+              </a:rPr>
+              <a:t>-</a:t>
+            </a:r>
+            <a:r>
+              <a:rPr lang="en-US" sz="2400" dirty="0" smtClean="0">
+                <a:latin typeface="Gill Sans MT"/>
+                <a:cs typeface="Gill Sans MT"/>
+              </a:rPr>
+              <a:t>plane</a:t>
+            </a:r>
+            <a:endParaRPr lang="en-US" sz="2400" dirty="0" smtClean="0">
+              <a:latin typeface="Gill Sans MT"/>
+              <a:cs typeface="Gill Sans MT"/>
+            </a:endParaRPr>
+          </a:p>
+        </p:txBody>
+      </p:sp>
     </p:spTree>
     <p:extLst>
       <p:ext uri="{BB962C8B-B14F-4D97-AF65-F5344CB8AC3E}">
@@ -10856,7 +9849,7 @@
 </p:sld>
 </file>
 
-<file path=ppt/slides/slide7.xml><?xml version="1.0" encoding="utf-8"?>
+<file path=ppt/slides/slide6.xml><?xml version="1.0" encoding="utf-8"?>
 <p:sld xmlns:a="http://schemas.openxmlformats.org/drawingml/2006/main" xmlns:r="http://schemas.openxmlformats.org/officeDocument/2006/relationships" xmlns:p="http://schemas.openxmlformats.org/presentationml/2006/main">
   <p:cSld>
     <p:spTree>
@@ -11470,24 +10463,19 @@
           <a:lstStyle/>
           <a:p>
             <a:r>
-              <a:rPr lang="en-US"/>
-              <a:t>Upward</a:t>
+              <a:rPr lang="en-US" dirty="0"/>
+              <a:t>Upward, </a:t>
             </a:r>
             <a:r>
-              <a:rPr lang="en-US"/>
-              <a:t>, </a:t>
-            </a:r>
-            <a:r>
-              <a:rPr lang="en-US" smtClean="0"/>
+              <a:rPr lang="en-US" dirty="0" smtClean="0"/>
               <a:t>Downward</a:t>
             </a:r>
           </a:p>
           <a:p>
             <a:r>
               <a:rPr lang="en-US" dirty="0" smtClean="0"/>
-              <a:t>Left, Right</a:t>
+              <a:t>Right, Left</a:t>
             </a:r>
-            <a:endParaRPr lang="en-US" dirty="0" smtClean="0"/>
           </a:p>
           <a:p>
             <a:r>
@@ -12147,7 +11135,7 @@
 </p:sld>
 </file>
 
-<file path=ppt/slides/slide8.xml><?xml version="1.0" encoding="utf-8"?>
+<file path=ppt/slides/slide7.xml><?xml version="1.0" encoding="utf-8"?>
 <p:sld xmlns:a="http://schemas.openxmlformats.org/drawingml/2006/main" xmlns:r="http://schemas.openxmlformats.org/officeDocument/2006/relationships" xmlns:p="http://schemas.openxmlformats.org/presentationml/2006/main">
   <p:cSld>
     <p:spTree>
@@ -12218,8 +11206,8 @@
         </p:nvSpPr>
         <p:spPr>
           <a:xfrm>
-            <a:off x="5771931" y="3395634"/>
-            <a:ext cx="2480817" cy="1200328"/>
+            <a:off x="1802032" y="5334483"/>
+            <a:ext cx="5077682" cy="1200328"/>
           </a:xfrm>
           <a:prstGeom prst="rect">
             <a:avLst/>
@@ -12238,8 +11226,12 @@
                 <a:latin typeface="Gill Sans MT"/>
                 <a:cs typeface="Gill Sans MT"/>
               </a:rPr>
-              <a:t>Clockwise </a:t>
+              <a:t>Clockwise(special direction: x)</a:t>
             </a:r>
+            <a:endParaRPr lang="en-US" sz="2400" dirty="0" smtClean="0">
+              <a:latin typeface="Gill Sans MT"/>
+              <a:cs typeface="Gill Sans MT"/>
+            </a:endParaRPr>
           </a:p>
           <a:p>
             <a:pPr algn="ctr"/>
@@ -12254,6 +11246,27 @@
               <a:rPr lang="en-US" sz="2400" dirty="0" smtClean="0"/>
               <a:t>Counterclockwise</a:t>
             </a:r>
+            <a:r>
+              <a:rPr lang="en-US" sz="2400" dirty="0">
+                <a:latin typeface="Gill Sans MT"/>
+                <a:cs typeface="Gill Sans MT"/>
+              </a:rPr>
+              <a:t>(special direction: </a:t>
+            </a:r>
+            <a:r>
+              <a:rPr lang="en-US" sz="2400" dirty="0" smtClean="0">
+                <a:latin typeface="Gill Sans MT"/>
+                <a:cs typeface="Gill Sans MT"/>
+              </a:rPr>
+              <a:t>-x</a:t>
+            </a:r>
+            <a:r>
+              <a:rPr lang="en-US" sz="2400" dirty="0">
+                <a:latin typeface="Gill Sans MT"/>
+                <a:cs typeface="Gill Sans MT"/>
+              </a:rPr>
+              <a:t>)</a:t>
+            </a:r>
           </a:p>
           <a:p>
             <a:pPr algn="ctr"/>
@@ -12264,6 +11277,10 @@
               </a:rPr>
               <a:t>Both</a:t>
             </a:r>
+            <a:endParaRPr lang="en-US" sz="2400" dirty="0" smtClean="0">
+              <a:latin typeface="Gill Sans MT"/>
+              <a:cs typeface="Gill Sans MT"/>
+            </a:endParaRPr>
           </a:p>
         </p:txBody>
       </p:sp>
@@ -12620,6 +11637,635 @@
           </p:style>
         </p:cxnSp>
       </p:grpSp>
+      <p:grpSp>
+        <p:nvGrpSpPr>
+          <p:cNvPr id="14" name="Group 13"/>
+          <p:cNvGrpSpPr/>
+          <p:nvPr/>
+        </p:nvGrpSpPr>
+        <p:grpSpPr>
+          <a:xfrm>
+            <a:off x="5938084" y="2298954"/>
+            <a:ext cx="2660308" cy="2839904"/>
+            <a:chOff x="3605872" y="1954671"/>
+            <a:chExt cx="2660308" cy="2839904"/>
+          </a:xfrm>
+        </p:grpSpPr>
+        <p:sp>
+          <p:nvSpPr>
+            <p:cNvPr id="15" name="Rectangle 14"/>
+            <p:cNvSpPr/>
+            <p:nvPr/>
+          </p:nvSpPr>
+          <p:spPr>
+            <a:xfrm>
+              <a:off x="3605872" y="1954671"/>
+              <a:ext cx="2581248" cy="2839904"/>
+            </a:xfrm>
+            <a:prstGeom prst="rect">
+              <a:avLst/>
+            </a:prstGeom>
+            <a:gradFill flip="none" rotWithShape="1">
+              <a:gsLst>
+                <a:gs pos="0">
+                  <a:schemeClr val="tx1">
+                    <a:lumMod val="50000"/>
+                    <a:lumOff val="50000"/>
+                    <a:alpha val="24000"/>
+                  </a:schemeClr>
+                </a:gs>
+                <a:gs pos="100000">
+                  <a:schemeClr val="bg1">
+                    <a:lumMod val="85000"/>
+                    <a:alpha val="24000"/>
+                  </a:schemeClr>
+                </a:gs>
+              </a:gsLst>
+              <a:lin ang="0" scaled="0"/>
+              <a:tileRect/>
+            </a:gradFill>
+            <a:ln>
+              <a:noFill/>
+            </a:ln>
+            <a:scene3d>
+              <a:camera prst="isometricRightUp"/>
+              <a:lightRig rig="threePt" dir="t"/>
+            </a:scene3d>
+          </p:spPr>
+          <p:style>
+            <a:lnRef idx="1">
+              <a:schemeClr val="accent1"/>
+            </a:lnRef>
+            <a:fillRef idx="3">
+              <a:schemeClr val="accent1"/>
+            </a:fillRef>
+            <a:effectRef idx="2">
+              <a:schemeClr val="accent1"/>
+            </a:effectRef>
+            <a:fontRef idx="minor">
+              <a:schemeClr val="lt1"/>
+            </a:fontRef>
+          </p:style>
+          <p:txBody>
+            <a:bodyPr rtlCol="0" anchor="ctr"/>
+            <a:lstStyle/>
+            <a:p>
+              <a:pPr algn="ctr"/>
+              <a:endParaRPr lang="en-US"/>
+            </a:p>
+          </p:txBody>
+        </p:sp>
+        <p:sp>
+          <p:nvSpPr>
+            <p:cNvPr id="16" name="Oval 15"/>
+            <p:cNvSpPr>
+              <a:spLocks noChangeAspect="1"/>
+            </p:cNvSpPr>
+            <p:nvPr/>
+          </p:nvSpPr>
+          <p:spPr>
+            <a:xfrm>
+              <a:off x="6165596" y="4446367"/>
+              <a:ext cx="100584" cy="100584"/>
+            </a:xfrm>
+            <a:prstGeom prst="ellipse">
+              <a:avLst/>
+            </a:prstGeom>
+            <a:solidFill>
+              <a:srgbClr val="0D0D0D"/>
+            </a:solidFill>
+            <a:ln>
+              <a:solidFill>
+                <a:schemeClr val="tx1"/>
+              </a:solidFill>
+            </a:ln>
+          </p:spPr>
+          <p:style>
+            <a:lnRef idx="1">
+              <a:schemeClr val="accent1"/>
+            </a:lnRef>
+            <a:fillRef idx="3">
+              <a:schemeClr val="accent1"/>
+            </a:fillRef>
+            <a:effectRef idx="2">
+              <a:schemeClr val="accent1"/>
+            </a:effectRef>
+            <a:fontRef idx="minor">
+              <a:schemeClr val="lt1"/>
+            </a:fontRef>
+          </p:style>
+          <p:txBody>
+            <a:bodyPr rtlCol="0" anchor="ctr"/>
+            <a:lstStyle/>
+            <a:p>
+              <a:pPr algn="ctr"/>
+              <a:endParaRPr lang="en-US"/>
+            </a:p>
+          </p:txBody>
+        </p:sp>
+        <p:grpSp>
+          <p:nvGrpSpPr>
+            <p:cNvPr id="17" name="Group 16"/>
+            <p:cNvGrpSpPr/>
+            <p:nvPr/>
+          </p:nvGrpSpPr>
+          <p:grpSpPr>
+            <a:xfrm>
+              <a:off x="4809418" y="2693323"/>
+              <a:ext cx="816534" cy="869799"/>
+              <a:chOff x="3591860" y="3001471"/>
+              <a:chExt cx="816534" cy="869799"/>
+            </a:xfrm>
+          </p:grpSpPr>
+          <p:cxnSp>
+            <p:nvCxnSpPr>
+              <p:cNvPr id="31" name="Straight Arrow Connector 30"/>
+              <p:cNvCxnSpPr>
+                <a:endCxn id="26" idx="0"/>
+              </p:cNvCxnSpPr>
+              <p:nvPr/>
+            </p:nvCxnSpPr>
+            <p:spPr>
+              <a:xfrm flipV="1">
+                <a:off x="3591860" y="3428001"/>
+                <a:ext cx="647257" cy="443269"/>
+              </a:xfrm>
+              <a:prstGeom prst="straightConnector1">
+                <a:avLst/>
+              </a:prstGeom>
+              <a:ln>
+                <a:solidFill>
+                  <a:srgbClr val="000000"/>
+                </a:solidFill>
+                <a:tailEnd type="arrow"/>
+              </a:ln>
+            </p:spPr>
+            <p:style>
+              <a:lnRef idx="2">
+                <a:schemeClr val="accent1"/>
+              </a:lnRef>
+              <a:fillRef idx="0">
+                <a:schemeClr val="accent1"/>
+              </a:fillRef>
+              <a:effectRef idx="1">
+                <a:schemeClr val="accent1"/>
+              </a:effectRef>
+              <a:fontRef idx="minor">
+                <a:schemeClr val="tx1"/>
+              </a:fontRef>
+            </p:style>
+          </p:cxnSp>
+          <p:sp>
+            <p:nvSpPr>
+              <p:cNvPr id="32" name="TextBox 31"/>
+              <p:cNvSpPr txBox="1"/>
+              <p:nvPr/>
+            </p:nvSpPr>
+            <p:spPr>
+              <a:xfrm>
+                <a:off x="4069840" y="3001471"/>
+                <a:ext cx="338554" cy="461665"/>
+              </a:xfrm>
+              <a:prstGeom prst="rect">
+                <a:avLst/>
+              </a:prstGeom>
+              <a:noFill/>
+            </p:spPr>
+            <p:txBody>
+              <a:bodyPr wrap="none" rtlCol="0">
+                <a:spAutoFit/>
+              </a:bodyPr>
+              <a:lstStyle/>
+              <a:p>
+                <a:r>
+                  <a:rPr lang="en-US" sz="2400" dirty="0" smtClean="0">
+                    <a:latin typeface="Symbol" charset="2"/>
+                    <a:cs typeface="Symbol" charset="2"/>
+                  </a:rPr>
+                  <a:t>x</a:t>
+                </a:r>
+                <a:endParaRPr lang="en-US" sz="2400" dirty="0">
+                  <a:latin typeface="Symbol" charset="2"/>
+                  <a:cs typeface="Symbol" charset="2"/>
+                </a:endParaRPr>
+              </a:p>
+            </p:txBody>
+          </p:sp>
+        </p:grpSp>
+        <p:grpSp>
+          <p:nvGrpSpPr>
+            <p:cNvPr id="18" name="Group 17"/>
+            <p:cNvGrpSpPr/>
+            <p:nvPr/>
+          </p:nvGrpSpPr>
+          <p:grpSpPr>
+            <a:xfrm>
+              <a:off x="4778942" y="3563122"/>
+              <a:ext cx="1300579" cy="672818"/>
+              <a:chOff x="3561384" y="3871270"/>
+              <a:chExt cx="1300579" cy="672818"/>
+            </a:xfrm>
+          </p:grpSpPr>
+          <p:cxnSp>
+            <p:nvCxnSpPr>
+              <p:cNvPr id="29" name="Straight Arrow Connector 28"/>
+              <p:cNvCxnSpPr/>
+              <p:nvPr/>
+            </p:nvCxnSpPr>
+            <p:spPr>
+              <a:xfrm>
+                <a:off x="3561384" y="3871270"/>
+                <a:ext cx="1060908" cy="664792"/>
+              </a:xfrm>
+              <a:prstGeom prst="straightConnector1">
+                <a:avLst/>
+              </a:prstGeom>
+              <a:ln>
+                <a:solidFill>
+                  <a:srgbClr val="000000"/>
+                </a:solidFill>
+                <a:prstDash val="dot"/>
+                <a:tailEnd type="arrow"/>
+              </a:ln>
+            </p:spPr>
+            <p:style>
+              <a:lnRef idx="2">
+                <a:schemeClr val="accent1"/>
+              </a:lnRef>
+              <a:fillRef idx="0">
+                <a:schemeClr val="accent1"/>
+              </a:fillRef>
+              <a:effectRef idx="1">
+                <a:schemeClr val="accent1"/>
+              </a:effectRef>
+              <a:fontRef idx="minor">
+                <a:schemeClr val="tx1"/>
+              </a:fontRef>
+            </p:style>
+          </p:cxnSp>
+          <p:sp>
+            <p:nvSpPr>
+              <p:cNvPr id="30" name="Rectangle 29"/>
+              <p:cNvSpPr/>
+              <p:nvPr/>
+            </p:nvSpPr>
+            <p:spPr>
+              <a:xfrm>
+                <a:off x="4472113" y="4082423"/>
+                <a:ext cx="389850" cy="461665"/>
+              </a:xfrm>
+              <a:prstGeom prst="rect">
+                <a:avLst/>
+              </a:prstGeom>
+            </p:spPr>
+            <p:txBody>
+              <a:bodyPr wrap="none">
+                <a:spAutoFit/>
+              </a:bodyPr>
+              <a:lstStyle/>
+              <a:p>
+                <a:r>
+                  <a:rPr lang="en-US" sz="2400" dirty="0" smtClean="0">
+                    <a:latin typeface="Symbol" charset="2"/>
+                    <a:cs typeface="Symbol" charset="2"/>
+                  </a:rPr>
+                  <a:t>w</a:t>
+                </a:r>
+                <a:endParaRPr lang="en-US" sz="2400" dirty="0">
+                  <a:latin typeface="Symbol" charset="2"/>
+                  <a:cs typeface="Symbol" charset="2"/>
+                </a:endParaRPr>
+              </a:p>
+            </p:txBody>
+          </p:sp>
+        </p:grpSp>
+        <p:cxnSp>
+          <p:nvCxnSpPr>
+            <p:cNvPr id="19" name="Straight Arrow Connector 18"/>
+            <p:cNvCxnSpPr/>
+            <p:nvPr/>
+          </p:nvCxnSpPr>
+          <p:spPr>
+            <a:xfrm flipV="1">
+              <a:off x="4778942" y="3164292"/>
+              <a:ext cx="0" cy="271759"/>
+            </a:xfrm>
+            <a:prstGeom prst="straightConnector1">
+              <a:avLst/>
+            </a:prstGeom>
+            <a:ln w="57150" cmpd="sng">
+              <a:solidFill>
+                <a:srgbClr val="0D0D0D"/>
+              </a:solidFill>
+              <a:headEnd type="none"/>
+              <a:tailEnd type="triangle"/>
+            </a:ln>
+          </p:spPr>
+          <p:style>
+            <a:lnRef idx="2">
+              <a:schemeClr val="accent1"/>
+            </a:lnRef>
+            <a:fillRef idx="0">
+              <a:schemeClr val="accent1"/>
+            </a:fillRef>
+            <a:effectRef idx="1">
+              <a:schemeClr val="accent1"/>
+            </a:effectRef>
+            <a:fontRef idx="minor">
+              <a:schemeClr val="tx1"/>
+            </a:fontRef>
+          </p:style>
+        </p:cxnSp>
+        <p:grpSp>
+          <p:nvGrpSpPr>
+            <p:cNvPr id="20" name="Group 19"/>
+            <p:cNvGrpSpPr/>
+            <p:nvPr/>
+          </p:nvGrpSpPr>
+          <p:grpSpPr>
+            <a:xfrm>
+              <a:off x="4447601" y="2355571"/>
+              <a:ext cx="331341" cy="1207551"/>
+              <a:chOff x="4447601" y="2355571"/>
+              <a:chExt cx="331341" cy="1207551"/>
+            </a:xfrm>
+          </p:grpSpPr>
+          <p:sp>
+            <p:nvSpPr>
+              <p:cNvPr id="27" name="Rectangle 26"/>
+              <p:cNvSpPr/>
+              <p:nvPr/>
+            </p:nvSpPr>
+            <p:spPr>
+              <a:xfrm>
+                <a:off x="4447601" y="2355571"/>
+                <a:ext cx="331341" cy="461665"/>
+              </a:xfrm>
+              <a:prstGeom prst="rect">
+                <a:avLst/>
+              </a:prstGeom>
+            </p:spPr>
+            <p:txBody>
+              <a:bodyPr wrap="none">
+                <a:spAutoFit/>
+              </a:bodyPr>
+              <a:lstStyle/>
+              <a:p>
+                <a:pPr lvl="0"/>
+                <a:r>
+                  <a:rPr lang="en-US" sz="2400" dirty="0" smtClean="0">
+                    <a:solidFill>
+                      <a:prstClr val="black"/>
+                    </a:solidFill>
+                    <a:latin typeface="Symbol" charset="2"/>
+                    <a:cs typeface="Symbol" charset="2"/>
+                  </a:rPr>
+                  <a:t>y</a:t>
+                </a:r>
+                <a:endParaRPr lang="en-US" sz="2400" dirty="0">
+                  <a:solidFill>
+                    <a:prstClr val="black"/>
+                  </a:solidFill>
+                  <a:latin typeface="Symbol" charset="2"/>
+                  <a:cs typeface="Symbol" charset="2"/>
+                </a:endParaRPr>
+              </a:p>
+            </p:txBody>
+          </p:sp>
+          <p:cxnSp>
+            <p:nvCxnSpPr>
+              <p:cNvPr id="28" name="Straight Arrow Connector 27"/>
+              <p:cNvCxnSpPr/>
+              <p:nvPr/>
+            </p:nvCxnSpPr>
+            <p:spPr>
+              <a:xfrm flipV="1">
+                <a:off x="4778942" y="2611873"/>
+                <a:ext cx="0" cy="951249"/>
+              </a:xfrm>
+              <a:prstGeom prst="straightConnector1">
+                <a:avLst/>
+              </a:prstGeom>
+              <a:ln>
+                <a:solidFill>
+                  <a:srgbClr val="000000"/>
+                </a:solidFill>
+                <a:tailEnd type="arrow"/>
+              </a:ln>
+            </p:spPr>
+            <p:style>
+              <a:lnRef idx="2">
+                <a:schemeClr val="accent1"/>
+              </a:lnRef>
+              <a:fillRef idx="0">
+                <a:schemeClr val="accent1"/>
+              </a:fillRef>
+              <a:effectRef idx="1">
+                <a:schemeClr val="accent1"/>
+              </a:effectRef>
+              <a:fontRef idx="minor">
+                <a:schemeClr val="tx1"/>
+              </a:fontRef>
+            </p:style>
+          </p:cxnSp>
+        </p:grpSp>
+        <p:grpSp>
+          <p:nvGrpSpPr>
+            <p:cNvPr id="21" name="Group 20"/>
+            <p:cNvGrpSpPr/>
+            <p:nvPr/>
+          </p:nvGrpSpPr>
+          <p:grpSpPr>
+            <a:xfrm>
+              <a:off x="4809417" y="3119853"/>
+              <a:ext cx="1053529" cy="646455"/>
+              <a:chOff x="4809417" y="3119853"/>
+              <a:chExt cx="1053529" cy="646455"/>
+            </a:xfrm>
+          </p:grpSpPr>
+          <p:grpSp>
+            <p:nvGrpSpPr>
+              <p:cNvPr id="23" name="Group 22"/>
+              <p:cNvGrpSpPr/>
+              <p:nvPr/>
+            </p:nvGrpSpPr>
+            <p:grpSpPr>
+              <a:xfrm>
+                <a:off x="4809417" y="3119853"/>
+                <a:ext cx="910729" cy="646455"/>
+                <a:chOff x="3591859" y="3428001"/>
+                <a:chExt cx="910729" cy="646455"/>
+              </a:xfrm>
+            </p:grpSpPr>
+            <p:cxnSp>
+              <p:nvCxnSpPr>
+                <p:cNvPr id="25" name="Straight Arrow Connector 24"/>
+                <p:cNvCxnSpPr/>
+                <p:nvPr/>
+              </p:nvCxnSpPr>
+              <p:spPr>
+                <a:xfrm>
+                  <a:off x="3591859" y="3889666"/>
+                  <a:ext cx="910729" cy="184790"/>
+                </a:xfrm>
+                <a:prstGeom prst="straightConnector1">
+                  <a:avLst/>
+                </a:prstGeom>
+                <a:ln>
+                  <a:solidFill>
+                    <a:srgbClr val="000000"/>
+                  </a:solidFill>
+                  <a:tailEnd type="arrow"/>
+                </a:ln>
+              </p:spPr>
+              <p:style>
+                <a:lnRef idx="2">
+                  <a:schemeClr val="accent1"/>
+                </a:lnRef>
+                <a:fillRef idx="0">
+                  <a:schemeClr val="accent1"/>
+                </a:fillRef>
+                <a:effectRef idx="1">
+                  <a:schemeClr val="accent1"/>
+                </a:effectRef>
+                <a:fontRef idx="minor">
+                  <a:schemeClr val="tx1"/>
+                </a:fontRef>
+              </p:style>
+            </p:cxnSp>
+            <p:sp>
+              <p:nvSpPr>
+                <p:cNvPr id="26" name="TextBox 25"/>
+                <p:cNvSpPr txBox="1"/>
+                <p:nvPr/>
+              </p:nvSpPr>
+              <p:spPr>
+                <a:xfrm>
+                  <a:off x="4146784" y="3428001"/>
+                  <a:ext cx="184666" cy="461665"/>
+                </a:xfrm>
+                <a:prstGeom prst="rect">
+                  <a:avLst/>
+                </a:prstGeom>
+                <a:noFill/>
+              </p:spPr>
+              <p:txBody>
+                <a:bodyPr wrap="none" rtlCol="0">
+                  <a:spAutoFit/>
+                </a:bodyPr>
+                <a:lstStyle/>
+                <a:p>
+                  <a:endParaRPr lang="en-US" sz="2400" dirty="0">
+                    <a:latin typeface="Symbol" charset="2"/>
+                    <a:cs typeface="Symbol" charset="2"/>
+                  </a:endParaRPr>
+                </a:p>
+              </p:txBody>
+            </p:sp>
+          </p:grpSp>
+          <p:sp>
+            <p:nvSpPr>
+              <p:cNvPr id="24" name="Rectangle 23"/>
+              <p:cNvSpPr/>
+              <p:nvPr/>
+            </p:nvSpPr>
+            <p:spPr>
+              <a:xfrm>
+                <a:off x="5531605" y="3284159"/>
+                <a:ext cx="331341" cy="461665"/>
+              </a:xfrm>
+              <a:prstGeom prst="rect">
+                <a:avLst/>
+              </a:prstGeom>
+            </p:spPr>
+            <p:txBody>
+              <a:bodyPr wrap="none">
+                <a:spAutoFit/>
+              </a:bodyPr>
+              <a:lstStyle/>
+              <a:p>
+                <a:pPr lvl="0"/>
+                <a:r>
+                  <a:rPr lang="en-US" sz="2400" dirty="0" smtClean="0">
+                    <a:solidFill>
+                      <a:prstClr val="black"/>
+                    </a:solidFill>
+                    <a:latin typeface="Symbol" charset="2"/>
+                    <a:cs typeface="Symbol" charset="2"/>
+                  </a:rPr>
+                  <a:t>z</a:t>
+                </a:r>
+                <a:endParaRPr lang="en-US" sz="2400" dirty="0">
+                  <a:solidFill>
+                    <a:prstClr val="black"/>
+                  </a:solidFill>
+                  <a:latin typeface="Symbol" charset="2"/>
+                  <a:cs typeface="Symbol" charset="2"/>
+                </a:endParaRPr>
+              </a:p>
+            </p:txBody>
+          </p:sp>
+        </p:grpSp>
+        <p:sp>
+          <p:nvSpPr>
+            <p:cNvPr id="22" name="Oval 21"/>
+            <p:cNvSpPr/>
+            <p:nvPr/>
+          </p:nvSpPr>
+          <p:spPr>
+            <a:xfrm>
+              <a:off x="4650105" y="3436051"/>
+              <a:ext cx="245316" cy="245316"/>
+            </a:xfrm>
+            <a:prstGeom prst="ellipse">
+              <a:avLst/>
+            </a:prstGeom>
+            <a:gradFill flip="none" rotWithShape="1">
+              <a:gsLst>
+                <a:gs pos="0">
+                  <a:schemeClr val="bg1">
+                    <a:lumMod val="50000"/>
+                  </a:schemeClr>
+                </a:gs>
+                <a:gs pos="100000">
+                  <a:schemeClr val="bg1"/>
+                </a:gs>
+              </a:gsLst>
+              <a:path path="circle">
+                <a:fillToRect l="100000" t="100000"/>
+              </a:path>
+              <a:tileRect r="-100000" b="-100000"/>
+            </a:gradFill>
+            <a:ln>
+              <a:solidFill>
+                <a:schemeClr val="tx1"/>
+              </a:solidFill>
+            </a:ln>
+          </p:spPr>
+          <p:style>
+            <a:lnRef idx="1">
+              <a:schemeClr val="accent1"/>
+            </a:lnRef>
+            <a:fillRef idx="3">
+              <a:schemeClr val="accent1"/>
+            </a:fillRef>
+            <a:effectRef idx="2">
+              <a:schemeClr val="accent1"/>
+            </a:effectRef>
+            <a:fontRef idx="minor">
+              <a:schemeClr val="lt1"/>
+            </a:fontRef>
+          </p:style>
+          <p:txBody>
+            <a:bodyPr rtlCol="0" anchor="ctr"/>
+            <a:lstStyle/>
+            <a:p>
+              <a:pPr algn="ctr"/>
+              <a:endParaRPr lang="en-US"/>
+            </a:p>
+          </p:txBody>
+        </p:sp>
+      </p:grpSp>
     </p:spTree>
     <p:extLst>
       <p:ext uri="{BB962C8B-B14F-4D97-AF65-F5344CB8AC3E}">
@@ -12640,7 +12286,7 @@
 </p:sld>
 </file>
 
-<file path=ppt/slides/slide9.xml><?xml version="1.0" encoding="utf-8"?>
+<file path=ppt/slides/slide8.xml><?xml version="1.0" encoding="utf-8"?>
 <p:sld xmlns:a="http://schemas.openxmlformats.org/drawingml/2006/main" xmlns:r="http://schemas.openxmlformats.org/officeDocument/2006/relationships" xmlns:p="http://schemas.openxmlformats.org/presentationml/2006/main">
   <p:cSld>
     <p:spTree>
@@ -13608,8 +13254,8 @@
         </p:nvSpPr>
         <p:spPr>
           <a:xfrm>
-            <a:off x="3829623" y="5710664"/>
-            <a:ext cx="2586014" cy="830997"/>
+            <a:off x="2654273" y="5710664"/>
+            <a:ext cx="4936718" cy="830997"/>
           </a:xfrm>
           <a:prstGeom prst="rect">
             <a:avLst/>
@@ -13629,6 +13275,20 @@
                 <a:cs typeface="Gill Sans MT"/>
               </a:rPr>
               <a:t>Sample on </a:t>
+            </a:r>
+            <a:r>
+              <a:rPr lang="en-US" sz="2400" dirty="0" smtClean="0">
+                <a:latin typeface="Gill Sans MT"/>
+                <a:cs typeface="Gill Sans MT"/>
+              </a:rPr>
+              <a:t>the tangent</a:t>
+            </a:r>
+            <a:r>
+              <a:rPr lang="en-US" sz="2400" dirty="0" smtClean="0">
+                <a:latin typeface="Gill Sans MT"/>
+                <a:cs typeface="Gill Sans MT"/>
+              </a:rPr>
+              <a:t> plane(</a:t>
             </a:r>
             <a:r>
               <a:rPr lang="en-US" sz="2400" dirty="0" err="1" smtClean="0">
@@ -13642,8 +13302,12 @@
                 <a:latin typeface="Gill Sans MT"/>
                 <a:cs typeface="Gill Sans MT"/>
               </a:rPr>
-              <a:t> plane</a:t>
+              <a:t> plane)</a:t>
             </a:r>
+            <a:endParaRPr lang="en-US" sz="2400" dirty="0" smtClean="0">
+              <a:latin typeface="Gill Sans MT"/>
+              <a:cs typeface="Gill Sans MT"/>
+            </a:endParaRPr>
           </a:p>
           <a:p>
             <a:pPr algn="ctr"/>

</xml_diff>